<commit_message>
Updating examples to show new features
Fix shared charts to use explicit value as expressions will leave values empty.
Add DR chart resize to shared charts.

Show HTML/DOCX embedding in Word.

Add Content Control Dropdown example to XML binding.

DR Chart example added to SheetReport.

Alternative way to present empty table in WordTables
</commit_message>
<xml_diff>
--- a/Intermediate/SharedCharts/result.pptx
+++ b/Intermediate/SharedCharts/result.pptx
@@ -8,6 +8,7 @@
     <p:sldId id="256" r:id="rId2"/>
     <p:sldId id="257" r:id="rId3"/>
     <p:sldId id="258" r:id="rId4"/>
+    <p:sldId id="259" r:id="rId5"/>
   </p:sldIdLst>
   <p:sldSz cx="9144000" cy="6858000" type="screen4x3"/>
   <p:notesSz cx="6858000" cy="9144000"/>
@@ -106,18 +107,46 @@
       </a:defRPr>
     </a:lvl9pPr>
   </p:defaultTextStyle>
+  <p:extLst>
+    <p:ext uri="{EFAFB233-063F-42B5-8137-9DF3F51BA10A}">
+      <p15:sldGuideLst xmlns:p15="http://schemas.microsoft.com/office/powerpoint/2012/main">
+        <p15:guide id="1" orient="horz" pos="2160">
+          <p15:clr>
+            <a:srgbClr val="A4A3A4"/>
+          </p15:clr>
+        </p15:guide>
+        <p15:guide id="2" pos="2880">
+          <p15:clr>
+            <a:srgbClr val="A4A3A4"/>
+          </p15:clr>
+        </p15:guide>
+      </p15:sldGuideLst>
+    </p:ext>
+  </p:extLst>
 </p:presentation>
 </file>
 
 <file path=ppt/charts/chart1.xml><?xml version="1.0" encoding="utf-8"?>
-<c:chartSpace xmlns:c="http://schemas.openxmlformats.org/drawingml/2006/chart" xmlns:a="http://schemas.openxmlformats.org/drawingml/2006/main" xmlns:r="http://schemas.openxmlformats.org/officeDocument/2006/relationships">
-  <c:lang val="hr-HR"/>
+<c:chartSpace xmlns:c="http://schemas.openxmlformats.org/drawingml/2006/chart" xmlns:a="http://schemas.openxmlformats.org/drawingml/2006/main" xmlns:r="http://schemas.openxmlformats.org/officeDocument/2006/relationships" xmlns:c16r2="http://schemas.microsoft.com/office/drawing/2015/06/chart">
+  <c:date1904 val="0"/>
+  <c:lang val="en-US"/>
+  <c:roundedCorners val="0"/>
+  <mc:AlternateContent xmlns:mc="http://schemas.openxmlformats.org/markup-compatibility/2006">
+    <mc:Choice xmlns:c14="http://schemas.microsoft.com/office/drawing/2007/8/2/chart" Requires="c14">
+      <c14:style val="102"/>
+    </mc:Choice>
+    <mc:Fallback>
+      <c:style val="2"/>
+    </mc:Fallback>
+  </mc:AlternateContent>
   <c:chart>
+    <c:autoTitleDeleted val="0"/>
     <c:plotArea>
       <c:layout/>
       <c:barChart>
         <c:barDir val="col"/>
         <c:grouping val="clustered"/>
+        <c:varyColors val="0"/>
         <c:ser>
           <c:idx val="0"/>
           <c:order val="0"/>
@@ -132,6 +161,7 @@
               </c:strCache>
             </c:strRef>
           </c:tx>
+          <c:invertIfNegative val="0"/>
           <c:cat>
             <c:strRef>
               <c:f>Sheet1!$A$2:$A$6</c:f>
@@ -171,7 +201,7 @@
                   <c:v>15.6</c:v>
                 </c:pt>
                 <c:pt idx="3">
-                  <c:v>40.220000000000006</c:v>
+                  <c:v>40.22</c:v>
                 </c:pt>
                 <c:pt idx="4">
                   <c:v>92.54</c:v>
@@ -179,6 +209,11 @@
               </c:numCache>
             </c:numRef>
           </c:val>
+          <c:extLst>
+            <c:ext xmlns:c16="http://schemas.microsoft.com/office/drawing/2014/chart" uri="{C3380CC4-5D6E-409C-BE32-E72D297353CC}">
+              <c16:uniqueId val="{00000000-4511-40B7-BF6A-5F92EB027132}"/>
+            </c:ext>
+          </c:extLst>
         </c:ser>
         <c:ser>
           <c:idx val="1"/>
@@ -194,6 +229,7 @@
               </c:strCache>
             </c:strRef>
           </c:tx>
+          <c:invertIfNegative val="0"/>
           <c:cat>
             <c:strRef>
               <c:f>Sheet1!$A$2:$A$6</c:f>
@@ -227,7 +263,7 @@
                   <c:v>92.22</c:v>
                 </c:pt>
                 <c:pt idx="1">
-                  <c:v>69.440000000000012</c:v>
+                  <c:v>69.44</c:v>
                 </c:pt>
                 <c:pt idx="2">
                   <c:v>32.6</c:v>
@@ -241,6 +277,11 @@
               </c:numCache>
             </c:numRef>
           </c:val>
+          <c:extLst>
+            <c:ext xmlns:c16="http://schemas.microsoft.com/office/drawing/2014/chart" uri="{C3380CC4-5D6E-409C-BE32-E72D297353CC}">
+              <c16:uniqueId val="{00000001-4511-40B7-BF6A-5F92EB027132}"/>
+            </c:ext>
+          </c:extLst>
         </c:ser>
         <c:ser>
           <c:idx val="2"/>
@@ -256,6 +297,7 @@
               </c:strCache>
             </c:strRef>
           </c:tx>
+          <c:invertIfNegative val="0"/>
           <c:cat>
             <c:strRef>
               <c:f>Sheet1!$A$2:$A$6</c:f>
@@ -286,10 +328,10 @@
                 <c:formatCode>General</c:formatCode>
                 <c:ptCount val="5"/>
                 <c:pt idx="0">
-                  <c:v>52.620000000000005</c:v>
+                  <c:v>52.62</c:v>
                 </c:pt>
                 <c:pt idx="1">
-                  <c:v>89.910000000000011</c:v>
+                  <c:v>89.91</c:v>
                 </c:pt>
                 <c:pt idx="2">
                   <c:v>27.04</c:v>
@@ -303,42 +345,66 @@
               </c:numCache>
             </c:numRef>
           </c:val>
+          <c:extLst>
+            <c:ext xmlns:c16="http://schemas.microsoft.com/office/drawing/2014/chart" uri="{C3380CC4-5D6E-409C-BE32-E72D297353CC}">
+              <c16:uniqueId val="{00000002-4511-40B7-BF6A-5F92EB027132}"/>
+            </c:ext>
+          </c:extLst>
         </c:ser>
-        <c:axId val="88288640"/>
-        <c:axId val="100684928"/>
+        <c:dLbls>
+          <c:showLegendKey val="0"/>
+          <c:showVal val="0"/>
+          <c:showCatName val="0"/>
+          <c:showSerName val="0"/>
+          <c:showPercent val="0"/>
+          <c:showBubbleSize val="0"/>
+        </c:dLbls>
+        <c:gapWidth val="150"/>
+        <c:axId val="100519936"/>
+        <c:axId val="100521472"/>
       </c:barChart>
       <c:catAx>
-        <c:axId val="88288640"/>
+        <c:axId val="100519936"/>
         <c:scaling>
           <c:orientation val="minMax"/>
         </c:scaling>
+        <c:delete val="0"/>
         <c:axPos val="b"/>
+        <c:numFmt formatCode="General" sourceLinked="0"/>
+        <c:majorTickMark val="out"/>
+        <c:minorTickMark val="none"/>
         <c:tickLblPos val="nextTo"/>
-        <c:crossAx val="100684928"/>
+        <c:crossAx val="100521472"/>
         <c:crosses val="autoZero"/>
         <c:auto val="1"/>
         <c:lblAlgn val="ctr"/>
         <c:lblOffset val="100"/>
+        <c:noMultiLvlLbl val="0"/>
       </c:catAx>
       <c:valAx>
-        <c:axId val="100684928"/>
+        <c:axId val="100521472"/>
         <c:scaling>
           <c:orientation val="minMax"/>
         </c:scaling>
+        <c:delete val="0"/>
         <c:axPos val="l"/>
         <c:majorGridlines/>
         <c:numFmt formatCode="General" sourceLinked="1"/>
+        <c:majorTickMark val="out"/>
+        <c:minorTickMark val="none"/>
         <c:tickLblPos val="nextTo"/>
-        <c:crossAx val="88288640"/>
+        <c:crossAx val="100519936"/>
         <c:crosses val="autoZero"/>
         <c:crossBetween val="between"/>
       </c:valAx>
     </c:plotArea>
     <c:legend>
       <c:legendPos val="r"/>
-      <c:layout/>
+      <c:overlay val="0"/>
     </c:legend>
     <c:plotVisOnly val="1"/>
+    <c:dispBlanksAs val="gap"/>
+    <c:showDLblsOverMax val="0"/>
   </c:chart>
   <c:txPr>
     <a:bodyPr/>
@@ -347,20 +413,33 @@
       <a:pPr>
         <a:defRPr sz="1800"/>
       </a:pPr>
-      <a:endParaRPr lang="sr-Latn-CS"/>
+      <a:endParaRPr lang="sr-Latn-RS"/>
     </a:p>
   </c:txPr>
-  <c:externalData r:id="rId1"/>
+  <c:externalData r:id="rId1">
+    <c:autoUpdate val="0"/>
+  </c:externalData>
 </c:chartSpace>
 </file>
 
 <file path=ppt/charts/chart2.xml><?xml version="1.0" encoding="utf-8"?>
-<c:chartSpace xmlns:c="http://schemas.openxmlformats.org/drawingml/2006/chart" xmlns:a="http://schemas.openxmlformats.org/drawingml/2006/main" xmlns:r="http://schemas.openxmlformats.org/officeDocument/2006/relationships">
-  <c:lang val="hr-HR"/>
+<c:chartSpace xmlns:c="http://schemas.openxmlformats.org/drawingml/2006/chart" xmlns:a="http://schemas.openxmlformats.org/drawingml/2006/main" xmlns:r="http://schemas.openxmlformats.org/officeDocument/2006/relationships" xmlns:c16r2="http://schemas.microsoft.com/office/drawing/2015/06/chart">
+  <c:date1904 val="0"/>
+  <c:lang val="en-US"/>
+  <c:roundedCorners val="0"/>
+  <mc:AlternateContent xmlns:mc="http://schemas.openxmlformats.org/markup-compatibility/2006">
+    <mc:Choice xmlns:c14="http://schemas.microsoft.com/office/drawing/2007/8/2/chart" Requires="c14">
+      <c14:style val="102"/>
+    </mc:Choice>
+    <mc:Fallback>
+      <c:style val="2"/>
+    </mc:Fallback>
+  </mc:AlternateContent>
   <c:chart>
     <c:title>
-      <c:layout/>
+      <c:overlay val="0"/>
     </c:title>
+    <c:autoTitleDeleted val="0"/>
     <c:plotArea>
       <c:layout/>
       <c:pieChart>
@@ -409,32 +488,48 @@
                 <c:formatCode>General</c:formatCode>
                 <c:ptCount val="5"/>
                 <c:pt idx="0">
-                  <c:v>52.620000000000005</c:v>
+                  <c:v>226.14</c:v>
                 </c:pt>
                 <c:pt idx="1">
-                  <c:v>89.910000000000011</c:v>
+                  <c:v>246.78</c:v>
                 </c:pt>
                 <c:pt idx="2">
-                  <c:v>27.04</c:v>
+                  <c:v>75.239999999999995</c:v>
                 </c:pt>
                 <c:pt idx="3">
-                  <c:v>20.41</c:v>
+                  <c:v>93.99</c:v>
                 </c:pt>
                 <c:pt idx="4">
-                  <c:v>38.78</c:v>
+                  <c:v>173.99</c:v>
                 </c:pt>
               </c:numCache>
             </c:numRef>
           </c:val>
+          <c:extLst>
+            <c:ext xmlns:c16="http://schemas.microsoft.com/office/drawing/2014/chart" uri="{C3380CC4-5D6E-409C-BE32-E72D297353CC}">
+              <c16:uniqueId val="{00000000-FD0D-4405-8EDF-AD98257D25D6}"/>
+            </c:ext>
+          </c:extLst>
         </c:ser>
+        <c:dLbls>
+          <c:showLegendKey val="0"/>
+          <c:showVal val="0"/>
+          <c:showCatName val="0"/>
+          <c:showSerName val="0"/>
+          <c:showPercent val="0"/>
+          <c:showBubbleSize val="0"/>
+          <c:showLeaderLines val="1"/>
+        </c:dLbls>
         <c:firstSliceAng val="0"/>
       </c:pieChart>
     </c:plotArea>
     <c:legend>
       <c:legendPos val="r"/>
-      <c:layout/>
+      <c:overlay val="0"/>
     </c:legend>
     <c:plotVisOnly val="1"/>
+    <c:dispBlanksAs val="gap"/>
+    <c:showDLblsOverMax val="0"/>
   </c:chart>
   <c:txPr>
     <a:bodyPr/>
@@ -443,11 +538,1147 @@
       <a:pPr>
         <a:defRPr sz="1800"/>
       </a:pPr>
-      <a:endParaRPr lang="sr-Latn-CS"/>
+      <a:endParaRPr lang="sr-Latn-RS"/>
     </a:p>
   </c:txPr>
-  <c:externalData r:id="rId1"/>
+  <c:externalData r:id="rId1">
+    <c:autoUpdate val="0"/>
+  </c:externalData>
 </c:chartSpace>
+</file>
+
+<file path=ppt/charts/chart3.xml><?xml version="1.0" encoding="utf-8"?>
+<c:chartSpace xmlns:c="http://schemas.openxmlformats.org/drawingml/2006/chart" xmlns:a="http://schemas.openxmlformats.org/drawingml/2006/main" xmlns:r="http://schemas.openxmlformats.org/officeDocument/2006/relationships" xmlns:c16r2="http://schemas.microsoft.com/office/drawing/2015/06/chart">
+  <c:date1904 val="0"/>
+  <c:lang val="en-US"/>
+  <c:roundedCorners val="0"/>
+  <mc:AlternateContent xmlns:mc="http://schemas.openxmlformats.org/markup-compatibility/2006">
+    <mc:Choice xmlns:c14="http://schemas.microsoft.com/office/drawing/2007/8/2/chart" Requires="c14">
+      <c14:style val="102"/>
+    </mc:Choice>
+    <mc:Fallback>
+      <c:style val="2"/>
+    </mc:Fallback>
+  </mc:AlternateContent>
+  <c:chart>
+    <c:title>
+      <c:overlay val="0"/>
+      <c:spPr>
+        <a:noFill/>
+        <a:ln>
+          <a:noFill/>
+        </a:ln>
+        <a:effectLst/>
+      </c:spPr>
+      <c:txPr>
+        <a:bodyPr rot="0" spcFirstLastPara="1" vertOverflow="ellipsis" vert="horz" wrap="square" anchor="ctr" anchorCtr="1"/>
+        <a:lstStyle/>
+        <a:p>
+          <a:pPr>
+            <a:defRPr sz="1862" b="0" i="0" u="none" strike="noStrike" kern="1200" spc="0" baseline="0">
+              <a:solidFill>
+                <a:schemeClr val="tx1">
+                  <a:lumMod val="65000"/>
+                  <a:lumOff val="35000"/>
+                </a:schemeClr>
+              </a:solidFill>
+              <a:latin typeface="+mn-lt"/>
+              <a:ea typeface="+mn-ea"/>
+              <a:cs typeface="+mn-cs"/>
+            </a:defRPr>
+          </a:pPr>
+          <a:endParaRPr lang="sr-Latn-RS"/>
+        </a:p>
+      </c:txPr>
+    </c:title>
+    <c:autoTitleDeleted val="0"/>
+    <c:view3D>
+      <c:rotX val="15"/>
+      <c:rotY val="20"/>
+      <c:rAngAx val="0"/>
+    </c:view3D>
+    <c:floor>
+      <c:thickness val="0"/>
+      <c:spPr>
+        <a:noFill/>
+        <a:ln>
+          <a:noFill/>
+        </a:ln>
+        <a:effectLst/>
+        <a:sp3d/>
+      </c:spPr>
+    </c:floor>
+    <c:sideWall>
+      <c:thickness val="0"/>
+      <c:spPr>
+        <a:noFill/>
+        <a:ln>
+          <a:noFill/>
+        </a:ln>
+        <a:effectLst/>
+        <a:sp3d/>
+      </c:spPr>
+    </c:sideWall>
+    <c:backWall>
+      <c:thickness val="0"/>
+      <c:spPr>
+        <a:noFill/>
+        <a:ln>
+          <a:noFill/>
+        </a:ln>
+        <a:effectLst/>
+        <a:sp3d/>
+      </c:spPr>
+    </c:backWall>
+    <c:plotArea>
+      <c:layout/>
+      <c:bar3DChart>
+        <c:barDir val="col"/>
+        <c:grouping val="standard"/>
+        <c:varyColors val="0"/>
+        <c:ser>
+          <c:idx val="0"/>
+          <c:order val="0"/>
+          <c:tx>
+            <c:strRef>
+              <c:f>Sheet1!$B$1</c:f>
+              <c:strCache>
+                <c:ptCount val="1"/>
+                <c:pt idx="0">
+                  <c:v>Web</c:v>
+                </c:pt>
+              </c:strCache>
+            </c:strRef>
+          </c:tx>
+          <c:spPr>
+            <a:solidFill>
+              <a:schemeClr val="accent1"/>
+            </a:solidFill>
+            <a:ln w="25400">
+              <a:solidFill>
+                <a:schemeClr val="lt1"/>
+              </a:solidFill>
+            </a:ln>
+            <a:effectLst/>
+            <a:sp3d contourW="25400">
+              <a:contourClr>
+                <a:schemeClr val="lt1"/>
+              </a:contourClr>
+            </a:sp3d>
+          </c:spPr>
+          <c:invertIfNegative val="0"/>
+          <c:cat>
+            <c:strRef>
+              <c:f>Sheet1!$A$2:$A$6</c:f>
+              <c:strCache>
+                <c:ptCount val="5"/>
+                <c:pt idx="0">
+                  <c:v>C#</c:v>
+                </c:pt>
+                <c:pt idx="1">
+                  <c:v>Java</c:v>
+                </c:pt>
+                <c:pt idx="2">
+                  <c:v>C++</c:v>
+                </c:pt>
+                <c:pt idx="3">
+                  <c:v>Python</c:v>
+                </c:pt>
+                <c:pt idx="4">
+                  <c:v>Javascript</c:v>
+                </c:pt>
+              </c:strCache>
+            </c:strRef>
+          </c:cat>
+          <c:val>
+            <c:numRef>
+              <c:f>Sheet1!$B$2:$B$6</c:f>
+              <c:numCache>
+                <c:formatCode>General</c:formatCode>
+                <c:ptCount val="5"/>
+                <c:pt idx="0">
+                  <c:v>81.3</c:v>
+                </c:pt>
+                <c:pt idx="1">
+                  <c:v>87.43</c:v>
+                </c:pt>
+                <c:pt idx="2">
+                  <c:v>15.6</c:v>
+                </c:pt>
+                <c:pt idx="3">
+                  <c:v>40.22</c:v>
+                </c:pt>
+                <c:pt idx="4">
+                  <c:v>92.54</c:v>
+                </c:pt>
+              </c:numCache>
+            </c:numRef>
+          </c:val>
+          <c:extLst>
+            <c:ext xmlns:c16="http://schemas.microsoft.com/office/drawing/2014/chart" uri="{C3380CC4-5D6E-409C-BE32-E72D297353CC}">
+              <c16:uniqueId val="{00000000-A3E4-406F-9B47-C25E92420999}"/>
+            </c:ext>
+          </c:extLst>
+        </c:ser>
+        <c:ser>
+          <c:idx val="1"/>
+          <c:order val="1"/>
+          <c:tx>
+            <c:strRef>
+              <c:f>Sheet1!$C$1</c:f>
+              <c:strCache>
+                <c:ptCount val="1"/>
+                <c:pt idx="0">
+                  <c:v>Desktop</c:v>
+                </c:pt>
+              </c:strCache>
+            </c:strRef>
+          </c:tx>
+          <c:spPr>
+            <a:solidFill>
+              <a:schemeClr val="accent2"/>
+            </a:solidFill>
+            <a:ln w="25400">
+              <a:solidFill>
+                <a:schemeClr val="lt1"/>
+              </a:solidFill>
+            </a:ln>
+            <a:effectLst/>
+            <a:sp3d contourW="25400">
+              <a:contourClr>
+                <a:schemeClr val="lt1"/>
+              </a:contourClr>
+            </a:sp3d>
+          </c:spPr>
+          <c:invertIfNegative val="0"/>
+          <c:cat>
+            <c:strRef>
+              <c:f>Sheet1!$A$2:$A$6</c:f>
+              <c:strCache>
+                <c:ptCount val="5"/>
+                <c:pt idx="0">
+                  <c:v>C#</c:v>
+                </c:pt>
+                <c:pt idx="1">
+                  <c:v>Java</c:v>
+                </c:pt>
+                <c:pt idx="2">
+                  <c:v>C++</c:v>
+                </c:pt>
+                <c:pt idx="3">
+                  <c:v>Python</c:v>
+                </c:pt>
+                <c:pt idx="4">
+                  <c:v>Javascript</c:v>
+                </c:pt>
+              </c:strCache>
+            </c:strRef>
+          </c:cat>
+          <c:val>
+            <c:numRef>
+              <c:f>Sheet1!$C$2:$C$6</c:f>
+              <c:numCache>
+                <c:formatCode>General</c:formatCode>
+                <c:ptCount val="5"/>
+                <c:pt idx="0">
+                  <c:v>92.22</c:v>
+                </c:pt>
+                <c:pt idx="1">
+                  <c:v>69.44</c:v>
+                </c:pt>
+                <c:pt idx="2">
+                  <c:v>32.6</c:v>
+                </c:pt>
+                <c:pt idx="3">
+                  <c:v>33.36</c:v>
+                </c:pt>
+                <c:pt idx="4">
+                  <c:v>42.67</c:v>
+                </c:pt>
+              </c:numCache>
+            </c:numRef>
+          </c:val>
+          <c:extLst>
+            <c:ext xmlns:c16="http://schemas.microsoft.com/office/drawing/2014/chart" uri="{C3380CC4-5D6E-409C-BE32-E72D297353CC}">
+              <c16:uniqueId val="{00000000-A3E4-406F-9B47-C25E92420999}"/>
+            </c:ext>
+          </c:extLst>
+        </c:ser>
+        <c:ser>
+          <c:idx val="2"/>
+          <c:order val="2"/>
+          <c:tx>
+            <c:strRef>
+              <c:f>Sheet1!$D$1</c:f>
+              <c:strCache>
+                <c:ptCount val="1"/>
+                <c:pt idx="0">
+                  <c:v>Mobile</c:v>
+                </c:pt>
+              </c:strCache>
+            </c:strRef>
+          </c:tx>
+          <c:spPr>
+            <a:solidFill>
+              <a:schemeClr val="accent3"/>
+            </a:solidFill>
+            <a:ln w="25400">
+              <a:solidFill>
+                <a:schemeClr val="lt1"/>
+              </a:solidFill>
+            </a:ln>
+            <a:effectLst/>
+            <a:sp3d contourW="25400">
+              <a:contourClr>
+                <a:schemeClr val="lt1"/>
+              </a:contourClr>
+            </a:sp3d>
+          </c:spPr>
+          <c:invertIfNegative val="0"/>
+          <c:cat>
+            <c:strRef>
+              <c:f>Sheet1!$A$2:$A$6</c:f>
+              <c:strCache>
+                <c:ptCount val="5"/>
+                <c:pt idx="0">
+                  <c:v>C#</c:v>
+                </c:pt>
+                <c:pt idx="1">
+                  <c:v>Java</c:v>
+                </c:pt>
+                <c:pt idx="2">
+                  <c:v>C++</c:v>
+                </c:pt>
+                <c:pt idx="3">
+                  <c:v>Python</c:v>
+                </c:pt>
+                <c:pt idx="4">
+                  <c:v>Javascript</c:v>
+                </c:pt>
+              </c:strCache>
+            </c:strRef>
+          </c:cat>
+          <c:val>
+            <c:numRef>
+              <c:f>Sheet1!$D$2:$D$6</c:f>
+              <c:numCache>
+                <c:formatCode>General</c:formatCode>
+                <c:ptCount val="5"/>
+                <c:pt idx="0">
+                  <c:v>52.62</c:v>
+                </c:pt>
+                <c:pt idx="1">
+                  <c:v>89.91</c:v>
+                </c:pt>
+                <c:pt idx="2">
+                  <c:v>27.04</c:v>
+                </c:pt>
+                <c:pt idx="3">
+                  <c:v>20.41</c:v>
+                </c:pt>
+                <c:pt idx="4">
+                  <c:v>38.78</c:v>
+                </c:pt>
+              </c:numCache>
+            </c:numRef>
+          </c:val>
+          <c:extLst>
+            <c:ext xmlns:c16="http://schemas.microsoft.com/office/drawing/2014/chart" uri="{C3380CC4-5D6E-409C-BE32-E72D297353CC}">
+              <c16:uniqueId val="{00000000-A3E4-406F-9B47-C25E92420999}"/>
+            </c:ext>
+          </c:extLst>
+        </c:ser>
+        <c:dLbls>
+          <c:showLegendKey val="0"/>
+          <c:showVal val="0"/>
+          <c:showCatName val="0"/>
+          <c:showSerName val="0"/>
+          <c:showPercent val="0"/>
+          <c:showBubbleSize val="0"/>
+        </c:dLbls>
+        <c:gapWidth val="150"/>
+        <c:shape val="box"/>
+        <c:axId val="568714624"/>
+        <c:axId val="568698552"/>
+        <c:axId val="566251416"/>
+      </c:bar3DChart>
+      <c:catAx>
+        <c:axId val="568714624"/>
+        <c:scaling>
+          <c:orientation val="minMax"/>
+        </c:scaling>
+        <c:delete val="0"/>
+        <c:axPos val="b"/>
+        <c:numFmt formatCode="General" sourceLinked="1"/>
+        <c:majorTickMark val="out"/>
+        <c:minorTickMark val="none"/>
+        <c:tickLblPos val="nextTo"/>
+        <c:spPr>
+          <a:noFill/>
+          <a:ln w="9525" cap="flat" cmpd="sng" algn="ctr">
+            <a:solidFill>
+              <a:schemeClr val="tx1">
+                <a:lumMod val="15000"/>
+                <a:lumOff val="85000"/>
+              </a:schemeClr>
+            </a:solidFill>
+            <a:round/>
+          </a:ln>
+          <a:effectLst/>
+        </c:spPr>
+        <c:txPr>
+          <a:bodyPr rot="-60000000" spcFirstLastPara="1" vertOverflow="ellipsis" vert="horz" wrap="square" anchor="ctr" anchorCtr="1"/>
+          <a:lstStyle/>
+          <a:p>
+            <a:pPr>
+              <a:defRPr sz="1197" b="0" i="0" u="none" strike="noStrike" kern="1200" baseline="0">
+                <a:solidFill>
+                  <a:schemeClr val="tx1">
+                    <a:lumMod val="65000"/>
+                    <a:lumOff val="35000"/>
+                  </a:schemeClr>
+                </a:solidFill>
+                <a:latin typeface="+mn-lt"/>
+                <a:ea typeface="+mn-ea"/>
+                <a:cs typeface="+mn-cs"/>
+              </a:defRPr>
+            </a:pPr>
+            <a:endParaRPr lang="sr-Latn-RS"/>
+          </a:p>
+        </c:txPr>
+        <c:crossAx val="568698552"/>
+        <c:crosses val="autoZero"/>
+        <c:auto val="1"/>
+        <c:lblAlgn val="ctr"/>
+        <c:lblOffset val="100"/>
+        <c:noMultiLvlLbl val="0"/>
+      </c:catAx>
+      <c:valAx>
+        <c:axId val="568698552"/>
+        <c:scaling>
+          <c:orientation val="minMax"/>
+        </c:scaling>
+        <c:delete val="0"/>
+        <c:axPos val="l"/>
+        <c:majorGridlines>
+          <c:spPr>
+            <a:ln w="9525" cap="flat" cmpd="sng" algn="ctr">
+              <a:solidFill>
+                <a:schemeClr val="tx1">
+                  <a:lumMod val="15000"/>
+                  <a:lumOff val="85000"/>
+                </a:schemeClr>
+              </a:solidFill>
+              <a:round/>
+            </a:ln>
+            <a:effectLst/>
+          </c:spPr>
+        </c:majorGridlines>
+        <c:numFmt formatCode="General" sourceLinked="1"/>
+        <c:majorTickMark val="out"/>
+        <c:minorTickMark val="none"/>
+        <c:tickLblPos val="nextTo"/>
+        <c:spPr>
+          <a:noFill/>
+          <a:ln>
+            <a:noFill/>
+          </a:ln>
+          <a:effectLst/>
+        </c:spPr>
+        <c:txPr>
+          <a:bodyPr rot="-60000000" spcFirstLastPara="1" vertOverflow="ellipsis" vert="horz" wrap="square" anchor="ctr" anchorCtr="1"/>
+          <a:lstStyle/>
+          <a:p>
+            <a:pPr>
+              <a:defRPr sz="1197" b="0" i="0" u="none" strike="noStrike" kern="1200" baseline="0">
+                <a:solidFill>
+                  <a:schemeClr val="tx1">
+                    <a:lumMod val="65000"/>
+                    <a:lumOff val="35000"/>
+                  </a:schemeClr>
+                </a:solidFill>
+                <a:latin typeface="+mn-lt"/>
+                <a:ea typeface="+mn-ea"/>
+                <a:cs typeface="+mn-cs"/>
+              </a:defRPr>
+            </a:pPr>
+            <a:endParaRPr lang="sr-Latn-RS"/>
+          </a:p>
+        </c:txPr>
+        <c:crossAx val="568714624"/>
+        <c:crosses val="autoZero"/>
+        <c:crossBetween val="between"/>
+      </c:valAx>
+      <c:serAx>
+        <c:axId val="566251416"/>
+        <c:scaling>
+          <c:orientation val="minMax"/>
+        </c:scaling>
+        <c:delete val="0"/>
+        <c:axPos val="b"/>
+        <c:majorTickMark val="out"/>
+        <c:minorTickMark val="none"/>
+        <c:tickLblPos val="nextTo"/>
+        <c:spPr>
+          <a:noFill/>
+          <a:ln>
+            <a:noFill/>
+          </a:ln>
+          <a:effectLst/>
+        </c:spPr>
+        <c:txPr>
+          <a:bodyPr rot="-60000000" spcFirstLastPara="1" vertOverflow="ellipsis" vert="horz" wrap="square" anchor="ctr" anchorCtr="1"/>
+          <a:lstStyle/>
+          <a:p>
+            <a:pPr>
+              <a:defRPr sz="1197" b="0" i="0" u="none" strike="noStrike" kern="1200" baseline="0">
+                <a:solidFill>
+                  <a:schemeClr val="tx1">
+                    <a:lumMod val="65000"/>
+                    <a:lumOff val="35000"/>
+                  </a:schemeClr>
+                </a:solidFill>
+                <a:latin typeface="+mn-lt"/>
+                <a:ea typeface="+mn-ea"/>
+                <a:cs typeface="+mn-cs"/>
+              </a:defRPr>
+            </a:pPr>
+            <a:endParaRPr lang="sr-Latn-RS"/>
+          </a:p>
+        </c:txPr>
+        <c:crossAx val="568698552"/>
+        <c:crosses val="autoZero"/>
+      </c:serAx>
+      <c:spPr>
+        <a:noFill/>
+        <a:ln>
+          <a:noFill/>
+        </a:ln>
+        <a:effectLst/>
+      </c:spPr>
+    </c:plotArea>
+    <c:legend>
+      <c:legendPos val="b"/>
+      <c:overlay val="0"/>
+      <c:spPr>
+        <a:noFill/>
+        <a:ln>
+          <a:noFill/>
+        </a:ln>
+        <a:effectLst/>
+      </c:spPr>
+      <c:txPr>
+        <a:bodyPr rot="0" spcFirstLastPara="1" vertOverflow="ellipsis" vert="horz" wrap="square" anchor="ctr" anchorCtr="1"/>
+        <a:lstStyle/>
+        <a:p>
+          <a:pPr>
+            <a:defRPr sz="1197" b="0" i="0" u="none" strike="noStrike" kern="1200" baseline="0">
+              <a:solidFill>
+                <a:schemeClr val="tx1">
+                  <a:lumMod val="65000"/>
+                  <a:lumOff val="35000"/>
+                </a:schemeClr>
+              </a:solidFill>
+              <a:latin typeface="+mn-lt"/>
+              <a:ea typeface="+mn-ea"/>
+              <a:cs typeface="+mn-cs"/>
+            </a:defRPr>
+          </a:pPr>
+          <a:endParaRPr lang="sr-Latn-RS"/>
+        </a:p>
+      </c:txPr>
+    </c:legend>
+    <c:plotVisOnly val="1"/>
+    <c:dispBlanksAs val="gap"/>
+    <c:extLst>
+      <c:ext xmlns:c16r3="http://schemas.microsoft.com/office/drawing/2017/03/chart" uri="{56B9EC1D-385E-4148-901F-78D8002777C0}">
+        <c16r3:dataDisplayOptions16>
+          <c16r3:dispNaAsBlank val="1"/>
+        </c16r3:dataDisplayOptions16>
+      </c:ext>
+    </c:extLst>
+    <c:showDLblsOverMax val="0"/>
+  </c:chart>
+  <c:spPr>
+    <a:noFill/>
+    <a:ln>
+      <a:noFill/>
+    </a:ln>
+    <a:effectLst/>
+  </c:spPr>
+  <c:txPr>
+    <a:bodyPr/>
+    <a:lstStyle/>
+    <a:p>
+      <a:pPr>
+        <a:defRPr/>
+      </a:pPr>
+      <a:endParaRPr lang="sr-Latn-RS"/>
+    </a:p>
+  </c:txPr>
+  <c:externalData r:id="rId3">
+    <c:autoUpdate val="0"/>
+  </c:externalData>
+</c:chartSpace>
+</file>
+
+<file path=ppt/charts/colors1.xml><?xml version="1.0" encoding="utf-8"?>
+<cs:colorStyle xmlns:cs="http://schemas.microsoft.com/office/drawing/2012/chartStyle" xmlns:a="http://schemas.openxmlformats.org/drawingml/2006/main" meth="cycle" id="10">
+  <a:schemeClr val="accent1"/>
+  <a:schemeClr val="accent2"/>
+  <a:schemeClr val="accent3"/>
+  <a:schemeClr val="accent4"/>
+  <a:schemeClr val="accent5"/>
+  <a:schemeClr val="accent6"/>
+  <cs:variation/>
+  <cs:variation>
+    <a:lumMod val="60000"/>
+  </cs:variation>
+  <cs:variation>
+    <a:lumMod val="80000"/>
+    <a:lumOff val="20000"/>
+  </cs:variation>
+  <cs:variation>
+    <a:lumMod val="80000"/>
+  </cs:variation>
+  <cs:variation>
+    <a:lumMod val="60000"/>
+    <a:lumOff val="40000"/>
+  </cs:variation>
+  <cs:variation>
+    <a:lumMod val="50000"/>
+  </cs:variation>
+  <cs:variation>
+    <a:lumMod val="70000"/>
+    <a:lumOff val="30000"/>
+  </cs:variation>
+  <cs:variation>
+    <a:lumMod val="70000"/>
+  </cs:variation>
+  <cs:variation>
+    <a:lumMod val="50000"/>
+    <a:lumOff val="50000"/>
+  </cs:variation>
+</cs:colorStyle>
+</file>
+
+<file path=ppt/charts/style1.xml><?xml version="1.0" encoding="utf-8"?>
+<cs:chartStyle xmlns:cs="http://schemas.microsoft.com/office/drawing/2012/chartStyle" xmlns:a="http://schemas.openxmlformats.org/drawingml/2006/main" id="251">
+  <cs:axisTitle>
+    <cs:lnRef idx="0"/>
+    <cs:fillRef idx="0"/>
+    <cs:effectRef idx="0"/>
+    <cs:fontRef idx="minor">
+      <a:schemeClr val="tx1">
+        <a:lumMod val="65000"/>
+        <a:lumOff val="35000"/>
+      </a:schemeClr>
+    </cs:fontRef>
+    <cs:defRPr sz="1330" kern="1200"/>
+  </cs:axisTitle>
+  <cs:categoryAxis>
+    <cs:lnRef idx="0"/>
+    <cs:fillRef idx="0"/>
+    <cs:effectRef idx="0"/>
+    <cs:fontRef idx="minor">
+      <a:schemeClr val="tx1">
+        <a:lumMod val="65000"/>
+        <a:lumOff val="35000"/>
+      </a:schemeClr>
+    </cs:fontRef>
+    <cs:spPr>
+      <a:ln w="9525" cap="flat" cmpd="sng" algn="ctr">
+        <a:solidFill>
+          <a:schemeClr val="tx1">
+            <a:lumMod val="15000"/>
+            <a:lumOff val="85000"/>
+          </a:schemeClr>
+        </a:solidFill>
+        <a:round/>
+      </a:ln>
+    </cs:spPr>
+    <cs:defRPr sz="1197" kern="1200"/>
+  </cs:categoryAxis>
+  <cs:chartArea mods="allowNoFillOverride allowNoLineOverride">
+    <cs:lnRef idx="0"/>
+    <cs:fillRef idx="0"/>
+    <cs:effectRef idx="0"/>
+    <cs:fontRef idx="minor">
+      <a:schemeClr val="tx1"/>
+    </cs:fontRef>
+    <cs:spPr>
+      <a:solidFill>
+        <a:schemeClr val="bg1"/>
+      </a:solidFill>
+      <a:ln w="9525" cap="flat" cmpd="sng" algn="ctr">
+        <a:solidFill>
+          <a:schemeClr val="tx1">
+            <a:lumMod val="15000"/>
+            <a:lumOff val="85000"/>
+          </a:schemeClr>
+        </a:solidFill>
+        <a:round/>
+      </a:ln>
+    </cs:spPr>
+    <cs:defRPr sz="1197" kern="1200"/>
+  </cs:chartArea>
+  <cs:dataLabel>
+    <cs:lnRef idx="0"/>
+    <cs:fillRef idx="0"/>
+    <cs:effectRef idx="0"/>
+    <cs:fontRef idx="minor">
+      <a:schemeClr val="tx1">
+        <a:lumMod val="75000"/>
+        <a:lumOff val="25000"/>
+      </a:schemeClr>
+    </cs:fontRef>
+    <cs:defRPr sz="1197" kern="1200"/>
+  </cs:dataLabel>
+  <cs:dataLabelCallout>
+    <cs:lnRef idx="0"/>
+    <cs:fillRef idx="0"/>
+    <cs:effectRef idx="0"/>
+    <cs:fontRef idx="minor">
+      <a:schemeClr val="dk1">
+        <a:lumMod val="65000"/>
+        <a:lumOff val="35000"/>
+      </a:schemeClr>
+    </cs:fontRef>
+    <cs:spPr>
+      <a:solidFill>
+        <a:schemeClr val="lt1"/>
+      </a:solidFill>
+      <a:ln>
+        <a:solidFill>
+          <a:schemeClr val="dk1">
+            <a:lumMod val="25000"/>
+            <a:lumOff val="75000"/>
+          </a:schemeClr>
+        </a:solidFill>
+      </a:ln>
+    </cs:spPr>
+    <cs:defRPr sz="1197" kern="1200"/>
+    <cs:bodyPr rot="0" spcFirstLastPara="1" vertOverflow="clip" horzOverflow="clip" vert="horz" wrap="square" lIns="36576" tIns="18288" rIns="36576" bIns="18288" anchor="ctr" anchorCtr="1">
+      <a:spAutoFit/>
+    </cs:bodyPr>
+  </cs:dataLabelCallout>
+  <cs:dataPoint>
+    <cs:lnRef idx="0"/>
+    <cs:fillRef idx="1">
+      <cs:styleClr val="auto"/>
+    </cs:fillRef>
+    <cs:effectRef idx="0"/>
+    <cs:fontRef idx="minor">
+      <a:schemeClr val="tx1"/>
+    </cs:fontRef>
+    <cs:spPr>
+      <a:ln w="19050">
+        <a:solidFill>
+          <a:schemeClr val="lt1"/>
+        </a:solidFill>
+      </a:ln>
+    </cs:spPr>
+  </cs:dataPoint>
+  <cs:dataPoint3D>
+    <cs:lnRef idx="0"/>
+    <cs:fillRef idx="1">
+      <cs:styleClr val="auto"/>
+    </cs:fillRef>
+    <cs:effectRef idx="0"/>
+    <cs:fontRef idx="minor">
+      <a:schemeClr val="tx1"/>
+    </cs:fontRef>
+    <cs:spPr>
+      <a:ln w="25400">
+        <a:solidFill>
+          <a:schemeClr val="lt1"/>
+        </a:solidFill>
+      </a:ln>
+    </cs:spPr>
+  </cs:dataPoint3D>
+  <cs:dataPointLine>
+    <cs:lnRef idx="0">
+      <cs:styleClr val="auto"/>
+    </cs:lnRef>
+    <cs:fillRef idx="0"/>
+    <cs:effectRef idx="0"/>
+    <cs:fontRef idx="minor">
+      <a:schemeClr val="tx1"/>
+    </cs:fontRef>
+    <cs:spPr>
+      <a:ln w="28575" cap="rnd">
+        <a:solidFill>
+          <a:schemeClr val="phClr"/>
+        </a:solidFill>
+        <a:round/>
+      </a:ln>
+    </cs:spPr>
+  </cs:dataPointLine>
+  <cs:dataPointMarker>
+    <cs:lnRef idx="0">
+      <cs:styleClr val="auto"/>
+    </cs:lnRef>
+    <cs:fillRef idx="1">
+      <cs:styleClr val="auto"/>
+    </cs:fillRef>
+    <cs:effectRef idx="0"/>
+    <cs:fontRef idx="minor">
+      <a:schemeClr val="tx1"/>
+    </cs:fontRef>
+    <cs:spPr>
+      <a:ln w="9525">
+        <a:solidFill>
+          <a:schemeClr val="phClr"/>
+        </a:solidFill>
+      </a:ln>
+    </cs:spPr>
+  </cs:dataPointMarker>
+  <cs:dataPointMarkerLayout symbol="circle" size="5"/>
+  <cs:dataPointWireframe>
+    <cs:lnRef idx="0">
+      <cs:styleClr val="auto"/>
+    </cs:lnRef>
+    <cs:fillRef idx="0"/>
+    <cs:effectRef idx="0"/>
+    <cs:fontRef idx="minor">
+      <a:schemeClr val="tx1"/>
+    </cs:fontRef>
+    <cs:spPr>
+      <a:ln w="9525" cap="rnd">
+        <a:solidFill>
+          <a:schemeClr val="phClr"/>
+        </a:solidFill>
+        <a:round/>
+      </a:ln>
+    </cs:spPr>
+  </cs:dataPointWireframe>
+  <cs:dataTable>
+    <cs:lnRef idx="0"/>
+    <cs:fillRef idx="0"/>
+    <cs:effectRef idx="0"/>
+    <cs:fontRef idx="minor">
+      <a:schemeClr val="tx1">
+        <a:lumMod val="65000"/>
+        <a:lumOff val="35000"/>
+      </a:schemeClr>
+    </cs:fontRef>
+    <cs:spPr>
+      <a:noFill/>
+      <a:ln w="9525" cap="flat" cmpd="sng" algn="ctr">
+        <a:solidFill>
+          <a:schemeClr val="tx1">
+            <a:lumMod val="15000"/>
+            <a:lumOff val="85000"/>
+          </a:schemeClr>
+        </a:solidFill>
+        <a:round/>
+      </a:ln>
+    </cs:spPr>
+    <cs:defRPr sz="1197" kern="1200"/>
+  </cs:dataTable>
+  <cs:downBar>
+    <cs:lnRef idx="0"/>
+    <cs:fillRef idx="0"/>
+    <cs:effectRef idx="0"/>
+    <cs:fontRef idx="minor">
+      <a:schemeClr val="tx1"/>
+    </cs:fontRef>
+    <cs:spPr>
+      <a:solidFill>
+        <a:schemeClr val="dk1">
+          <a:lumMod val="75000"/>
+          <a:lumOff val="25000"/>
+        </a:schemeClr>
+      </a:solidFill>
+      <a:ln w="9525" cap="flat" cmpd="sng" algn="ctr">
+        <a:solidFill>
+          <a:schemeClr val="tx1">
+            <a:lumMod val="65000"/>
+            <a:lumOff val="35000"/>
+          </a:schemeClr>
+        </a:solidFill>
+        <a:round/>
+      </a:ln>
+    </cs:spPr>
+  </cs:downBar>
+  <cs:dropLine>
+    <cs:lnRef idx="0"/>
+    <cs:fillRef idx="0"/>
+    <cs:effectRef idx="0"/>
+    <cs:fontRef idx="minor">
+      <a:schemeClr val="tx1"/>
+    </cs:fontRef>
+    <cs:spPr>
+      <a:ln w="9525" cap="flat" cmpd="sng" algn="ctr">
+        <a:solidFill>
+          <a:schemeClr val="tx1">
+            <a:lumMod val="35000"/>
+            <a:lumOff val="65000"/>
+          </a:schemeClr>
+        </a:solidFill>
+        <a:round/>
+      </a:ln>
+    </cs:spPr>
+  </cs:dropLine>
+  <cs:errorBar>
+    <cs:lnRef idx="0"/>
+    <cs:fillRef idx="0"/>
+    <cs:effectRef idx="0"/>
+    <cs:fontRef idx="minor">
+      <a:schemeClr val="tx1"/>
+    </cs:fontRef>
+    <cs:spPr>
+      <a:ln w="9525" cap="flat" cmpd="sng" algn="ctr">
+        <a:solidFill>
+          <a:schemeClr val="tx1">
+            <a:lumMod val="65000"/>
+            <a:lumOff val="35000"/>
+          </a:schemeClr>
+        </a:solidFill>
+        <a:round/>
+      </a:ln>
+    </cs:spPr>
+  </cs:errorBar>
+  <cs:floor>
+    <cs:lnRef idx="0"/>
+    <cs:fillRef idx="0"/>
+    <cs:effectRef idx="0"/>
+    <cs:fontRef idx="minor">
+      <a:schemeClr val="tx1"/>
+    </cs:fontRef>
+    <cs:spPr>
+      <a:noFill/>
+      <a:ln>
+        <a:noFill/>
+      </a:ln>
+    </cs:spPr>
+  </cs:floor>
+  <cs:gridlineMajor>
+    <cs:lnRef idx="0"/>
+    <cs:fillRef idx="0"/>
+    <cs:effectRef idx="0"/>
+    <cs:fontRef idx="minor">
+      <a:schemeClr val="tx1"/>
+    </cs:fontRef>
+    <cs:spPr>
+      <a:ln w="9525" cap="flat" cmpd="sng" algn="ctr">
+        <a:solidFill>
+          <a:schemeClr val="tx1">
+            <a:lumMod val="15000"/>
+            <a:lumOff val="85000"/>
+          </a:schemeClr>
+        </a:solidFill>
+        <a:round/>
+      </a:ln>
+    </cs:spPr>
+  </cs:gridlineMajor>
+  <cs:gridlineMinor>
+    <cs:lnRef idx="0"/>
+    <cs:fillRef idx="0"/>
+    <cs:effectRef idx="0"/>
+    <cs:fontRef idx="minor">
+      <a:schemeClr val="tx1"/>
+    </cs:fontRef>
+    <cs:spPr>
+      <a:ln w="9525" cap="flat" cmpd="sng" algn="ctr">
+        <a:solidFill>
+          <a:schemeClr val="tx1">
+            <a:lumMod val="5000"/>
+            <a:lumOff val="95000"/>
+          </a:schemeClr>
+        </a:solidFill>
+        <a:round/>
+      </a:ln>
+    </cs:spPr>
+  </cs:gridlineMinor>
+  <cs:hiLoLine>
+    <cs:lnRef idx="0"/>
+    <cs:fillRef idx="0"/>
+    <cs:effectRef idx="0"/>
+    <cs:fontRef idx="minor">
+      <a:schemeClr val="tx1"/>
+    </cs:fontRef>
+    <cs:spPr>
+      <a:ln w="9525" cap="flat" cmpd="sng" algn="ctr">
+        <a:solidFill>
+          <a:schemeClr val="tx1">
+            <a:lumMod val="50000"/>
+            <a:lumOff val="50000"/>
+          </a:schemeClr>
+        </a:solidFill>
+        <a:round/>
+      </a:ln>
+    </cs:spPr>
+  </cs:hiLoLine>
+  <cs:leaderLine>
+    <cs:lnRef idx="0"/>
+    <cs:fillRef idx="0"/>
+    <cs:effectRef idx="0"/>
+    <cs:fontRef idx="minor">
+      <a:schemeClr val="tx1"/>
+    </cs:fontRef>
+    <cs:spPr>
+      <a:ln w="9525" cap="flat" cmpd="sng" algn="ctr">
+        <a:solidFill>
+          <a:schemeClr val="tx1">
+            <a:lumMod val="35000"/>
+            <a:lumOff val="65000"/>
+          </a:schemeClr>
+        </a:solidFill>
+        <a:round/>
+      </a:ln>
+    </cs:spPr>
+  </cs:leaderLine>
+  <cs:legend>
+    <cs:lnRef idx="0"/>
+    <cs:fillRef idx="0"/>
+    <cs:effectRef idx="0"/>
+    <cs:fontRef idx="minor">
+      <a:schemeClr val="tx1">
+        <a:lumMod val="65000"/>
+        <a:lumOff val="35000"/>
+      </a:schemeClr>
+    </cs:fontRef>
+    <cs:defRPr sz="1197" kern="1200"/>
+  </cs:legend>
+  <cs:plotArea mods="allowNoFillOverride allowNoLineOverride">
+    <cs:lnRef idx="0"/>
+    <cs:fillRef idx="0"/>
+    <cs:effectRef idx="0"/>
+    <cs:fontRef idx="minor">
+      <a:schemeClr val="tx1"/>
+    </cs:fontRef>
+  </cs:plotArea>
+  <cs:plotArea3D mods="allowNoFillOverride allowNoLineOverride">
+    <cs:lnRef idx="0"/>
+    <cs:fillRef idx="0"/>
+    <cs:effectRef idx="0"/>
+    <cs:fontRef idx="minor">
+      <a:schemeClr val="tx1"/>
+    </cs:fontRef>
+  </cs:plotArea3D>
+  <cs:seriesAxis>
+    <cs:lnRef idx="0"/>
+    <cs:fillRef idx="0"/>
+    <cs:effectRef idx="0"/>
+    <cs:fontRef idx="minor">
+      <a:schemeClr val="tx1">
+        <a:lumMod val="65000"/>
+        <a:lumOff val="35000"/>
+      </a:schemeClr>
+    </cs:fontRef>
+    <cs:defRPr sz="1197" kern="1200"/>
+  </cs:seriesAxis>
+  <cs:seriesLine>
+    <cs:lnRef idx="0"/>
+    <cs:fillRef idx="0"/>
+    <cs:effectRef idx="0"/>
+    <cs:fontRef idx="minor">
+      <a:schemeClr val="tx1"/>
+    </cs:fontRef>
+    <cs:spPr>
+      <a:ln w="9525" cap="flat" cmpd="sng" algn="ctr">
+        <a:solidFill>
+          <a:schemeClr val="tx1">
+            <a:lumMod val="35000"/>
+            <a:lumOff val="65000"/>
+          </a:schemeClr>
+        </a:solidFill>
+        <a:round/>
+      </a:ln>
+    </cs:spPr>
+  </cs:seriesLine>
+  <cs:title>
+    <cs:lnRef idx="0"/>
+    <cs:fillRef idx="0"/>
+    <cs:effectRef idx="0"/>
+    <cs:fontRef idx="minor">
+      <a:schemeClr val="tx1">
+        <a:lumMod val="65000"/>
+        <a:lumOff val="35000"/>
+      </a:schemeClr>
+    </cs:fontRef>
+    <cs:defRPr sz="1862" b="0" kern="1200" spc="0" baseline="0"/>
+  </cs:title>
+  <cs:trendline>
+    <cs:lnRef idx="0">
+      <cs:styleClr val="auto"/>
+    </cs:lnRef>
+    <cs:fillRef idx="0"/>
+    <cs:effectRef idx="0"/>
+    <cs:fontRef idx="minor">
+      <a:schemeClr val="tx1"/>
+    </cs:fontRef>
+    <cs:spPr>
+      <a:ln w="19050" cap="rnd">
+        <a:solidFill>
+          <a:schemeClr val="phClr"/>
+        </a:solidFill>
+        <a:prstDash val="sysDot"/>
+      </a:ln>
+    </cs:spPr>
+  </cs:trendline>
+  <cs:trendlineLabel>
+    <cs:lnRef idx="0"/>
+    <cs:fillRef idx="0"/>
+    <cs:effectRef idx="0"/>
+    <cs:fontRef idx="minor">
+      <a:schemeClr val="tx1">
+        <a:lumMod val="65000"/>
+        <a:lumOff val="35000"/>
+      </a:schemeClr>
+    </cs:fontRef>
+    <cs:defRPr sz="1197" kern="1200"/>
+  </cs:trendlineLabel>
+  <cs:upBar>
+    <cs:lnRef idx="0"/>
+    <cs:fillRef idx="0"/>
+    <cs:effectRef idx="0"/>
+    <cs:fontRef idx="minor">
+      <a:schemeClr val="tx1"/>
+    </cs:fontRef>
+    <cs:spPr>
+      <a:solidFill>
+        <a:schemeClr val="lt1"/>
+      </a:solidFill>
+      <a:ln w="9525" cap="flat" cmpd="sng" algn="ctr">
+        <a:solidFill>
+          <a:schemeClr val="tx1">
+            <a:lumMod val="65000"/>
+            <a:lumOff val="35000"/>
+          </a:schemeClr>
+        </a:solidFill>
+        <a:round/>
+      </a:ln>
+    </cs:spPr>
+  </cs:upBar>
+  <cs:valueAxis>
+    <cs:lnRef idx="0"/>
+    <cs:fillRef idx="0"/>
+    <cs:effectRef idx="0"/>
+    <cs:fontRef idx="minor">
+      <a:schemeClr val="tx1">
+        <a:lumMod val="65000"/>
+        <a:lumOff val="35000"/>
+      </a:schemeClr>
+    </cs:fontRef>
+    <cs:defRPr sz="1197" kern="1200"/>
+  </cs:valueAxis>
+  <cs:wall>
+    <cs:lnRef idx="0"/>
+    <cs:fillRef idx="0"/>
+    <cs:effectRef idx="0"/>
+    <cs:fontRef idx="minor">
+      <a:schemeClr val="tx1"/>
+    </cs:fontRef>
+    <cs:spPr>
+      <a:noFill/>
+      <a:ln>
+        <a:noFill/>
+      </a:ln>
+    </cs:spPr>
+  </cs:wall>
+</cs:chartStyle>
 </file>
 
 <file path=ppt/slideLayouts/slideLayout1.xml><?xml version="1.0" encoding="utf-8"?>
@@ -493,10 +1724,9 @@
           </a:lstStyle>
           <a:p>
             <a:r>
-              <a:rPr kumimoji="0" lang="en-US" smtClean="0"/>
+              <a:rPr kumimoji="0" lang="en-US"/>
               <a:t>Click to edit Master title style</a:t>
             </a:r>
-            <a:endParaRPr kumimoji="0" lang="en-US"/>
           </a:p>
         </p:txBody>
       </p:sp>
@@ -558,10 +1788,9 @@
           </a:lstStyle>
           <a:p>
             <a:r>
-              <a:rPr kumimoji="0" lang="en-US" smtClean="0"/>
+              <a:rPr kumimoji="0" lang="en-US"/>
               <a:t>Click to edit Master subtitle style</a:t>
             </a:r>
-            <a:endParaRPr kumimoji="0" lang="en-US"/>
           </a:p>
         </p:txBody>
       </p:sp>
@@ -578,14 +1807,12 @@
         <p:spPr/>
         <p:txBody>
           <a:bodyPr/>
-          <a:lstStyle>
-            <a:extLst/>
-          </a:lstStyle>
+          <a:lstStyle/>
           <a:p>
             <a:fld id="{782AB740-377D-4BC2-A984-084B0CA75466}" type="datetimeFigureOut">
               <a:rPr lang="hr-HR" smtClean="0"/>
               <a:pPr/>
-              <a:t>7.9.2019.</a:t>
+              <a:t>8.9.2021.</a:t>
             </a:fld>
             <a:endParaRPr lang="hr-HR"/>
           </a:p>
@@ -604,9 +1831,7 @@
         <p:spPr/>
         <p:txBody>
           <a:bodyPr/>
-          <a:lstStyle>
-            <a:extLst/>
-          </a:lstStyle>
+          <a:lstStyle/>
           <a:p>
             <a:endParaRPr lang="hr-HR"/>
           </a:p>
@@ -625,9 +1850,7 @@
         <p:spPr/>
         <p:txBody>
           <a:bodyPr/>
-          <a:lstStyle>
-            <a:extLst/>
-          </a:lstStyle>
+          <a:lstStyle/>
           <a:p>
             <a:fld id="{CEC22FF6-AD52-4816-A8EF-A3037EBC3E0C}" type="slidenum">
               <a:rPr lang="hr-HR" smtClean="0"/>
@@ -716,9 +1939,7 @@
         </p:style>
         <p:txBody>
           <a:bodyPr anchor="ctr"/>
-          <a:lstStyle>
-            <a:extLst/>
-          </a:lstStyle>
+          <a:lstStyle/>
           <a:p>
             <a:pPr algn="ctr" eaLnBrk="1" latinLnBrk="0" hangingPunct="1"/>
             <a:endParaRPr kumimoji="0" lang="en-US"/>
@@ -767,9 +1988,7 @@
         </p:style>
         <p:txBody>
           <a:bodyPr anchor="ctr"/>
-          <a:lstStyle>
-            <a:extLst/>
-          </a:lstStyle>
+          <a:lstStyle/>
           <a:p>
             <a:pPr algn="ctr" eaLnBrk="1" latinLnBrk="0" hangingPunct="1"/>
             <a:endParaRPr kumimoji="0" lang="en-US"/>
@@ -814,93 +2033,86 @@
         <p:spPr/>
         <p:txBody>
           <a:bodyPr/>
-          <a:lstStyle>
-            <a:extLst/>
-          </a:lstStyle>
-          <a:p>
-            <a:r>
-              <a:rPr kumimoji="0" lang="en-US" smtClean="0"/>
+          <a:lstStyle/>
+          <a:p>
+            <a:r>
+              <a:rPr kumimoji="0" lang="en-US"/>
               <a:t>Click to edit Master title style</a:t>
             </a:r>
+          </a:p>
+        </p:txBody>
+      </p:sp>
+      <p:sp>
+        <p:nvSpPr>
+          <p:cNvPr id="3" name="Vertical Text Placeholder 2"/>
+          <p:cNvSpPr>
+            <a:spLocks noGrp="1"/>
+          </p:cNvSpPr>
+          <p:nvPr>
+            <p:ph type="body" orient="vert" idx="1"/>
+          </p:nvPr>
+        </p:nvSpPr>
+        <p:spPr/>
+        <p:txBody>
+          <a:bodyPr vert="eaVert"/>
+          <a:lstStyle/>
+          <a:p>
+            <a:pPr lvl="0" eaLnBrk="1" latinLnBrk="0" hangingPunct="1"/>
+            <a:r>
+              <a:rPr lang="en-US"/>
+              <a:t>Click to edit Master text styles</a:t>
+            </a:r>
+          </a:p>
+          <a:p>
+            <a:pPr lvl="1" eaLnBrk="1" latinLnBrk="0" hangingPunct="1"/>
+            <a:r>
+              <a:rPr lang="en-US"/>
+              <a:t>Second level</a:t>
+            </a:r>
+          </a:p>
+          <a:p>
+            <a:pPr lvl="2" eaLnBrk="1" latinLnBrk="0" hangingPunct="1"/>
+            <a:r>
+              <a:rPr lang="en-US"/>
+              <a:t>Third level</a:t>
+            </a:r>
+          </a:p>
+          <a:p>
+            <a:pPr lvl="3" eaLnBrk="1" latinLnBrk="0" hangingPunct="1"/>
+            <a:r>
+              <a:rPr lang="en-US"/>
+              <a:t>Fourth level</a:t>
+            </a:r>
+          </a:p>
+          <a:p>
+            <a:pPr lvl="4" eaLnBrk="1" latinLnBrk="0" hangingPunct="1"/>
+            <a:r>
+              <a:rPr lang="en-US"/>
+              <a:t>Fifth level</a:t>
+            </a:r>
             <a:endParaRPr kumimoji="0" lang="en-US"/>
           </a:p>
         </p:txBody>
       </p:sp>
       <p:sp>
         <p:nvSpPr>
-          <p:cNvPr id="3" name="Vertical Text Placeholder 2"/>
-          <p:cNvSpPr>
-            <a:spLocks noGrp="1"/>
-          </p:cNvSpPr>
-          <p:nvPr>
-            <p:ph type="body" orient="vert" idx="1"/>
+          <p:cNvPr id="4" name="Date Placeholder 3"/>
+          <p:cNvSpPr>
+            <a:spLocks noGrp="1"/>
+          </p:cNvSpPr>
+          <p:nvPr>
+            <p:ph type="dt" sz="half" idx="10"/>
           </p:nvPr>
         </p:nvSpPr>
         <p:spPr/>
         <p:txBody>
-          <a:bodyPr vert="eaVert"/>
-          <a:lstStyle>
-            <a:extLst/>
-          </a:lstStyle>
-          <a:p>
-            <a:pPr lvl="0" eaLnBrk="1" latinLnBrk="0" hangingPunct="1"/>
-            <a:r>
-              <a:rPr lang="en-US" smtClean="0"/>
-              <a:t>Click to edit Master text styles</a:t>
-            </a:r>
-          </a:p>
-          <a:p>
-            <a:pPr lvl="1" eaLnBrk="1" latinLnBrk="0" hangingPunct="1"/>
-            <a:r>
-              <a:rPr lang="en-US" smtClean="0"/>
-              <a:t>Second level</a:t>
-            </a:r>
-          </a:p>
-          <a:p>
-            <a:pPr lvl="2" eaLnBrk="1" latinLnBrk="0" hangingPunct="1"/>
-            <a:r>
-              <a:rPr lang="en-US" smtClean="0"/>
-              <a:t>Third level</a:t>
-            </a:r>
-          </a:p>
-          <a:p>
-            <a:pPr lvl="3" eaLnBrk="1" latinLnBrk="0" hangingPunct="1"/>
-            <a:r>
-              <a:rPr lang="en-US" smtClean="0"/>
-              <a:t>Fourth level</a:t>
-            </a:r>
-          </a:p>
-          <a:p>
-            <a:pPr lvl="4" eaLnBrk="1" latinLnBrk="0" hangingPunct="1"/>
-            <a:r>
-              <a:rPr lang="en-US" smtClean="0"/>
-              <a:t>Fifth level</a:t>
-            </a:r>
-            <a:endParaRPr kumimoji="0" lang="en-US"/>
-          </a:p>
-        </p:txBody>
-      </p:sp>
-      <p:sp>
-        <p:nvSpPr>
-          <p:cNvPr id="4" name="Date Placeholder 3"/>
-          <p:cNvSpPr>
-            <a:spLocks noGrp="1"/>
-          </p:cNvSpPr>
-          <p:nvPr>
-            <p:ph type="dt" sz="half" idx="10"/>
-          </p:nvPr>
-        </p:nvSpPr>
-        <p:spPr/>
-        <p:txBody>
           <a:bodyPr/>
-          <a:lstStyle>
-            <a:extLst/>
-          </a:lstStyle>
+          <a:lstStyle/>
           <a:p>
             <a:fld id="{782AB740-377D-4BC2-A984-084B0CA75466}" type="datetimeFigureOut">
               <a:rPr lang="hr-HR" smtClean="0"/>
               <a:pPr/>
-              <a:t>7.9.2019.</a:t>
+              <a:t>8.9.2021.</a:t>
             </a:fld>
             <a:endParaRPr lang="hr-HR"/>
           </a:p>
@@ -919,9 +2131,7 @@
         <p:spPr/>
         <p:txBody>
           <a:bodyPr/>
-          <a:lstStyle>
-            <a:extLst/>
-          </a:lstStyle>
+          <a:lstStyle/>
           <a:p>
             <a:endParaRPr lang="hr-HR"/>
           </a:p>
@@ -940,9 +2150,7 @@
         <p:spPr/>
         <p:txBody>
           <a:bodyPr/>
-          <a:lstStyle>
-            <a:extLst/>
-          </a:lstStyle>
+          <a:lstStyle/>
           <a:p>
             <a:fld id="{CEC22FF6-AD52-4816-A8EF-A3037EBC3E0C}" type="slidenum">
               <a:rPr lang="hr-HR" smtClean="0"/>
@@ -996,15 +2204,12 @@
         </p:spPr>
         <p:txBody>
           <a:bodyPr vert="eaVert"/>
-          <a:lstStyle>
-            <a:extLst/>
-          </a:lstStyle>
-          <a:p>
-            <a:r>
-              <a:rPr kumimoji="0" lang="en-US" smtClean="0"/>
+          <a:lstStyle/>
+          <a:p>
+            <a:r>
+              <a:rPr kumimoji="0" lang="en-US"/>
               <a:t>Click to edit Master title style</a:t>
             </a:r>
-            <a:endParaRPr kumimoji="0" lang="en-US"/>
           </a:p>
         </p:txBody>
       </p:sp>
@@ -1026,41 +2231,39 @@
         </p:spPr>
         <p:txBody>
           <a:bodyPr vert="eaVert"/>
-          <a:lstStyle>
-            <a:extLst/>
-          </a:lstStyle>
+          <a:lstStyle/>
           <a:p>
             <a:pPr lvl="0" eaLnBrk="1" latinLnBrk="0" hangingPunct="1"/>
             <a:r>
-              <a:rPr lang="en-US" smtClean="0"/>
+              <a:rPr lang="en-US"/>
               <a:t>Click to edit Master text styles</a:t>
             </a:r>
           </a:p>
           <a:p>
             <a:pPr lvl="1" eaLnBrk="1" latinLnBrk="0" hangingPunct="1"/>
             <a:r>
-              <a:rPr lang="en-US" smtClean="0"/>
+              <a:rPr lang="en-US"/>
               <a:t>Second level</a:t>
             </a:r>
           </a:p>
           <a:p>
             <a:pPr lvl="2" eaLnBrk="1" latinLnBrk="0" hangingPunct="1"/>
             <a:r>
-              <a:rPr lang="en-US" smtClean="0"/>
+              <a:rPr lang="en-US"/>
               <a:t>Third level</a:t>
             </a:r>
           </a:p>
           <a:p>
             <a:pPr lvl="3" eaLnBrk="1" latinLnBrk="0" hangingPunct="1"/>
             <a:r>
-              <a:rPr lang="en-US" smtClean="0"/>
+              <a:rPr lang="en-US"/>
               <a:t>Fourth level</a:t>
             </a:r>
           </a:p>
           <a:p>
             <a:pPr lvl="4" eaLnBrk="1" latinLnBrk="0" hangingPunct="1"/>
             <a:r>
-              <a:rPr lang="en-US" smtClean="0"/>
+              <a:rPr lang="en-US"/>
               <a:t>Fifth level</a:t>
             </a:r>
             <a:endParaRPr kumimoji="0" lang="en-US"/>
@@ -1080,14 +2283,12 @@
         <p:spPr/>
         <p:txBody>
           <a:bodyPr/>
-          <a:lstStyle>
-            <a:extLst/>
-          </a:lstStyle>
+          <a:lstStyle/>
           <a:p>
             <a:fld id="{782AB740-377D-4BC2-A984-084B0CA75466}" type="datetimeFigureOut">
               <a:rPr lang="hr-HR" smtClean="0"/>
               <a:pPr/>
-              <a:t>7.9.2019.</a:t>
+              <a:t>8.9.2021.</a:t>
             </a:fld>
             <a:endParaRPr lang="hr-HR"/>
           </a:p>
@@ -1106,9 +2307,7 @@
         <p:spPr/>
         <p:txBody>
           <a:bodyPr/>
-          <a:lstStyle>
-            <a:extLst/>
-          </a:lstStyle>
+          <a:lstStyle/>
           <a:p>
             <a:endParaRPr lang="hr-HR"/>
           </a:p>
@@ -1127,9 +2326,7 @@
         <p:spPr/>
         <p:txBody>
           <a:bodyPr/>
-          <a:lstStyle>
-            <a:extLst/>
-          </a:lstStyle>
+          <a:lstStyle/>
           <a:p>
             <a:fld id="{CEC22FF6-AD52-4816-A8EF-A3037EBC3E0C}" type="slidenum">
               <a:rPr lang="hr-HR" smtClean="0"/>
@@ -1178,93 +2375,86 @@
         <p:spPr/>
         <p:txBody>
           <a:bodyPr/>
-          <a:lstStyle>
-            <a:extLst/>
-          </a:lstStyle>
-          <a:p>
-            <a:r>
-              <a:rPr kumimoji="0" lang="en-US" smtClean="0"/>
+          <a:lstStyle/>
+          <a:p>
+            <a:r>
+              <a:rPr kumimoji="0" lang="en-US"/>
               <a:t>Click to edit Master title style</a:t>
             </a:r>
+          </a:p>
+        </p:txBody>
+      </p:sp>
+      <p:sp>
+        <p:nvSpPr>
+          <p:cNvPr id="3" name="Content Placeholder 2"/>
+          <p:cNvSpPr>
+            <a:spLocks noGrp="1"/>
+          </p:cNvSpPr>
+          <p:nvPr>
+            <p:ph idx="1"/>
+          </p:nvPr>
+        </p:nvSpPr>
+        <p:spPr/>
+        <p:txBody>
+          <a:bodyPr/>
+          <a:lstStyle/>
+          <a:p>
+            <a:pPr lvl="0" eaLnBrk="1" latinLnBrk="0" hangingPunct="1"/>
+            <a:r>
+              <a:rPr lang="en-US"/>
+              <a:t>Click to edit Master text styles</a:t>
+            </a:r>
+          </a:p>
+          <a:p>
+            <a:pPr lvl="1" eaLnBrk="1" latinLnBrk="0" hangingPunct="1"/>
+            <a:r>
+              <a:rPr lang="en-US"/>
+              <a:t>Second level</a:t>
+            </a:r>
+          </a:p>
+          <a:p>
+            <a:pPr lvl="2" eaLnBrk="1" latinLnBrk="0" hangingPunct="1"/>
+            <a:r>
+              <a:rPr lang="en-US"/>
+              <a:t>Third level</a:t>
+            </a:r>
+          </a:p>
+          <a:p>
+            <a:pPr lvl="3" eaLnBrk="1" latinLnBrk="0" hangingPunct="1"/>
+            <a:r>
+              <a:rPr lang="en-US"/>
+              <a:t>Fourth level</a:t>
+            </a:r>
+          </a:p>
+          <a:p>
+            <a:pPr lvl="4" eaLnBrk="1" latinLnBrk="0" hangingPunct="1"/>
+            <a:r>
+              <a:rPr lang="en-US"/>
+              <a:t>Fifth level</a:t>
+            </a:r>
             <a:endParaRPr kumimoji="0" lang="en-US"/>
           </a:p>
         </p:txBody>
       </p:sp>
       <p:sp>
         <p:nvSpPr>
-          <p:cNvPr id="3" name="Content Placeholder 2"/>
-          <p:cNvSpPr>
-            <a:spLocks noGrp="1"/>
-          </p:cNvSpPr>
-          <p:nvPr>
-            <p:ph idx="1"/>
+          <p:cNvPr id="4" name="Date Placeholder 3"/>
+          <p:cNvSpPr>
+            <a:spLocks noGrp="1"/>
+          </p:cNvSpPr>
+          <p:nvPr>
+            <p:ph type="dt" sz="half" idx="10"/>
           </p:nvPr>
         </p:nvSpPr>
         <p:spPr/>
         <p:txBody>
           <a:bodyPr/>
-          <a:lstStyle>
-            <a:extLst/>
-          </a:lstStyle>
-          <a:p>
-            <a:pPr lvl="0" eaLnBrk="1" latinLnBrk="0" hangingPunct="1"/>
-            <a:r>
-              <a:rPr lang="en-US" smtClean="0"/>
-              <a:t>Click to edit Master text styles</a:t>
-            </a:r>
-          </a:p>
-          <a:p>
-            <a:pPr lvl="1" eaLnBrk="1" latinLnBrk="0" hangingPunct="1"/>
-            <a:r>
-              <a:rPr lang="en-US" smtClean="0"/>
-              <a:t>Second level</a:t>
-            </a:r>
-          </a:p>
-          <a:p>
-            <a:pPr lvl="2" eaLnBrk="1" latinLnBrk="0" hangingPunct="1"/>
-            <a:r>
-              <a:rPr lang="en-US" smtClean="0"/>
-              <a:t>Third level</a:t>
-            </a:r>
-          </a:p>
-          <a:p>
-            <a:pPr lvl="3" eaLnBrk="1" latinLnBrk="0" hangingPunct="1"/>
-            <a:r>
-              <a:rPr lang="en-US" smtClean="0"/>
-              <a:t>Fourth level</a:t>
-            </a:r>
-          </a:p>
-          <a:p>
-            <a:pPr lvl="4" eaLnBrk="1" latinLnBrk="0" hangingPunct="1"/>
-            <a:r>
-              <a:rPr lang="en-US" smtClean="0"/>
-              <a:t>Fifth level</a:t>
-            </a:r>
-            <a:endParaRPr kumimoji="0" lang="en-US"/>
-          </a:p>
-        </p:txBody>
-      </p:sp>
-      <p:sp>
-        <p:nvSpPr>
-          <p:cNvPr id="4" name="Date Placeholder 3"/>
-          <p:cNvSpPr>
-            <a:spLocks noGrp="1"/>
-          </p:cNvSpPr>
-          <p:nvPr>
-            <p:ph type="dt" sz="half" idx="10"/>
-          </p:nvPr>
-        </p:nvSpPr>
-        <p:spPr/>
-        <p:txBody>
-          <a:bodyPr/>
-          <a:lstStyle>
-            <a:extLst/>
-          </a:lstStyle>
+          <a:lstStyle/>
           <a:p>
             <a:fld id="{782AB740-377D-4BC2-A984-084B0CA75466}" type="datetimeFigureOut">
               <a:rPr lang="hr-HR" smtClean="0"/>
               <a:pPr/>
-              <a:t>7.9.2019.</a:t>
+              <a:t>8.9.2021.</a:t>
             </a:fld>
             <a:endParaRPr lang="hr-HR"/>
           </a:p>
@@ -1283,9 +2473,7 @@
         <p:spPr/>
         <p:txBody>
           <a:bodyPr/>
-          <a:lstStyle>
-            <a:extLst/>
-          </a:lstStyle>
+          <a:lstStyle/>
           <a:p>
             <a:endParaRPr lang="hr-HR"/>
           </a:p>
@@ -1304,9 +2492,7 @@
         <p:spPr/>
         <p:txBody>
           <a:bodyPr/>
-          <a:lstStyle>
-            <a:extLst/>
-          </a:lstStyle>
+          <a:lstStyle/>
           <a:p>
             <a:fld id="{CEC22FF6-AD52-4816-A8EF-A3037EBC3E0C}" type="slidenum">
               <a:rPr lang="hr-HR" smtClean="0"/>
@@ -1381,9 +2567,7 @@
         </p:style>
         <p:txBody>
           <a:bodyPr anchor="ctr"/>
-          <a:lstStyle>
-            <a:extLst/>
-          </a:lstStyle>
+          <a:lstStyle/>
           <a:p>
             <a:pPr algn="ctr" eaLnBrk="1" latinLnBrk="0" hangingPunct="1"/>
             <a:endParaRPr kumimoji="0" lang="en-US"/>
@@ -1420,10 +2604,9 @@
           </a:lstStyle>
           <a:p>
             <a:r>
-              <a:rPr kumimoji="0" lang="en-US" smtClean="0"/>
+              <a:rPr kumimoji="0" lang="en-US"/>
               <a:t>Click to edit Master title style</a:t>
             </a:r>
-            <a:endParaRPr kumimoji="0" lang="en-US"/>
           </a:p>
         </p:txBody>
       </p:sp>
@@ -1508,7 +2691,7 @@
           <a:p>
             <a:pPr lvl="0" eaLnBrk="1" latinLnBrk="0" hangingPunct="1"/>
             <a:r>
-              <a:rPr kumimoji="0" lang="en-US" smtClean="0"/>
+              <a:rPr kumimoji="0" lang="en-US"/>
               <a:t>Click to edit Master text styles</a:t>
             </a:r>
           </a:p>
@@ -1527,14 +2710,12 @@
         <p:spPr/>
         <p:txBody>
           <a:bodyPr/>
-          <a:lstStyle>
-            <a:extLst/>
-          </a:lstStyle>
+          <a:lstStyle/>
           <a:p>
             <a:fld id="{782AB740-377D-4BC2-A984-084B0CA75466}" type="datetimeFigureOut">
               <a:rPr lang="hr-HR" smtClean="0"/>
               <a:pPr/>
-              <a:t>7.9.2019.</a:t>
+              <a:t>8.9.2021.</a:t>
             </a:fld>
             <a:endParaRPr lang="hr-HR"/>
           </a:p>
@@ -1553,9 +2734,7 @@
         <p:spPr/>
         <p:txBody>
           <a:bodyPr/>
-          <a:lstStyle>
-            <a:extLst/>
-          </a:lstStyle>
+          <a:lstStyle/>
           <a:p>
             <a:endParaRPr lang="hr-HR"/>
           </a:p>
@@ -1574,9 +2753,7 @@
         <p:spPr/>
         <p:txBody>
           <a:bodyPr/>
-          <a:lstStyle>
-            <a:extLst/>
-          </a:lstStyle>
+          <a:lstStyle/>
           <a:p>
             <a:fld id="{CEC22FF6-AD52-4816-A8EF-A3037EBC3E0C}" type="slidenum">
               <a:rPr lang="hr-HR" smtClean="0"/>
@@ -1634,9 +2811,7 @@
         </p:style>
         <p:txBody>
           <a:bodyPr anchor="ctr"/>
-          <a:lstStyle>
-            <a:extLst/>
-          </a:lstStyle>
+          <a:lstStyle/>
           <a:p>
             <a:pPr algn="ctr" eaLnBrk="1" latinLnBrk="0" hangingPunct="1"/>
             <a:endParaRPr kumimoji="0" lang="en-US"/>
@@ -1721,9 +2896,7 @@
         </p:style>
         <p:txBody>
           <a:bodyPr anchor="ctr"/>
-          <a:lstStyle>
-            <a:extLst/>
-          </a:lstStyle>
+          <a:lstStyle/>
           <a:p>
             <a:pPr algn="ctr" eaLnBrk="1" latinLnBrk="0" hangingPunct="1"/>
             <a:endParaRPr kumimoji="0" lang="en-US"/>
@@ -1772,9 +2945,7 @@
         </p:style>
         <p:txBody>
           <a:bodyPr anchor="ctr"/>
-          <a:lstStyle>
-            <a:extLst/>
-          </a:lstStyle>
+          <a:lstStyle/>
           <a:p>
             <a:pPr algn="ctr" eaLnBrk="1" latinLnBrk="0" hangingPunct="1"/>
             <a:endParaRPr kumimoji="0" lang="en-US"/>
@@ -1824,15 +2995,12 @@
         </p:spPr>
         <p:txBody>
           <a:bodyPr/>
-          <a:lstStyle>
-            <a:extLst/>
-          </a:lstStyle>
-          <a:p>
-            <a:r>
-              <a:rPr kumimoji="0" lang="en-US" smtClean="0"/>
+          <a:lstStyle/>
+          <a:p>
+            <a:r>
+              <a:rPr kumimoji="0" lang="en-US"/>
               <a:t>Click to edit Master title style</a:t>
             </a:r>
-            <a:endParaRPr kumimoji="0" lang="en-US"/>
           </a:p>
         </p:txBody>
       </p:sp>
@@ -1875,35 +3043,35 @@
           <a:p>
             <a:pPr lvl="0" eaLnBrk="1" latinLnBrk="0" hangingPunct="1"/>
             <a:r>
-              <a:rPr lang="en-US" smtClean="0"/>
+              <a:rPr lang="en-US"/>
               <a:t>Click to edit Master text styles</a:t>
             </a:r>
           </a:p>
           <a:p>
             <a:pPr lvl="1" eaLnBrk="1" latinLnBrk="0" hangingPunct="1"/>
             <a:r>
-              <a:rPr lang="en-US" smtClean="0"/>
+              <a:rPr lang="en-US"/>
               <a:t>Second level</a:t>
             </a:r>
           </a:p>
           <a:p>
             <a:pPr lvl="2" eaLnBrk="1" latinLnBrk="0" hangingPunct="1"/>
             <a:r>
-              <a:rPr lang="en-US" smtClean="0"/>
+              <a:rPr lang="en-US"/>
               <a:t>Third level</a:t>
             </a:r>
           </a:p>
           <a:p>
             <a:pPr lvl="3" eaLnBrk="1" latinLnBrk="0" hangingPunct="1"/>
             <a:r>
-              <a:rPr lang="en-US" smtClean="0"/>
+              <a:rPr lang="en-US"/>
               <a:t>Fourth level</a:t>
             </a:r>
           </a:p>
           <a:p>
             <a:pPr lvl="4" eaLnBrk="1" latinLnBrk="0" hangingPunct="1"/>
             <a:r>
-              <a:rPr lang="en-US" smtClean="0"/>
+              <a:rPr lang="en-US"/>
               <a:t>Fifth level</a:t>
             </a:r>
             <a:endParaRPr kumimoji="0" lang="en-US"/>
@@ -1949,35 +3117,35 @@
           <a:p>
             <a:pPr lvl="0" eaLnBrk="1" latinLnBrk="0" hangingPunct="1"/>
             <a:r>
-              <a:rPr lang="en-US" smtClean="0"/>
+              <a:rPr lang="en-US"/>
               <a:t>Click to edit Master text styles</a:t>
             </a:r>
           </a:p>
           <a:p>
             <a:pPr lvl="1" eaLnBrk="1" latinLnBrk="0" hangingPunct="1"/>
             <a:r>
-              <a:rPr lang="en-US" smtClean="0"/>
+              <a:rPr lang="en-US"/>
               <a:t>Second level</a:t>
             </a:r>
           </a:p>
           <a:p>
             <a:pPr lvl="2" eaLnBrk="1" latinLnBrk="0" hangingPunct="1"/>
             <a:r>
-              <a:rPr lang="en-US" smtClean="0"/>
+              <a:rPr lang="en-US"/>
               <a:t>Third level</a:t>
             </a:r>
           </a:p>
           <a:p>
             <a:pPr lvl="3" eaLnBrk="1" latinLnBrk="0" hangingPunct="1"/>
             <a:r>
-              <a:rPr lang="en-US" smtClean="0"/>
+              <a:rPr lang="en-US"/>
               <a:t>Fourth level</a:t>
             </a:r>
           </a:p>
           <a:p>
             <a:pPr lvl="4" eaLnBrk="1" latinLnBrk="0" hangingPunct="1"/>
             <a:r>
-              <a:rPr lang="en-US" smtClean="0"/>
+              <a:rPr lang="en-US"/>
               <a:t>Fifth level</a:t>
             </a:r>
             <a:endParaRPr kumimoji="0" lang="en-US"/>
@@ -1997,14 +3165,12 @@
         <p:spPr/>
         <p:txBody>
           <a:bodyPr/>
-          <a:lstStyle>
-            <a:extLst/>
-          </a:lstStyle>
+          <a:lstStyle/>
           <a:p>
             <a:fld id="{782AB740-377D-4BC2-A984-084B0CA75466}" type="datetimeFigureOut">
               <a:rPr lang="hr-HR" smtClean="0"/>
               <a:pPr/>
-              <a:t>7.9.2019.</a:t>
+              <a:t>8.9.2021.</a:t>
             </a:fld>
             <a:endParaRPr lang="hr-HR"/>
           </a:p>
@@ -2023,9 +3189,7 @@
         <p:spPr/>
         <p:txBody>
           <a:bodyPr/>
-          <a:lstStyle>
-            <a:extLst/>
-          </a:lstStyle>
+          <a:lstStyle/>
           <a:p>
             <a:endParaRPr lang="hr-HR"/>
           </a:p>
@@ -2044,9 +3208,7 @@
         <p:spPr/>
         <p:txBody>
           <a:bodyPr/>
-          <a:lstStyle>
-            <a:extLst/>
-          </a:lstStyle>
+          <a:lstStyle/>
           <a:p>
             <a:fld id="{CEC22FF6-AD52-4816-A8EF-A3037EBC3E0C}" type="slidenum">
               <a:rPr lang="hr-HR" smtClean="0"/>
@@ -2108,10 +3270,9 @@
           </a:lstStyle>
           <a:p>
             <a:r>
-              <a:rPr kumimoji="0" lang="en-US" smtClean="0"/>
+              <a:rPr kumimoji="0" lang="en-US"/>
               <a:t>Click to edit Master title style</a:t>
             </a:r>
-            <a:endParaRPr kumimoji="0" lang="en-US"/>
           </a:p>
         </p:txBody>
       </p:sp>
@@ -2178,7 +3339,7 @@
           <a:p>
             <a:pPr lvl="0" eaLnBrk="1" latinLnBrk="0" hangingPunct="1"/>
             <a:r>
-              <a:rPr kumimoji="0" lang="en-US" smtClean="0"/>
+              <a:rPr kumimoji="0" lang="en-US"/>
               <a:t>Click to edit Master text styles</a:t>
             </a:r>
           </a:p>
@@ -2247,7 +3408,7 @@
           <a:p>
             <a:pPr lvl="0" eaLnBrk="1" latinLnBrk="0" hangingPunct="1"/>
             <a:r>
-              <a:rPr kumimoji="0" lang="en-US" smtClean="0"/>
+              <a:rPr kumimoji="0" lang="en-US"/>
               <a:t>Click to edit Master text styles</a:t>
             </a:r>
           </a:p>
@@ -2329,35 +3490,35 @@
           <a:p>
             <a:pPr lvl="0" eaLnBrk="1" latinLnBrk="0" hangingPunct="1"/>
             <a:r>
-              <a:rPr lang="en-US" smtClean="0"/>
+              <a:rPr lang="en-US"/>
               <a:t>Click to edit Master text styles</a:t>
             </a:r>
           </a:p>
           <a:p>
             <a:pPr lvl="1" eaLnBrk="1" latinLnBrk="0" hangingPunct="1"/>
             <a:r>
-              <a:rPr lang="en-US" smtClean="0"/>
+              <a:rPr lang="en-US"/>
               <a:t>Second level</a:t>
             </a:r>
           </a:p>
           <a:p>
             <a:pPr lvl="2" eaLnBrk="1" latinLnBrk="0" hangingPunct="1"/>
             <a:r>
-              <a:rPr lang="en-US" smtClean="0"/>
+              <a:rPr lang="en-US"/>
               <a:t>Third level</a:t>
             </a:r>
           </a:p>
           <a:p>
             <a:pPr lvl="3" eaLnBrk="1" latinLnBrk="0" hangingPunct="1"/>
             <a:r>
-              <a:rPr lang="en-US" smtClean="0"/>
+              <a:rPr lang="en-US"/>
               <a:t>Fourth level</a:t>
             </a:r>
           </a:p>
           <a:p>
             <a:pPr lvl="4" eaLnBrk="1" latinLnBrk="0" hangingPunct="1"/>
             <a:r>
-              <a:rPr lang="en-US" smtClean="0"/>
+              <a:rPr lang="en-US"/>
               <a:t>Fifth level</a:t>
             </a:r>
             <a:endParaRPr kumimoji="0" lang="en-US"/>
@@ -2440,35 +3601,35 @@
           <a:p>
             <a:pPr lvl="0" eaLnBrk="1" latinLnBrk="0" hangingPunct="1"/>
             <a:r>
-              <a:rPr lang="en-US" smtClean="0"/>
+              <a:rPr lang="en-US"/>
               <a:t>Click to edit Master text styles</a:t>
             </a:r>
           </a:p>
           <a:p>
             <a:pPr lvl="1" eaLnBrk="1" latinLnBrk="0" hangingPunct="1"/>
             <a:r>
-              <a:rPr lang="en-US" smtClean="0"/>
+              <a:rPr lang="en-US"/>
               <a:t>Second level</a:t>
             </a:r>
           </a:p>
           <a:p>
             <a:pPr lvl="2" eaLnBrk="1" latinLnBrk="0" hangingPunct="1"/>
             <a:r>
-              <a:rPr lang="en-US" smtClean="0"/>
+              <a:rPr lang="en-US"/>
               <a:t>Third level</a:t>
             </a:r>
           </a:p>
           <a:p>
             <a:pPr lvl="3" eaLnBrk="1" latinLnBrk="0" hangingPunct="1"/>
             <a:r>
-              <a:rPr lang="en-US" smtClean="0"/>
+              <a:rPr lang="en-US"/>
               <a:t>Fourth level</a:t>
             </a:r>
           </a:p>
           <a:p>
             <a:pPr lvl="4" eaLnBrk="1" latinLnBrk="0" hangingPunct="1"/>
             <a:r>
-              <a:rPr lang="en-US" smtClean="0"/>
+              <a:rPr lang="en-US"/>
               <a:t>Fifth level</a:t>
             </a:r>
             <a:endParaRPr kumimoji="0" lang="en-US"/>
@@ -2488,14 +3649,12 @@
         <p:spPr/>
         <p:txBody>
           <a:bodyPr/>
-          <a:lstStyle>
-            <a:extLst/>
-          </a:lstStyle>
+          <a:lstStyle/>
           <a:p>
             <a:fld id="{782AB740-377D-4BC2-A984-084B0CA75466}" type="datetimeFigureOut">
               <a:rPr lang="hr-HR" smtClean="0"/>
               <a:pPr/>
-              <a:t>7.9.2019.</a:t>
+              <a:t>8.9.2021.</a:t>
             </a:fld>
             <a:endParaRPr lang="hr-HR"/>
           </a:p>
@@ -2514,9 +3673,7 @@
         <p:spPr/>
         <p:txBody>
           <a:bodyPr/>
-          <a:lstStyle>
-            <a:extLst/>
-          </a:lstStyle>
+          <a:lstStyle/>
           <a:p>
             <a:endParaRPr lang="hr-HR"/>
           </a:p>
@@ -2535,9 +3692,7 @@
         <p:spPr/>
         <p:txBody>
           <a:bodyPr/>
-          <a:lstStyle>
-            <a:extLst/>
-          </a:lstStyle>
+          <a:lstStyle/>
           <a:p>
             <a:fld id="{CEC22FF6-AD52-4816-A8EF-A3037EBC3E0C}" type="slidenum">
               <a:rPr lang="hr-HR" smtClean="0"/>
@@ -2591,15 +3746,12 @@
         </p:spPr>
         <p:txBody>
           <a:bodyPr anchor="ctr"/>
-          <a:lstStyle>
-            <a:extLst/>
-          </a:lstStyle>
-          <a:p>
-            <a:r>
-              <a:rPr kumimoji="0" lang="en-US" smtClean="0"/>
+          <a:lstStyle/>
+          <a:p>
+            <a:r>
+              <a:rPr kumimoji="0" lang="en-US"/>
               <a:t>Click to edit Master title style</a:t>
             </a:r>
-            <a:endParaRPr kumimoji="0" lang="en-US"/>
           </a:p>
         </p:txBody>
       </p:sp>
@@ -2616,14 +3768,12 @@
         <p:spPr/>
         <p:txBody>
           <a:bodyPr/>
-          <a:lstStyle>
-            <a:extLst/>
-          </a:lstStyle>
+          <a:lstStyle/>
           <a:p>
             <a:fld id="{782AB740-377D-4BC2-A984-084B0CA75466}" type="datetimeFigureOut">
               <a:rPr lang="hr-HR" smtClean="0"/>
               <a:pPr/>
-              <a:t>7.9.2019.</a:t>
+              <a:t>8.9.2021.</a:t>
             </a:fld>
             <a:endParaRPr lang="hr-HR"/>
           </a:p>
@@ -2642,9 +3792,7 @@
         <p:spPr/>
         <p:txBody>
           <a:bodyPr/>
-          <a:lstStyle>
-            <a:extLst/>
-          </a:lstStyle>
+          <a:lstStyle/>
           <a:p>
             <a:endParaRPr lang="hr-HR"/>
           </a:p>
@@ -2663,9 +3811,7 @@
         <p:spPr/>
         <p:txBody>
           <a:bodyPr/>
-          <a:lstStyle>
-            <a:extLst/>
-          </a:lstStyle>
+          <a:lstStyle/>
           <a:p>
             <a:fld id="{CEC22FF6-AD52-4816-A8EF-A3037EBC3E0C}" type="slidenum">
               <a:rPr lang="hr-HR" smtClean="0"/>
@@ -2740,9 +3886,7 @@
         </p:style>
         <p:txBody>
           <a:bodyPr anchor="ctr"/>
-          <a:lstStyle>
-            <a:extLst/>
-          </a:lstStyle>
+          <a:lstStyle/>
           <a:p>
             <a:pPr algn="ctr" eaLnBrk="1" latinLnBrk="0" hangingPunct="1"/>
             <a:endParaRPr kumimoji="0" lang="en-US"/>
@@ -2762,14 +3906,12 @@
         <p:spPr/>
         <p:txBody>
           <a:bodyPr/>
-          <a:lstStyle>
-            <a:extLst/>
-          </a:lstStyle>
+          <a:lstStyle/>
           <a:p>
             <a:fld id="{782AB740-377D-4BC2-A984-084B0CA75466}" type="datetimeFigureOut">
               <a:rPr lang="hr-HR" smtClean="0"/>
               <a:pPr/>
-              <a:t>7.9.2019.</a:t>
+              <a:t>8.9.2021.</a:t>
             </a:fld>
             <a:endParaRPr lang="hr-HR"/>
           </a:p>
@@ -2788,9 +3930,7 @@
         <p:spPr/>
         <p:txBody>
           <a:bodyPr/>
-          <a:lstStyle>
-            <a:extLst/>
-          </a:lstStyle>
+          <a:lstStyle/>
           <a:p>
             <a:endParaRPr lang="hr-HR"/>
           </a:p>
@@ -2809,9 +3949,7 @@
         <p:spPr/>
         <p:txBody>
           <a:bodyPr/>
-          <a:lstStyle>
-            <a:extLst/>
-          </a:lstStyle>
+          <a:lstStyle/>
           <a:p>
             <a:fld id="{CEC22FF6-AD52-4816-A8EF-A3037EBC3E0C}" type="slidenum">
               <a:rPr lang="hr-HR" smtClean="0"/>
@@ -2869,9 +4007,7 @@
         </p:style>
         <p:txBody>
           <a:bodyPr anchor="ctr"/>
-          <a:lstStyle>
-            <a:extLst/>
-          </a:lstStyle>
+          <a:lstStyle/>
           <a:p>
             <a:pPr algn="ctr" eaLnBrk="1" latinLnBrk="0" hangingPunct="1"/>
             <a:endParaRPr kumimoji="0" lang="en-US"/>
@@ -2936,10 +4072,9 @@
           </a:lstStyle>
           <a:p>
             <a:r>
-              <a:rPr kumimoji="0" lang="en-US" smtClean="0"/>
+              <a:rPr kumimoji="0" lang="en-US"/>
               <a:t>Click to edit Master title style</a:t>
             </a:r>
-            <a:endParaRPr kumimoji="0" lang="en-US"/>
           </a:p>
         </p:txBody>
       </p:sp>
@@ -2993,7 +4128,7 @@
           <a:p>
             <a:pPr lvl="0" eaLnBrk="1" latinLnBrk="0" hangingPunct="1"/>
             <a:r>
-              <a:rPr kumimoji="0" lang="en-US" smtClean="0"/>
+              <a:rPr kumimoji="0" lang="en-US"/>
               <a:t>Click to edit Master text styles</a:t>
             </a:r>
           </a:p>
@@ -3038,35 +4173,35 @@
           <a:p>
             <a:pPr lvl="0" eaLnBrk="1" latinLnBrk="0" hangingPunct="1"/>
             <a:r>
-              <a:rPr lang="en-US" smtClean="0"/>
+              <a:rPr lang="en-US"/>
               <a:t>Click to edit Master text styles</a:t>
             </a:r>
           </a:p>
           <a:p>
             <a:pPr lvl="1" eaLnBrk="1" latinLnBrk="0" hangingPunct="1"/>
             <a:r>
-              <a:rPr lang="en-US" smtClean="0"/>
+              <a:rPr lang="en-US"/>
               <a:t>Second level</a:t>
             </a:r>
           </a:p>
           <a:p>
             <a:pPr lvl="2" eaLnBrk="1" latinLnBrk="0" hangingPunct="1"/>
             <a:r>
-              <a:rPr lang="en-US" smtClean="0"/>
+              <a:rPr lang="en-US"/>
               <a:t>Third level</a:t>
             </a:r>
           </a:p>
           <a:p>
             <a:pPr lvl="3" eaLnBrk="1" latinLnBrk="0" hangingPunct="1"/>
             <a:r>
-              <a:rPr lang="en-US" smtClean="0"/>
+              <a:rPr lang="en-US"/>
               <a:t>Fourth level</a:t>
             </a:r>
           </a:p>
           <a:p>
             <a:pPr lvl="4" eaLnBrk="1" latinLnBrk="0" hangingPunct="1"/>
             <a:r>
-              <a:rPr lang="en-US" smtClean="0"/>
+              <a:rPr lang="en-US"/>
               <a:t>Fifth level</a:t>
             </a:r>
             <a:endParaRPr kumimoji="0" lang="en-US"/>
@@ -3086,14 +4221,12 @@
         <p:spPr/>
         <p:txBody>
           <a:bodyPr/>
-          <a:lstStyle>
-            <a:extLst/>
-          </a:lstStyle>
+          <a:lstStyle/>
           <a:p>
             <a:fld id="{782AB740-377D-4BC2-A984-084B0CA75466}" type="datetimeFigureOut">
               <a:rPr lang="hr-HR" smtClean="0"/>
               <a:pPr/>
-              <a:t>7.9.2019.</a:t>
+              <a:t>8.9.2021.</a:t>
             </a:fld>
             <a:endParaRPr lang="hr-HR"/>
           </a:p>
@@ -3112,9 +4245,7 @@
         <p:spPr/>
         <p:txBody>
           <a:bodyPr/>
-          <a:lstStyle>
-            <a:extLst/>
-          </a:lstStyle>
+          <a:lstStyle/>
           <a:p>
             <a:endParaRPr lang="hr-HR"/>
           </a:p>
@@ -3133,9 +4264,7 @@
         <p:spPr/>
         <p:txBody>
           <a:bodyPr/>
-          <a:lstStyle>
-            <a:extLst/>
-          </a:lstStyle>
+          <a:lstStyle/>
           <a:p>
             <a:fld id="{CEC22FF6-AD52-4816-A8EF-A3037EBC3E0C}" type="slidenum">
               <a:rPr lang="hr-HR" smtClean="0"/>
@@ -3202,10 +4331,9 @@
           </a:lstStyle>
           <a:p>
             <a:r>
-              <a:rPr kumimoji="0" lang="en-US" smtClean="0"/>
+              <a:rPr kumimoji="0" lang="en-US"/>
               <a:t>Click to edit Master title style</a:t>
             </a:r>
-            <a:endParaRPr kumimoji="0" lang="en-US"/>
           </a:p>
         </p:txBody>
       </p:sp>
@@ -3222,14 +4350,12 @@
         <p:spPr/>
         <p:txBody>
           <a:bodyPr/>
-          <a:lstStyle>
-            <a:extLst/>
-          </a:lstStyle>
+          <a:lstStyle/>
           <a:p>
             <a:fld id="{782AB740-377D-4BC2-A984-084B0CA75466}" type="datetimeFigureOut">
               <a:rPr lang="hr-HR" smtClean="0"/>
               <a:pPr/>
-              <a:t>7.9.2019.</a:t>
+              <a:t>8.9.2021.</a:t>
             </a:fld>
             <a:endParaRPr lang="hr-HR"/>
           </a:p>
@@ -3248,9 +4374,7 @@
         <p:spPr/>
         <p:txBody>
           <a:bodyPr/>
-          <a:lstStyle>
-            <a:extLst/>
-          </a:lstStyle>
+          <a:lstStyle/>
           <a:p>
             <a:endParaRPr lang="hr-HR"/>
           </a:p>
@@ -3269,9 +4393,7 @@
         <p:spPr/>
         <p:txBody>
           <a:bodyPr/>
-          <a:lstStyle>
-            <a:extLst/>
-          </a:lstStyle>
+          <a:lstStyle/>
           <a:p>
             <a:fld id="{CEC22FF6-AD52-4816-A8EF-A3037EBC3E0C}" type="slidenum">
               <a:rPr lang="hr-HR" smtClean="0"/>
@@ -3329,9 +4451,7 @@
           <a:bodyPr lIns="91440" tIns="274320" rtlCol="0" anchor="t">
             <a:normAutofit/>
           </a:bodyPr>
-          <a:lstStyle>
-            <a:extLst/>
-          </a:lstStyle>
+          <a:lstStyle/>
           <a:p>
             <a:pPr marL="0" indent="-283464" algn="l" rtl="0" eaLnBrk="1" latinLnBrk="0" hangingPunct="1">
               <a:lnSpc>
@@ -3399,7 +4519,7 @@
           <a:p>
             <a:pPr marL="0" algn="l" eaLnBrk="1" latinLnBrk="0" hangingPunct="1"/>
             <a:r>
-              <a:rPr kumimoji="0" lang="en-US" smtClean="0"/>
+              <a:rPr kumimoji="0" lang="en-US"/>
               <a:t>Click icon to add picture</a:t>
             </a:r>
             <a:endParaRPr kumimoji="0" lang="en-US" dirty="0"/>
@@ -3459,9 +4579,7 @@
         </p:style>
         <p:txBody>
           <a:bodyPr anchor="ctr"/>
-          <a:lstStyle>
-            <a:extLst/>
-          </a:lstStyle>
+          <a:lstStyle/>
           <a:p>
             <a:pPr algn="ctr" eaLnBrk="1" latinLnBrk="0" hangingPunct="1"/>
             <a:endParaRPr kumimoji="0" lang="en-US"/>
@@ -3519,9 +4637,7 @@
         </p:style>
         <p:txBody>
           <a:bodyPr anchor="ctr"/>
-          <a:lstStyle>
-            <a:extLst/>
-          </a:lstStyle>
+          <a:lstStyle/>
           <a:p>
             <a:pPr algn="ctr" eaLnBrk="1" latinLnBrk="0" hangingPunct="1"/>
             <a:endParaRPr kumimoji="0" lang="en-US" dirty="0"/>
@@ -3578,7 +4694,7 @@
           <a:p>
             <a:pPr lvl="0" eaLnBrk="1" latinLnBrk="0" hangingPunct="1"/>
             <a:r>
-              <a:rPr kumimoji="0" lang="en-US" smtClean="0"/>
+              <a:rPr kumimoji="0" lang="en-US"/>
               <a:t>Click to edit Master text styles</a:t>
             </a:r>
           </a:p>
@@ -3666,9 +4782,7 @@
         </p:style>
         <p:txBody>
           <a:bodyPr anchor="ctr"/>
-          <a:lstStyle>
-            <a:extLst/>
-          </a:lstStyle>
+          <a:lstStyle/>
           <a:p>
             <a:pPr algn="ctr" eaLnBrk="1" latinLnBrk="0" hangingPunct="1"/>
             <a:endParaRPr kumimoji="0" lang="en-US"/>
@@ -3726,9 +4840,7 @@
         </p:style>
         <p:txBody>
           <a:bodyPr anchor="ctr"/>
-          <a:lstStyle>
-            <a:extLst/>
-          </a:lstStyle>
+          <a:lstStyle/>
           <a:p>
             <a:pPr algn="ctr" eaLnBrk="1" latinLnBrk="0" hangingPunct="1"/>
             <a:endParaRPr kumimoji="0" lang="en-US"/>
@@ -3818,9 +4930,7 @@
         </p:style>
         <p:txBody>
           <a:bodyPr anchor="ctr"/>
-          <a:lstStyle>
-            <a:extLst/>
-          </a:lstStyle>
+          <a:lstStyle/>
           <a:p>
             <a:pPr algn="ctr" eaLnBrk="1" latinLnBrk="0" hangingPunct="1"/>
             <a:endParaRPr kumimoji="0" lang="en-US"/>
@@ -3866,9 +4976,7 @@
         </p:style>
         <p:txBody>
           <a:bodyPr anchor="ctr"/>
-          <a:lstStyle>
-            <a:extLst/>
-          </a:lstStyle>
+          <a:lstStyle/>
           <a:p>
             <a:pPr algn="ctr" eaLnBrk="1" latinLnBrk="0" hangingPunct="1"/>
             <a:endParaRPr kumimoji="0" lang="en-US"/>
@@ -3898,15 +5006,12 @@
           <a:bodyPr anchor="ctr">
             <a:normAutofit/>
           </a:bodyPr>
-          <a:lstStyle>
-            <a:extLst/>
-          </a:lstStyle>
-          <a:p>
-            <a:r>
-              <a:rPr kumimoji="0" lang="en-US" smtClean="0"/>
+          <a:lstStyle/>
+          <a:p>
+            <a:r>
+              <a:rPr kumimoji="0" lang="en-US"/>
               <a:t>Click to edit Master title style</a:t>
             </a:r>
-            <a:endParaRPr kumimoji="0" lang="en-US"/>
           </a:p>
         </p:txBody>
       </p:sp>
@@ -3933,44 +5038,41 @@
           <a:bodyPr>
             <a:normAutofit/>
           </a:bodyPr>
-          <a:lstStyle>
-            <a:extLst/>
-          </a:lstStyle>
+          <a:lstStyle/>
           <a:p>
             <a:pPr lvl="0" eaLnBrk="1" latinLnBrk="0" hangingPunct="1"/>
             <a:r>
-              <a:rPr kumimoji="0" lang="en-US" smtClean="0"/>
+              <a:rPr kumimoji="0" lang="en-US"/>
               <a:t>Click to edit Master text styles</a:t>
             </a:r>
           </a:p>
           <a:p>
             <a:pPr lvl="1" eaLnBrk="1" latinLnBrk="0" hangingPunct="1"/>
             <a:r>
-              <a:rPr kumimoji="0" lang="en-US" smtClean="0"/>
+              <a:rPr kumimoji="0" lang="en-US"/>
               <a:t>Second level</a:t>
             </a:r>
           </a:p>
           <a:p>
             <a:pPr lvl="2" eaLnBrk="1" latinLnBrk="0" hangingPunct="1"/>
             <a:r>
-              <a:rPr kumimoji="0" lang="en-US" smtClean="0"/>
+              <a:rPr kumimoji="0" lang="en-US"/>
               <a:t>Third level</a:t>
             </a:r>
           </a:p>
           <a:p>
             <a:pPr lvl="3" eaLnBrk="1" latinLnBrk="0" hangingPunct="1"/>
             <a:r>
-              <a:rPr kumimoji="0" lang="en-US" smtClean="0"/>
+              <a:rPr kumimoji="0" lang="en-US"/>
               <a:t>Fourth level</a:t>
             </a:r>
           </a:p>
           <a:p>
             <a:pPr lvl="4" eaLnBrk="1" latinLnBrk="0" hangingPunct="1"/>
             <a:r>
-              <a:rPr kumimoji="0" lang="en-US" smtClean="0"/>
+              <a:rPr kumimoji="0" lang="en-US"/>
               <a:t>Fifth level</a:t>
             </a:r>
-            <a:endParaRPr kumimoji="0" lang="en-US"/>
           </a:p>
         </p:txBody>
       </p:sp>
@@ -4012,7 +5114,7 @@
             <a:fld id="{782AB740-377D-4BC2-A984-084B0CA75466}" type="datetimeFigureOut">
               <a:rPr lang="hr-HR" smtClean="0"/>
               <a:pPr/>
-              <a:t>7.9.2019.</a:t>
+              <a:t>8.9.2021.</a:t>
             </a:fld>
             <a:endParaRPr lang="hr-HR"/>
           </a:p>
@@ -4150,9 +5252,7 @@
         </p:style>
         <p:txBody>
           <a:bodyPr anchor="ctr"/>
-          <a:lstStyle>
-            <a:extLst/>
-          </a:lstStyle>
+          <a:lstStyle/>
           <a:p>
             <a:pPr algn="ctr" eaLnBrk="1" latinLnBrk="0" hangingPunct="1"/>
             <a:endParaRPr kumimoji="0" lang="en-US"/>
@@ -4525,7 +5625,7 @@
           <a:lstStyle/>
           <a:p>
             <a:r>
-              <a:rPr lang="en-US" dirty="0" smtClean="0"/>
+              <a:rPr lang="en-US" dirty="0"/>
               <a:t>Languages</a:t>
             </a:r>
             <a:endParaRPr lang="hr-HR" dirty="0"/>
@@ -4548,7 +5648,7 @@
           <a:lstStyle/>
           <a:p>
             <a:r>
-              <a:rPr lang="en-US" dirty="0" smtClean="0"/>
+              <a:rPr lang="en-US" dirty="0"/>
               <a:t>Usage analysis</a:t>
             </a:r>
             <a:endParaRPr lang="hr-HR" dirty="0"/>
@@ -4596,7 +5696,7 @@
           <a:lstStyle/>
           <a:p>
             <a:r>
-              <a:rPr lang="en-US" dirty="0" smtClean="0"/>
+              <a:rPr lang="en-US" dirty="0"/>
               <a:t>Language usage</a:t>
             </a:r>
             <a:endParaRPr lang="hr-HR" dirty="0"/>
@@ -4664,7 +5764,7 @@
           <a:lstStyle/>
           <a:p>
             <a:r>
-              <a:rPr lang="en-US" dirty="0" smtClean="0"/>
+              <a:rPr lang="en-US" dirty="0"/>
               <a:t>Language distribution</a:t>
             </a:r>
             <a:endParaRPr lang="hr-HR" dirty="0"/>
@@ -4679,6 +5779,11 @@
           </p:cNvGraphicFramePr>
           <p:nvPr>
             <p:ph idx="1"/>
+            <p:extLst>
+              <p:ext uri="{D42A27DB-BD31-4B8C-83A1-F6EECF244321}">
+                <p14:modId xmlns:p14="http://schemas.microsoft.com/office/powerpoint/2010/main" val="1130479351"/>
+              </p:ext>
+            </p:extLst>
           </p:nvPr>
         </p:nvGraphicFramePr>
         <p:xfrm>
@@ -4692,6 +5797,96 @@
         </a:graphic>
       </p:graphicFrame>
     </p:spTree>
+  </p:cSld>
+  <p:clrMapOvr>
+    <a:masterClrMapping/>
+  </p:clrMapOvr>
+</p:sld>
+</file>
+
+<file path=ppt/slides/slide4.xml><?xml version="1.0" encoding="utf-8"?>
+<p:sld xmlns:a="http://schemas.openxmlformats.org/drawingml/2006/main" xmlns:r="http://schemas.openxmlformats.org/officeDocument/2006/relationships" xmlns:p="http://schemas.openxmlformats.org/presentationml/2006/main">
+  <p:cSld>
+    <p:spTree>
+      <p:nvGrpSpPr>
+        <p:cNvPr id="1" name=""/>
+        <p:cNvGrpSpPr/>
+        <p:nvPr/>
+      </p:nvGrpSpPr>
+      <p:grpSpPr>
+        <a:xfrm>
+          <a:off x="0" y="0"/>
+          <a:ext cx="0" cy="0"/>
+          <a:chOff x="0" y="0"/>
+          <a:chExt cx="0" cy="0"/>
+        </a:xfrm>
+      </p:grpSpPr>
+      <p:sp>
+        <p:nvSpPr>
+          <p:cNvPr id="2" name="Title 1">
+            <a:extLst>
+              <a:ext uri="{FF2B5EF4-FFF2-40B4-BE49-F238E27FC236}">
+                <a16:creationId xmlns:a16="http://schemas.microsoft.com/office/drawing/2014/main" id="{A501BD22-9992-47ED-9FA3-C8BC3ABEB115}"/>
+              </a:ext>
+            </a:extLst>
+          </p:cNvPr>
+          <p:cNvSpPr>
+            <a:spLocks noGrp="1"/>
+          </p:cNvSpPr>
+          <p:nvPr>
+            <p:ph type="title"/>
+          </p:nvPr>
+        </p:nvSpPr>
+        <p:spPr/>
+        <p:txBody>
+          <a:bodyPr/>
+          <a:lstStyle/>
+          <a:p>
+            <a:r>
+              <a:rPr lang="en-US" dirty="0"/>
+              <a:t>Language distribution #2</a:t>
+            </a:r>
+            <a:endParaRPr lang="hr-HR" dirty="0"/>
+          </a:p>
+        </p:txBody>
+      </p:sp>
+      <p:graphicFrame>
+        <p:nvGraphicFramePr>
+          <p:cNvPr id="6" name="Content Placeholder 5">
+            <a:extLst>
+              <a:ext uri="{FF2B5EF4-FFF2-40B4-BE49-F238E27FC236}">
+                <a16:creationId xmlns:a16="http://schemas.microsoft.com/office/drawing/2014/main" id="{4F3A3450-DFC7-434A-B4AD-74AD548CFA64}"/>
+              </a:ext>
+            </a:extLst>
+          </p:cNvPr>
+          <p:cNvGraphicFramePr>
+            <a:graphicFrameLocks noGrp="1"/>
+          </p:cNvGraphicFramePr>
+          <p:nvPr>
+            <p:ph idx="1"/>
+            <p:extLst>
+              <p:ext uri="{D42A27DB-BD31-4B8C-83A1-F6EECF244321}">
+                <p14:modId xmlns:p14="http://schemas.microsoft.com/office/powerpoint/2010/main" val="2571637945"/>
+              </p:ext>
+            </p:extLst>
+          </p:nvPr>
+        </p:nvGraphicFramePr>
+        <p:xfrm>
+          <a:off x="1435100" y="1447800"/>
+          <a:ext cx="7499350" cy="4800600"/>
+        </p:xfrm>
+        <a:graphic>
+          <a:graphicData uri="http://schemas.openxmlformats.org/drawingml/2006/chart">
+            <c:chart xmlns:c="http://schemas.openxmlformats.org/drawingml/2006/chart" xmlns:r="http://schemas.openxmlformats.org/officeDocument/2006/relationships" r:id="rId2"/>
+          </a:graphicData>
+        </a:graphic>
+      </p:graphicFrame>
+    </p:spTree>
+    <p:extLst>
+      <p:ext uri="{BB962C8B-B14F-4D97-AF65-F5344CB8AC3E}">
+        <p14:creationId xmlns:p14="http://schemas.microsoft.com/office/powerpoint/2010/main" val="307105893"/>
+      </p:ext>
+    </p:extLst>
   </p:cSld>
   <p:clrMapOvr>
     <a:masterClrMapping/>

</xml_diff>

<commit_message>
Example for splitting table across slides
Due to common request
</commit_message>
<xml_diff>
--- a/Intermediate/SharedCharts/result.pptx
+++ b/Intermediate/SharedCharts/result.pptx
@@ -9,6 +9,8 @@
     <p:sldId id="257" r:id="rId3"/>
     <p:sldId id="258" r:id="rId4"/>
     <p:sldId id="259" r:id="rId5"/>
+    <p:sldId id="260" r:id="rId6"/>
+    <p:sldId id="261" r:id="rId7"/>
   </p:sldIdLst>
   <p:sldSz cx="9144000" cy="6858000" type="screen4x3"/>
   <p:notesSz cx="6858000" cy="9144000"/>
@@ -1812,7 +1814,7 @@
             <a:fld id="{782AB740-377D-4BC2-A984-084B0CA75466}" type="datetimeFigureOut">
               <a:rPr lang="hr-HR" smtClean="0"/>
               <a:pPr/>
-              <a:t>8.9.2021.</a:t>
+              <a:t>22.9.2024.</a:t>
             </a:fld>
             <a:endParaRPr lang="hr-HR"/>
           </a:p>
@@ -2112,7 +2114,7 @@
             <a:fld id="{782AB740-377D-4BC2-A984-084B0CA75466}" type="datetimeFigureOut">
               <a:rPr lang="hr-HR" smtClean="0"/>
               <a:pPr/>
-              <a:t>8.9.2021.</a:t>
+              <a:t>22.9.2024.</a:t>
             </a:fld>
             <a:endParaRPr lang="hr-HR"/>
           </a:p>
@@ -2288,7 +2290,7 @@
             <a:fld id="{782AB740-377D-4BC2-A984-084B0CA75466}" type="datetimeFigureOut">
               <a:rPr lang="hr-HR" smtClean="0"/>
               <a:pPr/>
-              <a:t>8.9.2021.</a:t>
+              <a:t>22.9.2024.</a:t>
             </a:fld>
             <a:endParaRPr lang="hr-HR"/>
           </a:p>
@@ -2454,7 +2456,7 @@
             <a:fld id="{782AB740-377D-4BC2-A984-084B0CA75466}" type="datetimeFigureOut">
               <a:rPr lang="hr-HR" smtClean="0"/>
               <a:pPr/>
-              <a:t>8.9.2021.</a:t>
+              <a:t>22.9.2024.</a:t>
             </a:fld>
             <a:endParaRPr lang="hr-HR"/>
           </a:p>
@@ -2715,7 +2717,7 @@
             <a:fld id="{782AB740-377D-4BC2-A984-084B0CA75466}" type="datetimeFigureOut">
               <a:rPr lang="hr-HR" smtClean="0"/>
               <a:pPr/>
-              <a:t>8.9.2021.</a:t>
+              <a:t>22.9.2024.</a:t>
             </a:fld>
             <a:endParaRPr lang="hr-HR"/>
           </a:p>
@@ -3170,7 +3172,7 @@
             <a:fld id="{782AB740-377D-4BC2-A984-084B0CA75466}" type="datetimeFigureOut">
               <a:rPr lang="hr-HR" smtClean="0"/>
               <a:pPr/>
-              <a:t>8.9.2021.</a:t>
+              <a:t>22.9.2024.</a:t>
             </a:fld>
             <a:endParaRPr lang="hr-HR"/>
           </a:p>
@@ -3654,7 +3656,7 @@
             <a:fld id="{782AB740-377D-4BC2-A984-084B0CA75466}" type="datetimeFigureOut">
               <a:rPr lang="hr-HR" smtClean="0"/>
               <a:pPr/>
-              <a:t>8.9.2021.</a:t>
+              <a:t>22.9.2024.</a:t>
             </a:fld>
             <a:endParaRPr lang="hr-HR"/>
           </a:p>
@@ -3773,7 +3775,7 @@
             <a:fld id="{782AB740-377D-4BC2-A984-084B0CA75466}" type="datetimeFigureOut">
               <a:rPr lang="hr-HR" smtClean="0"/>
               <a:pPr/>
-              <a:t>8.9.2021.</a:t>
+              <a:t>22.9.2024.</a:t>
             </a:fld>
             <a:endParaRPr lang="hr-HR"/>
           </a:p>
@@ -3911,7 +3913,7 @@
             <a:fld id="{782AB740-377D-4BC2-A984-084B0CA75466}" type="datetimeFigureOut">
               <a:rPr lang="hr-HR" smtClean="0"/>
               <a:pPr/>
-              <a:t>8.9.2021.</a:t>
+              <a:t>22.9.2024.</a:t>
             </a:fld>
             <a:endParaRPr lang="hr-HR"/>
           </a:p>
@@ -4226,7 +4228,7 @@
             <a:fld id="{782AB740-377D-4BC2-A984-084B0CA75466}" type="datetimeFigureOut">
               <a:rPr lang="hr-HR" smtClean="0"/>
               <a:pPr/>
-              <a:t>8.9.2021.</a:t>
+              <a:t>22.9.2024.</a:t>
             </a:fld>
             <a:endParaRPr lang="hr-HR"/>
           </a:p>
@@ -4355,7 +4357,7 @@
             <a:fld id="{782AB740-377D-4BC2-A984-084B0CA75466}" type="datetimeFigureOut">
               <a:rPr lang="hr-HR" smtClean="0"/>
               <a:pPr/>
-              <a:t>8.9.2021.</a:t>
+              <a:t>22.9.2024.</a:t>
             </a:fld>
             <a:endParaRPr lang="hr-HR"/>
           </a:p>
@@ -5114,7 +5116,7 @@
             <a:fld id="{782AB740-377D-4BC2-A984-084B0CA75466}" type="datetimeFigureOut">
               <a:rPr lang="hr-HR" smtClean="0"/>
               <a:pPr/>
-              <a:t>8.9.2021.</a:t>
+              <a:t>22.9.2024.</a:t>
             </a:fld>
             <a:endParaRPr lang="hr-HR"/>
           </a:p>
@@ -5866,7 +5868,7 @@
             <p:ph idx="1"/>
             <p:extLst>
               <p:ext uri="{D42A27DB-BD31-4B8C-83A1-F6EECF244321}">
-                <p14:modId xmlns:p14="http://schemas.microsoft.com/office/powerpoint/2010/main" val="2571637945"/>
+                <p14:modId xmlns:p14="http://schemas.microsoft.com/office/powerpoint/2010/main" val="1834510146"/>
               </p:ext>
             </p:extLst>
           </p:nvPr>
@@ -5885,6 +5887,1587 @@
     <p:extLst>
       <p:ext uri="{BB962C8B-B14F-4D97-AF65-F5344CB8AC3E}">
         <p14:creationId xmlns:p14="http://schemas.microsoft.com/office/powerpoint/2010/main" val="307105893"/>
+      </p:ext>
+    </p:extLst>
+  </p:cSld>
+  <p:clrMapOvr>
+    <a:masterClrMapping/>
+  </p:clrMapOvr>
+</p:sld>
+</file>
+
+<file path=ppt/slides/slide5.xml><?xml version="1.0" encoding="utf-8"?>
+<p:sld xmlns:a="http://schemas.openxmlformats.org/drawingml/2006/main" xmlns:r="http://schemas.openxmlformats.org/officeDocument/2006/relationships" xmlns:p="http://schemas.openxmlformats.org/presentationml/2006/main">
+  <p:cSld>
+    <p:spTree>
+      <p:nvGrpSpPr>
+        <p:cNvPr id="1" name=""/>
+        <p:cNvGrpSpPr/>
+        <p:nvPr/>
+      </p:nvGrpSpPr>
+      <p:grpSpPr>
+        <a:xfrm>
+          <a:off x="0" y="0"/>
+          <a:ext cx="0" cy="0"/>
+          <a:chOff x="0" y="0"/>
+          <a:chExt cx="0" cy="0"/>
+        </a:xfrm>
+      </p:grpSpPr>
+      <p:sp>
+        <p:nvSpPr>
+          <p:cNvPr id="2" name="Title 1">
+            <a:extLst>
+              <a:ext uri="{FF2B5EF4-FFF2-40B4-BE49-F238E27FC236}">
+                <a16:creationId xmlns:a16="http://schemas.microsoft.com/office/drawing/2014/main" id="{CAA87217-63D1-4C4F-B1E8-77CBCEBC2C3E}"/>
+              </a:ext>
+            </a:extLst>
+          </p:cNvPr>
+          <p:cNvSpPr>
+            <a:spLocks noGrp="1"/>
+          </p:cNvSpPr>
+          <p:nvPr>
+            <p:ph type="title"/>
+          </p:nvPr>
+        </p:nvSpPr>
+        <p:spPr/>
+        <p:txBody>
+          <a:bodyPr>
+            <a:normAutofit/>
+          </a:bodyPr>
+          <a:lstStyle/>
+          <a:p>
+            <a:r>
+              <a:rPr lang="en-US" dirty="0"/>
+              <a:t>Table across slides </a:t>
+            </a:r>
+            <a:endParaRPr lang="hr-HR" sz="1100" dirty="0"/>
+          </a:p>
+        </p:txBody>
+      </p:sp>
+      <p:graphicFrame>
+        <p:nvGraphicFramePr>
+          <p:cNvPr id="6" name="Table 6">
+            <a:extLst>
+              <a:ext uri="{FF2B5EF4-FFF2-40B4-BE49-F238E27FC236}">
+                <a16:creationId xmlns:a16="http://schemas.microsoft.com/office/drawing/2014/main" id="{0AB68139-9E32-4ECD-BF6E-61B5936F6459}"/>
+              </a:ext>
+            </a:extLst>
+          </p:cNvPr>
+          <p:cNvGraphicFramePr>
+            <a:graphicFrameLocks noGrp="1"/>
+          </p:cNvGraphicFramePr>
+          <p:nvPr>
+            <p:ph idx="1"/>
+            <p:extLst>
+              <p:ext uri="{D42A27DB-BD31-4B8C-83A1-F6EECF244321}">
+                <p14:modId xmlns:p14="http://schemas.microsoft.com/office/powerpoint/2010/main" val="3547349588"/>
+              </p:ext>
+            </p:extLst>
+          </p:nvPr>
+        </p:nvGraphicFramePr>
+        <p:xfrm>
+          <a:off x="1435100" y="1447800"/>
+          <a:ext cx="7499349" cy="741680"/>
+        </p:xfrm>
+        <a:graphic>
+          <a:graphicData uri="http://schemas.openxmlformats.org/drawingml/2006/table">
+            <a:tbl>
+              <a:tblPr firstRow="1" bandRow="1">
+                <a:tableStyleId>{5C22544A-7EE6-4342-B048-85BDC9FD1C3A}</a:tableStyleId>
+              </a:tblPr>
+              <a:tblGrid>
+                <a:gridCol w="2499783">
+                  <a:extLst>
+                    <a:ext uri="{9D8B030D-6E8A-4147-A177-3AD203B41FA5}">
+                      <a16:colId xmlns:a16="http://schemas.microsoft.com/office/drawing/2014/main" val="2679471042"/>
+                    </a:ext>
+                  </a:extLst>
+                </a:gridCol>
+                <a:gridCol w="2499783">
+                  <a:extLst>
+                    <a:ext uri="{9D8B030D-6E8A-4147-A177-3AD203B41FA5}">
+                      <a16:colId xmlns:a16="http://schemas.microsoft.com/office/drawing/2014/main" val="2360038478"/>
+                    </a:ext>
+                  </a:extLst>
+                </a:gridCol>
+                <a:gridCol w="2499783">
+                  <a:extLst>
+                    <a:ext uri="{9D8B030D-6E8A-4147-A177-3AD203B41FA5}">
+                      <a16:colId xmlns:a16="http://schemas.microsoft.com/office/drawing/2014/main" val="3282142002"/>
+                    </a:ext>
+                  </a:extLst>
+                </a:gridCol>
+              </a:tblGrid>
+              <a:tr h="370840">
+                <a:tc>
+                  <a:txBody>
+                    <a:bodyPr/>
+                    <a:lstStyle/>
+                    <a:p>
+                      <a:r>
+                        <a:rPr lang="en-US" dirty="0"/>
+                        <a:t>Col A</a:t>
+                      </a:r>
+                      <a:endParaRPr lang="hr-HR" dirty="0"/>
+                    </a:p>
+                  </a:txBody>
+                  <a:tcPr/>
+                </a:tc>
+                <a:tc>
+                  <a:txBody>
+                    <a:bodyPr/>
+                    <a:lstStyle/>
+                    <a:p>
+                      <a:r>
+                        <a:rPr lang="en-US" dirty="0"/>
+                        <a:t>Column B</a:t>
+                      </a:r>
+                      <a:endParaRPr lang="hr-HR" dirty="0"/>
+                    </a:p>
+                  </a:txBody>
+                  <a:tcPr/>
+                </a:tc>
+                <a:tc>
+                  <a:txBody>
+                    <a:bodyPr/>
+                    <a:lstStyle/>
+                    <a:p>
+                      <a:r>
+                        <a:rPr lang="en-US" dirty="0"/>
+                        <a:t>Last column</a:t>
+                      </a:r>
+                      <a:endParaRPr lang="hr-HR" dirty="0"/>
+                    </a:p>
+                  </a:txBody>
+                  <a:tcPr/>
+                </a:tc>
+                <a:extLst>
+                  <a:ext uri="{0D108BD9-81ED-4DB2-BD59-A6C34878D82A}">
+                    <a16:rowId xmlns:a16="http://schemas.microsoft.com/office/drawing/2014/main" val="781833061"/>
+                  </a:ext>
+                </a:extLst>
+              </a:tr>
+              <a:tr h="370840">
+                <a:tc>
+                  <a:txBody>
+                    <a:bodyPr/>
+                    <a:lstStyle/>
+                    <a:p>
+                      <a:r>
+                        <a:rPr lang="en-US" dirty="0"/>
+                        <a:t>A - 1</a:t>
+                      </a:r>
+                      <a:endParaRPr lang="hr-HR" dirty="0"/>
+                    </a:p>
+                  </a:txBody>
+                  <a:tcPr/>
+                </a:tc>
+                <a:tc>
+                  <a:txBody>
+                    <a:bodyPr/>
+                    <a:lstStyle/>
+                    <a:p>
+                      <a:pPr marL="0" marR="0" lvl="0" indent="0" algn="l" defTabSz="914400" rtl="0" eaLnBrk="1" fontAlgn="auto" latinLnBrk="0" hangingPunct="1">
+                        <a:lnSpc>
+                          <a:spcPct val="100000"/>
+                        </a:lnSpc>
+                        <a:spcBef>
+                          <a:spcPts val="0"/>
+                        </a:spcBef>
+                        <a:spcAft>
+                          <a:spcPts val="0"/>
+                        </a:spcAft>
+                        <a:buClrTx/>
+                        <a:buSzTx/>
+                        <a:buFontTx/>
+                        <a:buNone/>
+                        <a:tabLst/>
+                        <a:defRPr/>
+                      </a:pPr>
+                      <a:r>
+                        <a:rPr lang="en-US" dirty="0"/>
+                        <a:t>B - 1</a:t>
+                      </a:r>
+                      <a:endParaRPr lang="hr-HR" dirty="0"/>
+                    </a:p>
+                  </a:txBody>
+                  <a:tcPr/>
+                </a:tc>
+                <a:tc>
+                  <a:txBody>
+                    <a:bodyPr/>
+                    <a:lstStyle/>
+                    <a:p>
+                      <a:pPr marL="0" marR="0" lvl="0" indent="0" algn="l" defTabSz="914400" rtl="0" eaLnBrk="1" fontAlgn="auto" latinLnBrk="0" hangingPunct="1">
+                        <a:lnSpc>
+                          <a:spcPct val="100000"/>
+                        </a:lnSpc>
+                        <a:spcBef>
+                          <a:spcPts val="0"/>
+                        </a:spcBef>
+                        <a:spcAft>
+                          <a:spcPts val="0"/>
+                        </a:spcAft>
+                        <a:buClrTx/>
+                        <a:buSzTx/>
+                        <a:buFontTx/>
+                        <a:buNone/>
+                        <a:tabLst/>
+                        <a:defRPr/>
+                      </a:pPr>
+                      <a:r>
+                        <a:rPr lang="en-US" dirty="0"/>
+                        <a:t>C - 1</a:t>
+                      </a:r>
+                      <a:endParaRPr lang="hr-HR" dirty="0"/>
+                    </a:p>
+                  </a:txBody>
+                  <a:tcPr/>
+                </a:tc>
+                <a:extLst>
+                  <a:ext uri="{0D108BD9-81ED-4DB2-BD59-A6C34878D82A}">
+                    <a16:rowId xmlns:a16="http://schemas.microsoft.com/office/drawing/2014/main" val="2747685484"/>
+                  </a:ext>
+                </a:extLst>
+              </a:tr>
+              <a:tr h="370840">
+                <a:tc>
+                  <a:txBody>
+                    <a:bodyPr/>
+                    <a:lstStyle/>
+                    <a:p>
+                      <a:r>
+                        <a:rPr lang="en-US" dirty="0"/>
+                        <a:t>A - 2</a:t>
+                      </a:r>
+                      <a:endParaRPr lang="hr-HR" dirty="0"/>
+                    </a:p>
+                  </a:txBody>
+                  <a:tcPr/>
+                </a:tc>
+                <a:tc>
+                  <a:txBody>
+                    <a:bodyPr/>
+                    <a:lstStyle/>
+                    <a:p>
+                      <a:pPr marL="0" marR="0" lvl="0" indent="0" algn="l" defTabSz="914400" rtl="0" eaLnBrk="1" fontAlgn="auto" latinLnBrk="0" hangingPunct="1">
+                        <a:lnSpc>
+                          <a:spcPct val="100000"/>
+                        </a:lnSpc>
+                        <a:spcBef>
+                          <a:spcPts val="0"/>
+                        </a:spcBef>
+                        <a:spcAft>
+                          <a:spcPts val="0"/>
+                        </a:spcAft>
+                        <a:buClrTx/>
+                        <a:buSzTx/>
+                        <a:buFontTx/>
+                        <a:buNone/>
+                        <a:tabLst/>
+                        <a:defRPr/>
+                      </a:pPr>
+                      <a:r>
+                        <a:rPr lang="en-US" dirty="0"/>
+                        <a:t>B - 2</a:t>
+                      </a:r>
+                      <a:endParaRPr lang="hr-HR" dirty="0"/>
+                    </a:p>
+                  </a:txBody>
+                  <a:tcPr/>
+                </a:tc>
+                <a:tc>
+                  <a:txBody>
+                    <a:bodyPr/>
+                    <a:lstStyle/>
+                    <a:p>
+                      <a:pPr marL="0" marR="0" lvl="0" indent="0" algn="l" defTabSz="914400" rtl="0" eaLnBrk="1" fontAlgn="auto" latinLnBrk="0" hangingPunct="1">
+                        <a:lnSpc>
+                          <a:spcPct val="100000"/>
+                        </a:lnSpc>
+                        <a:spcBef>
+                          <a:spcPts val="0"/>
+                        </a:spcBef>
+                        <a:spcAft>
+                          <a:spcPts val="0"/>
+                        </a:spcAft>
+                        <a:buClrTx/>
+                        <a:buSzTx/>
+                        <a:buFontTx/>
+                        <a:buNone/>
+                        <a:tabLst/>
+                        <a:defRPr/>
+                      </a:pPr>
+                      <a:r>
+                        <a:rPr lang="en-US" dirty="0"/>
+                        <a:t>C - 2</a:t>
+                      </a:r>
+                      <a:endParaRPr lang="hr-HR" dirty="0"/>
+                    </a:p>
+                  </a:txBody>
+                  <a:tcPr/>
+                </a:tc>
+                <a:extLst>
+                  <a:ext uri="{0D108BD9-81ED-4DB2-BD59-A6C34878D82A}">
+                    <a16:rowId xmlns:a16="http://schemas.microsoft.com/office/drawing/2014/main" val="3505102660"/>
+                  </a:ext>
+                </a:extLst>
+              </a:tr>
+              <a:tr h="370840">
+                <a:tc>
+                  <a:txBody>
+                    <a:bodyPr/>
+                    <a:lstStyle/>
+                    <a:p>
+                      <a:r>
+                        <a:rPr lang="en-US" dirty="0"/>
+                        <a:t>A - 3</a:t>
+                      </a:r>
+                      <a:endParaRPr lang="hr-HR" dirty="0"/>
+                    </a:p>
+                  </a:txBody>
+                  <a:tcPr/>
+                </a:tc>
+                <a:tc>
+                  <a:txBody>
+                    <a:bodyPr/>
+                    <a:lstStyle/>
+                    <a:p>
+                      <a:pPr marL="0" marR="0" lvl="0" indent="0" algn="l" defTabSz="914400" rtl="0" eaLnBrk="1" fontAlgn="auto" latinLnBrk="0" hangingPunct="1">
+                        <a:lnSpc>
+                          <a:spcPct val="100000"/>
+                        </a:lnSpc>
+                        <a:spcBef>
+                          <a:spcPts val="0"/>
+                        </a:spcBef>
+                        <a:spcAft>
+                          <a:spcPts val="0"/>
+                        </a:spcAft>
+                        <a:buClrTx/>
+                        <a:buSzTx/>
+                        <a:buFontTx/>
+                        <a:buNone/>
+                        <a:tabLst/>
+                        <a:defRPr/>
+                      </a:pPr>
+                      <a:r>
+                        <a:rPr lang="en-US" dirty="0"/>
+                        <a:t>B - 3</a:t>
+                      </a:r>
+                      <a:endParaRPr lang="hr-HR" dirty="0"/>
+                    </a:p>
+                  </a:txBody>
+                  <a:tcPr/>
+                </a:tc>
+                <a:tc>
+                  <a:txBody>
+                    <a:bodyPr/>
+                    <a:lstStyle/>
+                    <a:p>
+                      <a:pPr marL="0" marR="0" lvl="0" indent="0" algn="l" defTabSz="914400" rtl="0" eaLnBrk="1" fontAlgn="auto" latinLnBrk="0" hangingPunct="1">
+                        <a:lnSpc>
+                          <a:spcPct val="100000"/>
+                        </a:lnSpc>
+                        <a:spcBef>
+                          <a:spcPts val="0"/>
+                        </a:spcBef>
+                        <a:spcAft>
+                          <a:spcPts val="0"/>
+                        </a:spcAft>
+                        <a:buClrTx/>
+                        <a:buSzTx/>
+                        <a:buFontTx/>
+                        <a:buNone/>
+                        <a:tabLst/>
+                        <a:defRPr/>
+                      </a:pPr>
+                      <a:r>
+                        <a:rPr lang="en-US" dirty="0"/>
+                        <a:t>C - 3</a:t>
+                      </a:r>
+                      <a:endParaRPr lang="hr-HR" dirty="0"/>
+                    </a:p>
+                  </a:txBody>
+                  <a:tcPr/>
+                </a:tc>
+                <a:extLst>
+                  <a:ext uri="{0D108BD9-81ED-4DB2-BD59-A6C34878D82A}">
+                    <a16:rowId xmlns:a16="http://schemas.microsoft.com/office/drawing/2014/main" val="3603381165"/>
+                  </a:ext>
+                </a:extLst>
+              </a:tr>
+              <a:tr h="370840">
+                <a:tc>
+                  <a:txBody>
+                    <a:bodyPr/>
+                    <a:lstStyle/>
+                    <a:p>
+                      <a:r>
+                        <a:rPr lang="en-US" dirty="0"/>
+                        <a:t>A - 4</a:t>
+                      </a:r>
+                      <a:endParaRPr lang="hr-HR" dirty="0"/>
+                    </a:p>
+                  </a:txBody>
+                  <a:tcPr/>
+                </a:tc>
+                <a:tc>
+                  <a:txBody>
+                    <a:bodyPr/>
+                    <a:lstStyle/>
+                    <a:p>
+                      <a:pPr marL="0" marR="0" lvl="0" indent="0" algn="l" defTabSz="914400" rtl="0" eaLnBrk="1" fontAlgn="auto" latinLnBrk="0" hangingPunct="1">
+                        <a:lnSpc>
+                          <a:spcPct val="100000"/>
+                        </a:lnSpc>
+                        <a:spcBef>
+                          <a:spcPts val="0"/>
+                        </a:spcBef>
+                        <a:spcAft>
+                          <a:spcPts val="0"/>
+                        </a:spcAft>
+                        <a:buClrTx/>
+                        <a:buSzTx/>
+                        <a:buFontTx/>
+                        <a:buNone/>
+                        <a:tabLst/>
+                        <a:defRPr/>
+                      </a:pPr>
+                      <a:r>
+                        <a:rPr lang="en-US" dirty="0"/>
+                        <a:t>B - 4</a:t>
+                      </a:r>
+                      <a:endParaRPr lang="hr-HR" dirty="0"/>
+                    </a:p>
+                  </a:txBody>
+                  <a:tcPr/>
+                </a:tc>
+                <a:tc>
+                  <a:txBody>
+                    <a:bodyPr/>
+                    <a:lstStyle/>
+                    <a:p>
+                      <a:pPr marL="0" marR="0" lvl="0" indent="0" algn="l" defTabSz="914400" rtl="0" eaLnBrk="1" fontAlgn="auto" latinLnBrk="0" hangingPunct="1">
+                        <a:lnSpc>
+                          <a:spcPct val="100000"/>
+                        </a:lnSpc>
+                        <a:spcBef>
+                          <a:spcPts val="0"/>
+                        </a:spcBef>
+                        <a:spcAft>
+                          <a:spcPts val="0"/>
+                        </a:spcAft>
+                        <a:buClrTx/>
+                        <a:buSzTx/>
+                        <a:buFontTx/>
+                        <a:buNone/>
+                        <a:tabLst/>
+                        <a:defRPr/>
+                      </a:pPr>
+                      <a:r>
+                        <a:rPr lang="en-US" dirty="0"/>
+                        <a:t>C - 4</a:t>
+                      </a:r>
+                      <a:endParaRPr lang="hr-HR" dirty="0"/>
+                    </a:p>
+                  </a:txBody>
+                  <a:tcPr/>
+                </a:tc>
+                <a:extLst>
+                  <a:ext uri="{0D108BD9-81ED-4DB2-BD59-A6C34878D82A}">
+                    <a16:rowId xmlns:a16="http://schemas.microsoft.com/office/drawing/2014/main" val="563858958"/>
+                  </a:ext>
+                </a:extLst>
+              </a:tr>
+              <a:tr h="370840">
+                <a:tc>
+                  <a:txBody>
+                    <a:bodyPr/>
+                    <a:lstStyle/>
+                    <a:p>
+                      <a:r>
+                        <a:rPr lang="en-US" dirty="0"/>
+                        <a:t>A - 5</a:t>
+                      </a:r>
+                      <a:endParaRPr lang="hr-HR" dirty="0"/>
+                    </a:p>
+                  </a:txBody>
+                  <a:tcPr/>
+                </a:tc>
+                <a:tc>
+                  <a:txBody>
+                    <a:bodyPr/>
+                    <a:lstStyle/>
+                    <a:p>
+                      <a:pPr marL="0" marR="0" lvl="0" indent="0" algn="l" defTabSz="914400" rtl="0" eaLnBrk="1" fontAlgn="auto" latinLnBrk="0" hangingPunct="1">
+                        <a:lnSpc>
+                          <a:spcPct val="100000"/>
+                        </a:lnSpc>
+                        <a:spcBef>
+                          <a:spcPts val="0"/>
+                        </a:spcBef>
+                        <a:spcAft>
+                          <a:spcPts val="0"/>
+                        </a:spcAft>
+                        <a:buClrTx/>
+                        <a:buSzTx/>
+                        <a:buFontTx/>
+                        <a:buNone/>
+                        <a:tabLst/>
+                        <a:defRPr/>
+                      </a:pPr>
+                      <a:r>
+                        <a:rPr lang="en-US" dirty="0"/>
+                        <a:t>B - 5</a:t>
+                      </a:r>
+                      <a:endParaRPr lang="hr-HR" dirty="0"/>
+                    </a:p>
+                  </a:txBody>
+                  <a:tcPr/>
+                </a:tc>
+                <a:tc>
+                  <a:txBody>
+                    <a:bodyPr/>
+                    <a:lstStyle/>
+                    <a:p>
+                      <a:pPr marL="0" marR="0" lvl="0" indent="0" algn="l" defTabSz="914400" rtl="0" eaLnBrk="1" fontAlgn="auto" latinLnBrk="0" hangingPunct="1">
+                        <a:lnSpc>
+                          <a:spcPct val="100000"/>
+                        </a:lnSpc>
+                        <a:spcBef>
+                          <a:spcPts val="0"/>
+                        </a:spcBef>
+                        <a:spcAft>
+                          <a:spcPts val="0"/>
+                        </a:spcAft>
+                        <a:buClrTx/>
+                        <a:buSzTx/>
+                        <a:buFontTx/>
+                        <a:buNone/>
+                        <a:tabLst/>
+                        <a:defRPr/>
+                      </a:pPr>
+                      <a:r>
+                        <a:rPr lang="en-US" dirty="0"/>
+                        <a:t>C - 5</a:t>
+                      </a:r>
+                      <a:endParaRPr lang="hr-HR" dirty="0"/>
+                    </a:p>
+                  </a:txBody>
+                  <a:tcPr/>
+                </a:tc>
+                <a:extLst>
+                  <a:ext uri="{0D108BD9-81ED-4DB2-BD59-A6C34878D82A}">
+                    <a16:rowId xmlns:a16="http://schemas.microsoft.com/office/drawing/2014/main" val="1656705359"/>
+                  </a:ext>
+                </a:extLst>
+              </a:tr>
+              <a:tr h="370840">
+                <a:tc>
+                  <a:txBody>
+                    <a:bodyPr/>
+                    <a:lstStyle/>
+                    <a:p>
+                      <a:r>
+                        <a:rPr lang="en-US" dirty="0"/>
+                        <a:t>A - 6</a:t>
+                      </a:r>
+                      <a:endParaRPr lang="hr-HR" dirty="0"/>
+                    </a:p>
+                  </a:txBody>
+                  <a:tcPr/>
+                </a:tc>
+                <a:tc>
+                  <a:txBody>
+                    <a:bodyPr/>
+                    <a:lstStyle/>
+                    <a:p>
+                      <a:pPr marL="0" marR="0" lvl="0" indent="0" algn="l" defTabSz="914400" rtl="0" eaLnBrk="1" fontAlgn="auto" latinLnBrk="0" hangingPunct="1">
+                        <a:lnSpc>
+                          <a:spcPct val="100000"/>
+                        </a:lnSpc>
+                        <a:spcBef>
+                          <a:spcPts val="0"/>
+                        </a:spcBef>
+                        <a:spcAft>
+                          <a:spcPts val="0"/>
+                        </a:spcAft>
+                        <a:buClrTx/>
+                        <a:buSzTx/>
+                        <a:buFontTx/>
+                        <a:buNone/>
+                        <a:tabLst/>
+                        <a:defRPr/>
+                      </a:pPr>
+                      <a:r>
+                        <a:rPr lang="en-US" dirty="0"/>
+                        <a:t>B - 6</a:t>
+                      </a:r>
+                      <a:endParaRPr lang="hr-HR" dirty="0"/>
+                    </a:p>
+                  </a:txBody>
+                  <a:tcPr/>
+                </a:tc>
+                <a:tc>
+                  <a:txBody>
+                    <a:bodyPr/>
+                    <a:lstStyle/>
+                    <a:p>
+                      <a:pPr marL="0" marR="0" lvl="0" indent="0" algn="l" defTabSz="914400" rtl="0" eaLnBrk="1" fontAlgn="auto" latinLnBrk="0" hangingPunct="1">
+                        <a:lnSpc>
+                          <a:spcPct val="100000"/>
+                        </a:lnSpc>
+                        <a:spcBef>
+                          <a:spcPts val="0"/>
+                        </a:spcBef>
+                        <a:spcAft>
+                          <a:spcPts val="0"/>
+                        </a:spcAft>
+                        <a:buClrTx/>
+                        <a:buSzTx/>
+                        <a:buFontTx/>
+                        <a:buNone/>
+                        <a:tabLst/>
+                        <a:defRPr/>
+                      </a:pPr>
+                      <a:r>
+                        <a:rPr lang="en-US" dirty="0"/>
+                        <a:t>C - 6</a:t>
+                      </a:r>
+                      <a:endParaRPr lang="hr-HR" dirty="0"/>
+                    </a:p>
+                  </a:txBody>
+                  <a:tcPr/>
+                </a:tc>
+                <a:extLst>
+                  <a:ext uri="{0D108BD9-81ED-4DB2-BD59-A6C34878D82A}">
+                    <a16:rowId xmlns:a16="http://schemas.microsoft.com/office/drawing/2014/main" val="3268701374"/>
+                  </a:ext>
+                </a:extLst>
+              </a:tr>
+              <a:tr h="370840">
+                <a:tc>
+                  <a:txBody>
+                    <a:bodyPr/>
+                    <a:lstStyle/>
+                    <a:p>
+                      <a:r>
+                        <a:rPr lang="en-US" dirty="0"/>
+                        <a:t>A - 7</a:t>
+                      </a:r>
+                      <a:endParaRPr lang="hr-HR" dirty="0"/>
+                    </a:p>
+                  </a:txBody>
+                  <a:tcPr/>
+                </a:tc>
+                <a:tc>
+                  <a:txBody>
+                    <a:bodyPr/>
+                    <a:lstStyle/>
+                    <a:p>
+                      <a:pPr marL="0" marR="0" lvl="0" indent="0" algn="l" defTabSz="914400" rtl="0" eaLnBrk="1" fontAlgn="auto" latinLnBrk="0" hangingPunct="1">
+                        <a:lnSpc>
+                          <a:spcPct val="100000"/>
+                        </a:lnSpc>
+                        <a:spcBef>
+                          <a:spcPts val="0"/>
+                        </a:spcBef>
+                        <a:spcAft>
+                          <a:spcPts val="0"/>
+                        </a:spcAft>
+                        <a:buClrTx/>
+                        <a:buSzTx/>
+                        <a:buFontTx/>
+                        <a:buNone/>
+                        <a:tabLst/>
+                        <a:defRPr/>
+                      </a:pPr>
+                      <a:r>
+                        <a:rPr lang="en-US" dirty="0"/>
+                        <a:t>B - 7</a:t>
+                      </a:r>
+                      <a:endParaRPr lang="hr-HR" dirty="0"/>
+                    </a:p>
+                  </a:txBody>
+                  <a:tcPr/>
+                </a:tc>
+                <a:tc>
+                  <a:txBody>
+                    <a:bodyPr/>
+                    <a:lstStyle/>
+                    <a:p>
+                      <a:pPr marL="0" marR="0" lvl="0" indent="0" algn="l" defTabSz="914400" rtl="0" eaLnBrk="1" fontAlgn="auto" latinLnBrk="0" hangingPunct="1">
+                        <a:lnSpc>
+                          <a:spcPct val="100000"/>
+                        </a:lnSpc>
+                        <a:spcBef>
+                          <a:spcPts val="0"/>
+                        </a:spcBef>
+                        <a:spcAft>
+                          <a:spcPts val="0"/>
+                        </a:spcAft>
+                        <a:buClrTx/>
+                        <a:buSzTx/>
+                        <a:buFontTx/>
+                        <a:buNone/>
+                        <a:tabLst/>
+                        <a:defRPr/>
+                      </a:pPr>
+                      <a:r>
+                        <a:rPr lang="en-US" dirty="0"/>
+                        <a:t>C - 7</a:t>
+                      </a:r>
+                      <a:endParaRPr lang="hr-HR" dirty="0"/>
+                    </a:p>
+                  </a:txBody>
+                  <a:tcPr/>
+                </a:tc>
+                <a:extLst>
+                  <a:ext uri="{0D108BD9-81ED-4DB2-BD59-A6C34878D82A}">
+                    <a16:rowId xmlns:a16="http://schemas.microsoft.com/office/drawing/2014/main" val="628089323"/>
+                  </a:ext>
+                </a:extLst>
+              </a:tr>
+              <a:tr h="370840">
+                <a:tc>
+                  <a:txBody>
+                    <a:bodyPr/>
+                    <a:lstStyle/>
+                    <a:p>
+                      <a:r>
+                        <a:rPr lang="en-US" dirty="0"/>
+                        <a:t>A - 8</a:t>
+                      </a:r>
+                      <a:endParaRPr lang="hr-HR" dirty="0"/>
+                    </a:p>
+                  </a:txBody>
+                  <a:tcPr/>
+                </a:tc>
+                <a:tc>
+                  <a:txBody>
+                    <a:bodyPr/>
+                    <a:lstStyle/>
+                    <a:p>
+                      <a:pPr marL="0" marR="0" lvl="0" indent="0" algn="l" defTabSz="914400" rtl="0" eaLnBrk="1" fontAlgn="auto" latinLnBrk="0" hangingPunct="1">
+                        <a:lnSpc>
+                          <a:spcPct val="100000"/>
+                        </a:lnSpc>
+                        <a:spcBef>
+                          <a:spcPts val="0"/>
+                        </a:spcBef>
+                        <a:spcAft>
+                          <a:spcPts val="0"/>
+                        </a:spcAft>
+                        <a:buClrTx/>
+                        <a:buSzTx/>
+                        <a:buFontTx/>
+                        <a:buNone/>
+                        <a:tabLst/>
+                        <a:defRPr/>
+                      </a:pPr>
+                      <a:r>
+                        <a:rPr lang="en-US" dirty="0"/>
+                        <a:t>B - 8</a:t>
+                      </a:r>
+                      <a:endParaRPr lang="hr-HR" dirty="0"/>
+                    </a:p>
+                  </a:txBody>
+                  <a:tcPr/>
+                </a:tc>
+                <a:tc>
+                  <a:txBody>
+                    <a:bodyPr/>
+                    <a:lstStyle/>
+                    <a:p>
+                      <a:pPr marL="0" marR="0" lvl="0" indent="0" algn="l" defTabSz="914400" rtl="0" eaLnBrk="1" fontAlgn="auto" latinLnBrk="0" hangingPunct="1">
+                        <a:lnSpc>
+                          <a:spcPct val="100000"/>
+                        </a:lnSpc>
+                        <a:spcBef>
+                          <a:spcPts val="0"/>
+                        </a:spcBef>
+                        <a:spcAft>
+                          <a:spcPts val="0"/>
+                        </a:spcAft>
+                        <a:buClrTx/>
+                        <a:buSzTx/>
+                        <a:buFontTx/>
+                        <a:buNone/>
+                        <a:tabLst/>
+                        <a:defRPr/>
+                      </a:pPr>
+                      <a:r>
+                        <a:rPr lang="en-US" dirty="0"/>
+                        <a:t>C - 8</a:t>
+                      </a:r>
+                      <a:endParaRPr lang="hr-HR" dirty="0"/>
+                    </a:p>
+                  </a:txBody>
+                  <a:tcPr/>
+                </a:tc>
+                <a:extLst>
+                  <a:ext uri="{0D108BD9-81ED-4DB2-BD59-A6C34878D82A}">
+                    <a16:rowId xmlns:a16="http://schemas.microsoft.com/office/drawing/2014/main" val="30369001"/>
+                  </a:ext>
+                </a:extLst>
+              </a:tr>
+              <a:tr h="370840">
+                <a:tc>
+                  <a:txBody>
+                    <a:bodyPr/>
+                    <a:lstStyle/>
+                    <a:p>
+                      <a:r>
+                        <a:rPr lang="en-US" dirty="0"/>
+                        <a:t>A - 9</a:t>
+                      </a:r>
+                      <a:endParaRPr lang="hr-HR" dirty="0"/>
+                    </a:p>
+                  </a:txBody>
+                  <a:tcPr/>
+                </a:tc>
+                <a:tc>
+                  <a:txBody>
+                    <a:bodyPr/>
+                    <a:lstStyle/>
+                    <a:p>
+                      <a:pPr marL="0" marR="0" lvl="0" indent="0" algn="l" defTabSz="914400" rtl="0" eaLnBrk="1" fontAlgn="auto" latinLnBrk="0" hangingPunct="1">
+                        <a:lnSpc>
+                          <a:spcPct val="100000"/>
+                        </a:lnSpc>
+                        <a:spcBef>
+                          <a:spcPts val="0"/>
+                        </a:spcBef>
+                        <a:spcAft>
+                          <a:spcPts val="0"/>
+                        </a:spcAft>
+                        <a:buClrTx/>
+                        <a:buSzTx/>
+                        <a:buFontTx/>
+                        <a:buNone/>
+                        <a:tabLst/>
+                        <a:defRPr/>
+                      </a:pPr>
+                      <a:r>
+                        <a:rPr lang="en-US" dirty="0"/>
+                        <a:t>B - 9</a:t>
+                      </a:r>
+                      <a:endParaRPr lang="hr-HR" dirty="0"/>
+                    </a:p>
+                  </a:txBody>
+                  <a:tcPr/>
+                </a:tc>
+                <a:tc>
+                  <a:txBody>
+                    <a:bodyPr/>
+                    <a:lstStyle/>
+                    <a:p>
+                      <a:pPr marL="0" marR="0" lvl="0" indent="0" algn="l" defTabSz="914400" rtl="0" eaLnBrk="1" fontAlgn="auto" latinLnBrk="0" hangingPunct="1">
+                        <a:lnSpc>
+                          <a:spcPct val="100000"/>
+                        </a:lnSpc>
+                        <a:spcBef>
+                          <a:spcPts val="0"/>
+                        </a:spcBef>
+                        <a:spcAft>
+                          <a:spcPts val="0"/>
+                        </a:spcAft>
+                        <a:buClrTx/>
+                        <a:buSzTx/>
+                        <a:buFontTx/>
+                        <a:buNone/>
+                        <a:tabLst/>
+                        <a:defRPr/>
+                      </a:pPr>
+                      <a:r>
+                        <a:rPr lang="en-US" dirty="0"/>
+                        <a:t>C - 9</a:t>
+                      </a:r>
+                      <a:endParaRPr lang="hr-HR" dirty="0"/>
+                    </a:p>
+                  </a:txBody>
+                  <a:tcPr/>
+                </a:tc>
+                <a:extLst>
+                  <a:ext uri="{0D108BD9-81ED-4DB2-BD59-A6C34878D82A}">
+                    <a16:rowId xmlns:a16="http://schemas.microsoft.com/office/drawing/2014/main" val="587740511"/>
+                  </a:ext>
+                </a:extLst>
+              </a:tr>
+              <a:tr h="370840">
+                <a:tc>
+                  <a:txBody>
+                    <a:bodyPr/>
+                    <a:lstStyle/>
+                    <a:p>
+                      <a:r>
+                        <a:rPr lang="en-US" dirty="0"/>
+                        <a:t>A - 10</a:t>
+                      </a:r>
+                      <a:endParaRPr lang="hr-HR" dirty="0"/>
+                    </a:p>
+                  </a:txBody>
+                  <a:tcPr/>
+                </a:tc>
+                <a:tc>
+                  <a:txBody>
+                    <a:bodyPr/>
+                    <a:lstStyle/>
+                    <a:p>
+                      <a:pPr marL="0" marR="0" lvl="0" indent="0" algn="l" defTabSz="914400" rtl="0" eaLnBrk="1" fontAlgn="auto" latinLnBrk="0" hangingPunct="1">
+                        <a:lnSpc>
+                          <a:spcPct val="100000"/>
+                        </a:lnSpc>
+                        <a:spcBef>
+                          <a:spcPts val="0"/>
+                        </a:spcBef>
+                        <a:spcAft>
+                          <a:spcPts val="0"/>
+                        </a:spcAft>
+                        <a:buClrTx/>
+                        <a:buSzTx/>
+                        <a:buFontTx/>
+                        <a:buNone/>
+                        <a:tabLst/>
+                        <a:defRPr/>
+                      </a:pPr>
+                      <a:r>
+                        <a:rPr lang="en-US" dirty="0"/>
+                        <a:t>B - 10</a:t>
+                      </a:r>
+                      <a:endParaRPr lang="hr-HR" dirty="0"/>
+                    </a:p>
+                  </a:txBody>
+                  <a:tcPr/>
+                </a:tc>
+                <a:tc>
+                  <a:txBody>
+                    <a:bodyPr/>
+                    <a:lstStyle/>
+                    <a:p>
+                      <a:pPr marL="0" marR="0" lvl="0" indent="0" algn="l" defTabSz="914400" rtl="0" eaLnBrk="1" fontAlgn="auto" latinLnBrk="0" hangingPunct="1">
+                        <a:lnSpc>
+                          <a:spcPct val="100000"/>
+                        </a:lnSpc>
+                        <a:spcBef>
+                          <a:spcPts val="0"/>
+                        </a:spcBef>
+                        <a:spcAft>
+                          <a:spcPts val="0"/>
+                        </a:spcAft>
+                        <a:buClrTx/>
+                        <a:buSzTx/>
+                        <a:buFontTx/>
+                        <a:buNone/>
+                        <a:tabLst/>
+                        <a:defRPr/>
+                      </a:pPr>
+                      <a:r>
+                        <a:rPr lang="en-US" dirty="0"/>
+                        <a:t>C - 10</a:t>
+                      </a:r>
+                      <a:endParaRPr lang="hr-HR" dirty="0"/>
+                    </a:p>
+                  </a:txBody>
+                  <a:tcPr/>
+                </a:tc>
+                <a:extLst>
+                  <a:ext uri="{0D108BD9-81ED-4DB2-BD59-A6C34878D82A}">
+                    <a16:rowId xmlns:a16="http://schemas.microsoft.com/office/drawing/2014/main" val="338967227"/>
+                  </a:ext>
+                </a:extLst>
+              </a:tr>
+            </a:tbl>
+          </a:graphicData>
+        </a:graphic>
+      </p:graphicFrame>
+    </p:spTree>
+    <p:extLst>
+      <p:ext uri="{BB962C8B-B14F-4D97-AF65-F5344CB8AC3E}">
+        <p14:creationId xmlns:p14="http://schemas.microsoft.com/office/powerpoint/2010/main" val="3204950218"/>
+      </p:ext>
+    </p:extLst>
+  </p:cSld>
+  <p:clrMapOvr>
+    <a:masterClrMapping/>
+  </p:clrMapOvr>
+</p:sld>
+</file>
+
+<file path=ppt/slides/slide6.xml><?xml version="1.0" encoding="utf-8"?>
+<p:sld xmlns:a="http://schemas.openxmlformats.org/drawingml/2006/main" xmlns:r="http://schemas.openxmlformats.org/officeDocument/2006/relationships" xmlns:p="http://schemas.openxmlformats.org/presentationml/2006/main">
+  <p:cSld>
+    <p:spTree>
+      <p:nvGrpSpPr>
+        <p:cNvPr id="1" name=""/>
+        <p:cNvGrpSpPr/>
+        <p:nvPr/>
+      </p:nvGrpSpPr>
+      <p:grpSpPr>
+        <a:xfrm>
+          <a:off x="0" y="0"/>
+          <a:ext cx="0" cy="0"/>
+          <a:chOff x="0" y="0"/>
+          <a:chExt cx="0" cy="0"/>
+        </a:xfrm>
+      </p:grpSpPr>
+      <p:sp>
+        <p:nvSpPr>
+          <p:cNvPr id="2" name="Title 1">
+            <a:extLst>
+              <a:ext uri="{FF2B5EF4-FFF2-40B4-BE49-F238E27FC236}">
+                <a16:creationId xmlns:a16="http://schemas.microsoft.com/office/drawing/2014/main" id="{CAA87217-63D1-4C4F-B1E8-77CBCEBC2C3E}"/>
+              </a:ext>
+            </a:extLst>
+          </p:cNvPr>
+          <p:cNvSpPr>
+            <a:spLocks noGrp="1"/>
+          </p:cNvSpPr>
+          <p:nvPr>
+            <p:ph type="title"/>
+          </p:nvPr>
+        </p:nvSpPr>
+        <p:spPr/>
+        <p:txBody>
+          <a:bodyPr>
+            <a:normAutofit/>
+          </a:bodyPr>
+          <a:lstStyle/>
+          <a:p>
+            <a:r>
+              <a:rPr lang="en-US" dirty="0"/>
+              <a:t>Table across slides </a:t>
+            </a:r>
+            <a:endParaRPr lang="hr-HR" sz="1100" dirty="0"/>
+          </a:p>
+        </p:txBody>
+      </p:sp>
+      <p:graphicFrame>
+        <p:nvGraphicFramePr>
+          <p:cNvPr id="6" name="Table 6">
+            <a:extLst>
+              <a:ext uri="{FF2B5EF4-FFF2-40B4-BE49-F238E27FC236}">
+                <a16:creationId xmlns:a16="http://schemas.microsoft.com/office/drawing/2014/main" id="{0AB68139-9E32-4ECD-BF6E-61B5936F6459}"/>
+              </a:ext>
+            </a:extLst>
+          </p:cNvPr>
+          <p:cNvGraphicFramePr>
+            <a:graphicFrameLocks noGrp="1"/>
+          </p:cNvGraphicFramePr>
+          <p:nvPr>
+            <p:ph idx="1"/>
+            <p:extLst>
+              <p:ext uri="{D42A27DB-BD31-4B8C-83A1-F6EECF244321}">
+                <p14:modId xmlns:p14="http://schemas.microsoft.com/office/powerpoint/2010/main" val="3547349588"/>
+              </p:ext>
+            </p:extLst>
+          </p:nvPr>
+        </p:nvGraphicFramePr>
+        <p:xfrm>
+          <a:off x="1435100" y="1447800"/>
+          <a:ext cx="7499349" cy="741680"/>
+        </p:xfrm>
+        <a:graphic>
+          <a:graphicData uri="http://schemas.openxmlformats.org/drawingml/2006/table">
+            <a:tbl>
+              <a:tblPr firstRow="1" bandRow="1">
+                <a:tableStyleId>{5C22544A-7EE6-4342-B048-85BDC9FD1C3A}</a:tableStyleId>
+              </a:tblPr>
+              <a:tblGrid>
+                <a:gridCol w="2499783">
+                  <a:extLst>
+                    <a:ext uri="{9D8B030D-6E8A-4147-A177-3AD203B41FA5}">
+                      <a16:colId xmlns:a16="http://schemas.microsoft.com/office/drawing/2014/main" val="2679471042"/>
+                    </a:ext>
+                  </a:extLst>
+                </a:gridCol>
+                <a:gridCol w="2499783">
+                  <a:extLst>
+                    <a:ext uri="{9D8B030D-6E8A-4147-A177-3AD203B41FA5}">
+                      <a16:colId xmlns:a16="http://schemas.microsoft.com/office/drawing/2014/main" val="2360038478"/>
+                    </a:ext>
+                  </a:extLst>
+                </a:gridCol>
+                <a:gridCol w="2499783">
+                  <a:extLst>
+                    <a:ext uri="{9D8B030D-6E8A-4147-A177-3AD203B41FA5}">
+                      <a16:colId xmlns:a16="http://schemas.microsoft.com/office/drawing/2014/main" val="3282142002"/>
+                    </a:ext>
+                  </a:extLst>
+                </a:gridCol>
+              </a:tblGrid>
+              <a:tr h="370840">
+                <a:tc>
+                  <a:txBody>
+                    <a:bodyPr/>
+                    <a:lstStyle/>
+                    <a:p>
+                      <a:r>
+                        <a:rPr lang="en-US" dirty="0"/>
+                        <a:t>Col A</a:t>
+                      </a:r>
+                      <a:endParaRPr lang="hr-HR" dirty="0"/>
+                    </a:p>
+                  </a:txBody>
+                  <a:tcPr/>
+                </a:tc>
+                <a:tc>
+                  <a:txBody>
+                    <a:bodyPr/>
+                    <a:lstStyle/>
+                    <a:p>
+                      <a:r>
+                        <a:rPr lang="en-US" dirty="0"/>
+                        <a:t>Column B</a:t>
+                      </a:r>
+                      <a:endParaRPr lang="hr-HR" dirty="0"/>
+                    </a:p>
+                  </a:txBody>
+                  <a:tcPr/>
+                </a:tc>
+                <a:tc>
+                  <a:txBody>
+                    <a:bodyPr/>
+                    <a:lstStyle/>
+                    <a:p>
+                      <a:r>
+                        <a:rPr lang="en-US" dirty="0"/>
+                        <a:t>Last column</a:t>
+                      </a:r>
+                      <a:endParaRPr lang="hr-HR" dirty="0"/>
+                    </a:p>
+                  </a:txBody>
+                  <a:tcPr/>
+                </a:tc>
+                <a:extLst>
+                  <a:ext uri="{0D108BD9-81ED-4DB2-BD59-A6C34878D82A}">
+                    <a16:rowId xmlns:a16="http://schemas.microsoft.com/office/drawing/2014/main" val="781833061"/>
+                  </a:ext>
+                </a:extLst>
+              </a:tr>
+              <a:tr h="370840">
+                <a:tc>
+                  <a:txBody>
+                    <a:bodyPr/>
+                    <a:lstStyle/>
+                    <a:p>
+                      <a:r>
+                        <a:rPr lang="en-US" dirty="0"/>
+                        <a:t>A - 11</a:t>
+                      </a:r>
+                      <a:endParaRPr lang="hr-HR" dirty="0"/>
+                    </a:p>
+                  </a:txBody>
+                  <a:tcPr/>
+                </a:tc>
+                <a:tc>
+                  <a:txBody>
+                    <a:bodyPr/>
+                    <a:lstStyle/>
+                    <a:p>
+                      <a:pPr marL="0" marR="0" lvl="0" indent="0" algn="l" defTabSz="914400" rtl="0" eaLnBrk="1" fontAlgn="auto" latinLnBrk="0" hangingPunct="1">
+                        <a:lnSpc>
+                          <a:spcPct val="100000"/>
+                        </a:lnSpc>
+                        <a:spcBef>
+                          <a:spcPts val="0"/>
+                        </a:spcBef>
+                        <a:spcAft>
+                          <a:spcPts val="0"/>
+                        </a:spcAft>
+                        <a:buClrTx/>
+                        <a:buSzTx/>
+                        <a:buFontTx/>
+                        <a:buNone/>
+                        <a:tabLst/>
+                        <a:defRPr/>
+                      </a:pPr>
+                      <a:r>
+                        <a:rPr lang="en-US" dirty="0"/>
+                        <a:t>B - 11</a:t>
+                      </a:r>
+                      <a:endParaRPr lang="hr-HR" dirty="0"/>
+                    </a:p>
+                  </a:txBody>
+                  <a:tcPr/>
+                </a:tc>
+                <a:tc>
+                  <a:txBody>
+                    <a:bodyPr/>
+                    <a:lstStyle/>
+                    <a:p>
+                      <a:pPr marL="0" marR="0" lvl="0" indent="0" algn="l" defTabSz="914400" rtl="0" eaLnBrk="1" fontAlgn="auto" latinLnBrk="0" hangingPunct="1">
+                        <a:lnSpc>
+                          <a:spcPct val="100000"/>
+                        </a:lnSpc>
+                        <a:spcBef>
+                          <a:spcPts val="0"/>
+                        </a:spcBef>
+                        <a:spcAft>
+                          <a:spcPts val="0"/>
+                        </a:spcAft>
+                        <a:buClrTx/>
+                        <a:buSzTx/>
+                        <a:buFontTx/>
+                        <a:buNone/>
+                        <a:tabLst/>
+                        <a:defRPr/>
+                      </a:pPr>
+                      <a:r>
+                        <a:rPr lang="en-US" dirty="0"/>
+                        <a:t>C - 11</a:t>
+                      </a:r>
+                      <a:endParaRPr lang="hr-HR" dirty="0"/>
+                    </a:p>
+                  </a:txBody>
+                  <a:tcPr/>
+                </a:tc>
+                <a:extLst>
+                  <a:ext uri="{0D108BD9-81ED-4DB2-BD59-A6C34878D82A}">
+                    <a16:rowId xmlns:a16="http://schemas.microsoft.com/office/drawing/2014/main" val="2747685484"/>
+                  </a:ext>
+                </a:extLst>
+              </a:tr>
+              <a:tr h="370840">
+                <a:tc>
+                  <a:txBody>
+                    <a:bodyPr/>
+                    <a:lstStyle/>
+                    <a:p>
+                      <a:r>
+                        <a:rPr lang="en-US" dirty="0"/>
+                        <a:t>A - 12</a:t>
+                      </a:r>
+                      <a:endParaRPr lang="hr-HR" dirty="0"/>
+                    </a:p>
+                  </a:txBody>
+                  <a:tcPr/>
+                </a:tc>
+                <a:tc>
+                  <a:txBody>
+                    <a:bodyPr/>
+                    <a:lstStyle/>
+                    <a:p>
+                      <a:pPr marL="0" marR="0" lvl="0" indent="0" algn="l" defTabSz="914400" rtl="0" eaLnBrk="1" fontAlgn="auto" latinLnBrk="0" hangingPunct="1">
+                        <a:lnSpc>
+                          <a:spcPct val="100000"/>
+                        </a:lnSpc>
+                        <a:spcBef>
+                          <a:spcPts val="0"/>
+                        </a:spcBef>
+                        <a:spcAft>
+                          <a:spcPts val="0"/>
+                        </a:spcAft>
+                        <a:buClrTx/>
+                        <a:buSzTx/>
+                        <a:buFontTx/>
+                        <a:buNone/>
+                        <a:tabLst/>
+                        <a:defRPr/>
+                      </a:pPr>
+                      <a:r>
+                        <a:rPr lang="en-US" dirty="0"/>
+                        <a:t>B - 12</a:t>
+                      </a:r>
+                      <a:endParaRPr lang="hr-HR" dirty="0"/>
+                    </a:p>
+                  </a:txBody>
+                  <a:tcPr/>
+                </a:tc>
+                <a:tc>
+                  <a:txBody>
+                    <a:bodyPr/>
+                    <a:lstStyle/>
+                    <a:p>
+                      <a:pPr marL="0" marR="0" lvl="0" indent="0" algn="l" defTabSz="914400" rtl="0" eaLnBrk="1" fontAlgn="auto" latinLnBrk="0" hangingPunct="1">
+                        <a:lnSpc>
+                          <a:spcPct val="100000"/>
+                        </a:lnSpc>
+                        <a:spcBef>
+                          <a:spcPts val="0"/>
+                        </a:spcBef>
+                        <a:spcAft>
+                          <a:spcPts val="0"/>
+                        </a:spcAft>
+                        <a:buClrTx/>
+                        <a:buSzTx/>
+                        <a:buFontTx/>
+                        <a:buNone/>
+                        <a:tabLst/>
+                        <a:defRPr/>
+                      </a:pPr>
+                      <a:r>
+                        <a:rPr lang="en-US" dirty="0"/>
+                        <a:t>C - 12</a:t>
+                      </a:r>
+                      <a:endParaRPr lang="hr-HR" dirty="0"/>
+                    </a:p>
+                  </a:txBody>
+                  <a:tcPr/>
+                </a:tc>
+                <a:extLst>
+                  <a:ext uri="{0D108BD9-81ED-4DB2-BD59-A6C34878D82A}">
+                    <a16:rowId xmlns:a16="http://schemas.microsoft.com/office/drawing/2014/main" val="1292625326"/>
+                  </a:ext>
+                </a:extLst>
+              </a:tr>
+              <a:tr h="370840">
+                <a:tc>
+                  <a:txBody>
+                    <a:bodyPr/>
+                    <a:lstStyle/>
+                    <a:p>
+                      <a:r>
+                        <a:rPr lang="en-US" dirty="0"/>
+                        <a:t>A - 13</a:t>
+                      </a:r>
+                      <a:endParaRPr lang="hr-HR" dirty="0"/>
+                    </a:p>
+                  </a:txBody>
+                  <a:tcPr/>
+                </a:tc>
+                <a:tc>
+                  <a:txBody>
+                    <a:bodyPr/>
+                    <a:lstStyle/>
+                    <a:p>
+                      <a:pPr marL="0" marR="0" lvl="0" indent="0" algn="l" defTabSz="914400" rtl="0" eaLnBrk="1" fontAlgn="auto" latinLnBrk="0" hangingPunct="1">
+                        <a:lnSpc>
+                          <a:spcPct val="100000"/>
+                        </a:lnSpc>
+                        <a:spcBef>
+                          <a:spcPts val="0"/>
+                        </a:spcBef>
+                        <a:spcAft>
+                          <a:spcPts val="0"/>
+                        </a:spcAft>
+                        <a:buClrTx/>
+                        <a:buSzTx/>
+                        <a:buFontTx/>
+                        <a:buNone/>
+                        <a:tabLst/>
+                        <a:defRPr/>
+                      </a:pPr>
+                      <a:r>
+                        <a:rPr lang="en-US" dirty="0"/>
+                        <a:t>B - 13</a:t>
+                      </a:r>
+                      <a:endParaRPr lang="hr-HR" dirty="0"/>
+                    </a:p>
+                  </a:txBody>
+                  <a:tcPr/>
+                </a:tc>
+                <a:tc>
+                  <a:txBody>
+                    <a:bodyPr/>
+                    <a:lstStyle/>
+                    <a:p>
+                      <a:pPr marL="0" marR="0" lvl="0" indent="0" algn="l" defTabSz="914400" rtl="0" eaLnBrk="1" fontAlgn="auto" latinLnBrk="0" hangingPunct="1">
+                        <a:lnSpc>
+                          <a:spcPct val="100000"/>
+                        </a:lnSpc>
+                        <a:spcBef>
+                          <a:spcPts val="0"/>
+                        </a:spcBef>
+                        <a:spcAft>
+                          <a:spcPts val="0"/>
+                        </a:spcAft>
+                        <a:buClrTx/>
+                        <a:buSzTx/>
+                        <a:buFontTx/>
+                        <a:buNone/>
+                        <a:tabLst/>
+                        <a:defRPr/>
+                      </a:pPr>
+                      <a:r>
+                        <a:rPr lang="en-US" dirty="0"/>
+                        <a:t>C - 13</a:t>
+                      </a:r>
+                      <a:endParaRPr lang="hr-HR" dirty="0"/>
+                    </a:p>
+                  </a:txBody>
+                  <a:tcPr/>
+                </a:tc>
+                <a:extLst>
+                  <a:ext uri="{0D108BD9-81ED-4DB2-BD59-A6C34878D82A}">
+                    <a16:rowId xmlns:a16="http://schemas.microsoft.com/office/drawing/2014/main" val="3974905151"/>
+                  </a:ext>
+                </a:extLst>
+              </a:tr>
+              <a:tr h="370840">
+                <a:tc>
+                  <a:txBody>
+                    <a:bodyPr/>
+                    <a:lstStyle/>
+                    <a:p>
+                      <a:r>
+                        <a:rPr lang="en-US" dirty="0"/>
+                        <a:t>A - 14</a:t>
+                      </a:r>
+                      <a:endParaRPr lang="hr-HR" dirty="0"/>
+                    </a:p>
+                  </a:txBody>
+                  <a:tcPr/>
+                </a:tc>
+                <a:tc>
+                  <a:txBody>
+                    <a:bodyPr/>
+                    <a:lstStyle/>
+                    <a:p>
+                      <a:pPr marL="0" marR="0" lvl="0" indent="0" algn="l" defTabSz="914400" rtl="0" eaLnBrk="1" fontAlgn="auto" latinLnBrk="0" hangingPunct="1">
+                        <a:lnSpc>
+                          <a:spcPct val="100000"/>
+                        </a:lnSpc>
+                        <a:spcBef>
+                          <a:spcPts val="0"/>
+                        </a:spcBef>
+                        <a:spcAft>
+                          <a:spcPts val="0"/>
+                        </a:spcAft>
+                        <a:buClrTx/>
+                        <a:buSzTx/>
+                        <a:buFontTx/>
+                        <a:buNone/>
+                        <a:tabLst/>
+                        <a:defRPr/>
+                      </a:pPr>
+                      <a:r>
+                        <a:rPr lang="en-US" dirty="0"/>
+                        <a:t>B - 14</a:t>
+                      </a:r>
+                      <a:endParaRPr lang="hr-HR" dirty="0"/>
+                    </a:p>
+                  </a:txBody>
+                  <a:tcPr/>
+                </a:tc>
+                <a:tc>
+                  <a:txBody>
+                    <a:bodyPr/>
+                    <a:lstStyle/>
+                    <a:p>
+                      <a:pPr marL="0" marR="0" lvl="0" indent="0" algn="l" defTabSz="914400" rtl="0" eaLnBrk="1" fontAlgn="auto" latinLnBrk="0" hangingPunct="1">
+                        <a:lnSpc>
+                          <a:spcPct val="100000"/>
+                        </a:lnSpc>
+                        <a:spcBef>
+                          <a:spcPts val="0"/>
+                        </a:spcBef>
+                        <a:spcAft>
+                          <a:spcPts val="0"/>
+                        </a:spcAft>
+                        <a:buClrTx/>
+                        <a:buSzTx/>
+                        <a:buFontTx/>
+                        <a:buNone/>
+                        <a:tabLst/>
+                        <a:defRPr/>
+                      </a:pPr>
+                      <a:r>
+                        <a:rPr lang="en-US" dirty="0"/>
+                        <a:t>C - 14</a:t>
+                      </a:r>
+                      <a:endParaRPr lang="hr-HR" dirty="0"/>
+                    </a:p>
+                  </a:txBody>
+                  <a:tcPr/>
+                </a:tc>
+                <a:extLst>
+                  <a:ext uri="{0D108BD9-81ED-4DB2-BD59-A6C34878D82A}">
+                    <a16:rowId xmlns:a16="http://schemas.microsoft.com/office/drawing/2014/main" val="3220345410"/>
+                  </a:ext>
+                </a:extLst>
+              </a:tr>
+              <a:tr h="370840">
+                <a:tc>
+                  <a:txBody>
+                    <a:bodyPr/>
+                    <a:lstStyle/>
+                    <a:p>
+                      <a:r>
+                        <a:rPr lang="en-US" dirty="0"/>
+                        <a:t>A - 15</a:t>
+                      </a:r>
+                      <a:endParaRPr lang="hr-HR" dirty="0"/>
+                    </a:p>
+                  </a:txBody>
+                  <a:tcPr/>
+                </a:tc>
+                <a:tc>
+                  <a:txBody>
+                    <a:bodyPr/>
+                    <a:lstStyle/>
+                    <a:p>
+                      <a:pPr marL="0" marR="0" lvl="0" indent="0" algn="l" defTabSz="914400" rtl="0" eaLnBrk="1" fontAlgn="auto" latinLnBrk="0" hangingPunct="1">
+                        <a:lnSpc>
+                          <a:spcPct val="100000"/>
+                        </a:lnSpc>
+                        <a:spcBef>
+                          <a:spcPts val="0"/>
+                        </a:spcBef>
+                        <a:spcAft>
+                          <a:spcPts val="0"/>
+                        </a:spcAft>
+                        <a:buClrTx/>
+                        <a:buSzTx/>
+                        <a:buFontTx/>
+                        <a:buNone/>
+                        <a:tabLst/>
+                        <a:defRPr/>
+                      </a:pPr>
+                      <a:r>
+                        <a:rPr lang="en-US" dirty="0"/>
+                        <a:t>B - 15</a:t>
+                      </a:r>
+                      <a:endParaRPr lang="hr-HR" dirty="0"/>
+                    </a:p>
+                  </a:txBody>
+                  <a:tcPr/>
+                </a:tc>
+                <a:tc>
+                  <a:txBody>
+                    <a:bodyPr/>
+                    <a:lstStyle/>
+                    <a:p>
+                      <a:pPr marL="0" marR="0" lvl="0" indent="0" algn="l" defTabSz="914400" rtl="0" eaLnBrk="1" fontAlgn="auto" latinLnBrk="0" hangingPunct="1">
+                        <a:lnSpc>
+                          <a:spcPct val="100000"/>
+                        </a:lnSpc>
+                        <a:spcBef>
+                          <a:spcPts val="0"/>
+                        </a:spcBef>
+                        <a:spcAft>
+                          <a:spcPts val="0"/>
+                        </a:spcAft>
+                        <a:buClrTx/>
+                        <a:buSzTx/>
+                        <a:buFontTx/>
+                        <a:buNone/>
+                        <a:tabLst/>
+                        <a:defRPr/>
+                      </a:pPr>
+                      <a:r>
+                        <a:rPr lang="en-US" dirty="0"/>
+                        <a:t>C - 15</a:t>
+                      </a:r>
+                      <a:endParaRPr lang="hr-HR" dirty="0"/>
+                    </a:p>
+                  </a:txBody>
+                  <a:tcPr/>
+                </a:tc>
+                <a:extLst>
+                  <a:ext uri="{0D108BD9-81ED-4DB2-BD59-A6C34878D82A}">
+                    <a16:rowId xmlns:a16="http://schemas.microsoft.com/office/drawing/2014/main" val="1505839542"/>
+                  </a:ext>
+                </a:extLst>
+              </a:tr>
+            </a:tbl>
+          </a:graphicData>
+        </a:graphic>
+      </p:graphicFrame>
+    </p:spTree>
+    <p:extLst>
+      <p:ext uri="{BB962C8B-B14F-4D97-AF65-F5344CB8AC3E}">
+        <p14:creationId xmlns:p14="http://schemas.microsoft.com/office/powerpoint/2010/main" val="3204950218"/>
       </p:ext>
     </p:extLst>
   </p:cSld>

</xml_diff>

<commit_message>
Expand table splitting pptx example
Show how to present footer row only on the last page (collapse/remove tags/rows when its not last page).
Also show how to present some table level aggregate on that last table, which is across entire table, not just entries on that slide.
</commit_message>
<xml_diff>
--- a/Intermediate/SharedCharts/result.pptx
+++ b/Intermediate/SharedCharts/result.pptx
@@ -1814,7 +1814,7 @@
             <a:fld id="{782AB740-377D-4BC2-A984-084B0CA75466}" type="datetimeFigureOut">
               <a:rPr lang="hr-HR" smtClean="0"/>
               <a:pPr/>
-              <a:t>22.9.2024.</a:t>
+              <a:t>29.9.2024.</a:t>
             </a:fld>
             <a:endParaRPr lang="hr-HR"/>
           </a:p>
@@ -2114,7 +2114,7 @@
             <a:fld id="{782AB740-377D-4BC2-A984-084B0CA75466}" type="datetimeFigureOut">
               <a:rPr lang="hr-HR" smtClean="0"/>
               <a:pPr/>
-              <a:t>22.9.2024.</a:t>
+              <a:t>29.9.2024.</a:t>
             </a:fld>
             <a:endParaRPr lang="hr-HR"/>
           </a:p>
@@ -2290,7 +2290,7 @@
             <a:fld id="{782AB740-377D-4BC2-A984-084B0CA75466}" type="datetimeFigureOut">
               <a:rPr lang="hr-HR" smtClean="0"/>
               <a:pPr/>
-              <a:t>22.9.2024.</a:t>
+              <a:t>29.9.2024.</a:t>
             </a:fld>
             <a:endParaRPr lang="hr-HR"/>
           </a:p>
@@ -2456,7 +2456,7 @@
             <a:fld id="{782AB740-377D-4BC2-A984-084B0CA75466}" type="datetimeFigureOut">
               <a:rPr lang="hr-HR" smtClean="0"/>
               <a:pPr/>
-              <a:t>22.9.2024.</a:t>
+              <a:t>29.9.2024.</a:t>
             </a:fld>
             <a:endParaRPr lang="hr-HR"/>
           </a:p>
@@ -2717,7 +2717,7 @@
             <a:fld id="{782AB740-377D-4BC2-A984-084B0CA75466}" type="datetimeFigureOut">
               <a:rPr lang="hr-HR" smtClean="0"/>
               <a:pPr/>
-              <a:t>22.9.2024.</a:t>
+              <a:t>29.9.2024.</a:t>
             </a:fld>
             <a:endParaRPr lang="hr-HR"/>
           </a:p>
@@ -3172,7 +3172,7 @@
             <a:fld id="{782AB740-377D-4BC2-A984-084B0CA75466}" type="datetimeFigureOut">
               <a:rPr lang="hr-HR" smtClean="0"/>
               <a:pPr/>
-              <a:t>22.9.2024.</a:t>
+              <a:t>29.9.2024.</a:t>
             </a:fld>
             <a:endParaRPr lang="hr-HR"/>
           </a:p>
@@ -3656,7 +3656,7 @@
             <a:fld id="{782AB740-377D-4BC2-A984-084B0CA75466}" type="datetimeFigureOut">
               <a:rPr lang="hr-HR" smtClean="0"/>
               <a:pPr/>
-              <a:t>22.9.2024.</a:t>
+              <a:t>29.9.2024.</a:t>
             </a:fld>
             <a:endParaRPr lang="hr-HR"/>
           </a:p>
@@ -3775,7 +3775,7 @@
             <a:fld id="{782AB740-377D-4BC2-A984-084B0CA75466}" type="datetimeFigureOut">
               <a:rPr lang="hr-HR" smtClean="0"/>
               <a:pPr/>
-              <a:t>22.9.2024.</a:t>
+              <a:t>29.9.2024.</a:t>
             </a:fld>
             <a:endParaRPr lang="hr-HR"/>
           </a:p>
@@ -3913,7 +3913,7 @@
             <a:fld id="{782AB740-377D-4BC2-A984-084B0CA75466}" type="datetimeFigureOut">
               <a:rPr lang="hr-HR" smtClean="0"/>
               <a:pPr/>
-              <a:t>22.9.2024.</a:t>
+              <a:t>29.9.2024.</a:t>
             </a:fld>
             <a:endParaRPr lang="hr-HR"/>
           </a:p>
@@ -4228,7 +4228,7 @@
             <a:fld id="{782AB740-377D-4BC2-A984-084B0CA75466}" type="datetimeFigureOut">
               <a:rPr lang="hr-HR" smtClean="0"/>
               <a:pPr/>
-              <a:t>22.9.2024.</a:t>
+              <a:t>29.9.2024.</a:t>
             </a:fld>
             <a:endParaRPr lang="hr-HR"/>
           </a:p>
@@ -4357,7 +4357,7 @@
             <a:fld id="{782AB740-377D-4BC2-A984-084B0CA75466}" type="datetimeFigureOut">
               <a:rPr lang="hr-HR" smtClean="0"/>
               <a:pPr/>
-              <a:t>22.9.2024.</a:t>
+              <a:t>29.9.2024.</a:t>
             </a:fld>
             <a:endParaRPr lang="hr-HR"/>
           </a:p>
@@ -5116,7 +5116,7 @@
             <a:fld id="{782AB740-377D-4BC2-A984-084B0CA75466}" type="datetimeFigureOut">
               <a:rPr lang="hr-HR" smtClean="0"/>
               <a:pPr/>
-              <a:t>22.9.2024.</a:t>
+              <a:t>29.9.2024.</a:t>
             </a:fld>
             <a:endParaRPr lang="hr-HR"/>
           </a:p>
@@ -5960,14 +5960,14 @@
             <p:ph idx="1"/>
             <p:extLst>
               <p:ext uri="{D42A27DB-BD31-4B8C-83A1-F6EECF244321}">
-                <p14:modId xmlns:p14="http://schemas.microsoft.com/office/powerpoint/2010/main" val="3547349588"/>
+                <p14:modId xmlns:p14="http://schemas.microsoft.com/office/powerpoint/2010/main" val="959251903"/>
               </p:ext>
             </p:extLst>
           </p:nvPr>
         </p:nvGraphicFramePr>
         <p:xfrm>
           <a:off x="1435100" y="1447800"/>
-          <a:ext cx="7499349" cy="741680"/>
+          <a:ext cx="7499349" cy="4079240"/>
         </p:xfrm>
         <a:graphic>
           <a:graphicData uri="http://schemas.openxmlformats.org/drawingml/2006/table">
@@ -6086,7 +6086,7 @@
                       </a:pPr>
                       <a:r>
                         <a:rPr lang="en-US" dirty="0"/>
-                        <a:t>B - 1</a:t>
+                        <a:t>1</a:t>
                       </a:r>
                       <a:endParaRPr lang="hr-HR" dirty="0"/>
                     </a:p>
@@ -6169,7 +6169,7 @@
                       </a:pPr>
                       <a:r>
                         <a:rPr lang="en-US" dirty="0"/>
-                        <a:t>B - 2</a:t>
+                        <a:t>2</a:t>
                       </a:r>
                       <a:endParaRPr lang="hr-HR" dirty="0"/>
                     </a:p>
@@ -6209,7 +6209,7 @@
                 </a:tc>
                 <a:extLst>
                   <a:ext uri="{0D108BD9-81ED-4DB2-BD59-A6C34878D82A}">
-                    <a16:rowId xmlns:a16="http://schemas.microsoft.com/office/drawing/2014/main" val="3505102660"/>
+                    <a16:rowId xmlns:a16="http://schemas.microsoft.com/office/drawing/2014/main" val="2747685485"/>
                   </a:ext>
                 </a:extLst>
               </a:tr>
@@ -6252,7 +6252,7 @@
                       </a:pPr>
                       <a:r>
                         <a:rPr lang="en-US" dirty="0"/>
-                        <a:t>B - 3</a:t>
+                        <a:t>3</a:t>
                       </a:r>
                       <a:endParaRPr lang="hr-HR" dirty="0"/>
                     </a:p>
@@ -6292,7 +6292,7 @@
                 </a:tc>
                 <a:extLst>
                   <a:ext uri="{0D108BD9-81ED-4DB2-BD59-A6C34878D82A}">
-                    <a16:rowId xmlns:a16="http://schemas.microsoft.com/office/drawing/2014/main" val="3603381165"/>
+                    <a16:rowId xmlns:a16="http://schemas.microsoft.com/office/drawing/2014/main" val="2747685486"/>
                   </a:ext>
                 </a:extLst>
               </a:tr>
@@ -6335,7 +6335,7 @@
                       </a:pPr>
                       <a:r>
                         <a:rPr lang="en-US" dirty="0"/>
-                        <a:t>B - 4</a:t>
+                        <a:t>4</a:t>
                       </a:r>
                       <a:endParaRPr lang="hr-HR" dirty="0"/>
                     </a:p>
@@ -6375,7 +6375,7 @@
                 </a:tc>
                 <a:extLst>
                   <a:ext uri="{0D108BD9-81ED-4DB2-BD59-A6C34878D82A}">
-                    <a16:rowId xmlns:a16="http://schemas.microsoft.com/office/drawing/2014/main" val="563858958"/>
+                    <a16:rowId xmlns:a16="http://schemas.microsoft.com/office/drawing/2014/main" val="2747685487"/>
                   </a:ext>
                 </a:extLst>
               </a:tr>
@@ -6418,7 +6418,7 @@
                       </a:pPr>
                       <a:r>
                         <a:rPr lang="en-US" dirty="0"/>
-                        <a:t>B - 5</a:t>
+                        <a:t>5</a:t>
                       </a:r>
                       <a:endParaRPr lang="hr-HR" dirty="0"/>
                     </a:p>
@@ -6458,7 +6458,7 @@
                 </a:tc>
                 <a:extLst>
                   <a:ext uri="{0D108BD9-81ED-4DB2-BD59-A6C34878D82A}">
-                    <a16:rowId xmlns:a16="http://schemas.microsoft.com/office/drawing/2014/main" val="1656705359"/>
+                    <a16:rowId xmlns:a16="http://schemas.microsoft.com/office/drawing/2014/main" val="2747685488"/>
                   </a:ext>
                 </a:extLst>
               </a:tr>
@@ -6501,7 +6501,7 @@
                       </a:pPr>
                       <a:r>
                         <a:rPr lang="en-US" dirty="0"/>
-                        <a:t>B - 6</a:t>
+                        <a:t>6</a:t>
                       </a:r>
                       <a:endParaRPr lang="hr-HR" dirty="0"/>
                     </a:p>
@@ -6541,7 +6541,7 @@
                 </a:tc>
                 <a:extLst>
                   <a:ext uri="{0D108BD9-81ED-4DB2-BD59-A6C34878D82A}">
-                    <a16:rowId xmlns:a16="http://schemas.microsoft.com/office/drawing/2014/main" val="3268701374"/>
+                    <a16:rowId xmlns:a16="http://schemas.microsoft.com/office/drawing/2014/main" val="2747685489"/>
                   </a:ext>
                 </a:extLst>
               </a:tr>
@@ -6584,7 +6584,7 @@
                       </a:pPr>
                       <a:r>
                         <a:rPr lang="en-US" dirty="0"/>
-                        <a:t>B - 7</a:t>
+                        <a:t>7</a:t>
                       </a:r>
                       <a:endParaRPr lang="hr-HR" dirty="0"/>
                     </a:p>
@@ -6624,7 +6624,7 @@
                 </a:tc>
                 <a:extLst>
                   <a:ext uri="{0D108BD9-81ED-4DB2-BD59-A6C34878D82A}">
-                    <a16:rowId xmlns:a16="http://schemas.microsoft.com/office/drawing/2014/main" val="628089323"/>
+                    <a16:rowId xmlns:a16="http://schemas.microsoft.com/office/drawing/2014/main" val="2747685490"/>
                   </a:ext>
                 </a:extLst>
               </a:tr>
@@ -6667,7 +6667,7 @@
                       </a:pPr>
                       <a:r>
                         <a:rPr lang="en-US" dirty="0"/>
-                        <a:t>B - 8</a:t>
+                        <a:t>8</a:t>
                       </a:r>
                       <a:endParaRPr lang="hr-HR" dirty="0"/>
                     </a:p>
@@ -6707,7 +6707,7 @@
                 </a:tc>
                 <a:extLst>
                   <a:ext uri="{0D108BD9-81ED-4DB2-BD59-A6C34878D82A}">
-                    <a16:rowId xmlns:a16="http://schemas.microsoft.com/office/drawing/2014/main" val="30369001"/>
+                    <a16:rowId xmlns:a16="http://schemas.microsoft.com/office/drawing/2014/main" val="2747685491"/>
                   </a:ext>
                 </a:extLst>
               </a:tr>
@@ -6750,7 +6750,7 @@
                       </a:pPr>
                       <a:r>
                         <a:rPr lang="en-US" dirty="0"/>
-                        <a:t>B - 9</a:t>
+                        <a:t>9</a:t>
                       </a:r>
                       <a:endParaRPr lang="hr-HR" dirty="0"/>
                     </a:p>
@@ -6790,7 +6790,7 @@
                 </a:tc>
                 <a:extLst>
                   <a:ext uri="{0D108BD9-81ED-4DB2-BD59-A6C34878D82A}">
-                    <a16:rowId xmlns:a16="http://schemas.microsoft.com/office/drawing/2014/main" val="587740511"/>
+                    <a16:rowId xmlns:a16="http://schemas.microsoft.com/office/drawing/2014/main" val="2747685492"/>
                   </a:ext>
                 </a:extLst>
               </a:tr>
@@ -6833,7 +6833,7 @@
                       </a:pPr>
                       <a:r>
                         <a:rPr lang="en-US" dirty="0"/>
-                        <a:t>B - 10</a:t>
+                        <a:t>10</a:t>
                       </a:r>
                       <a:endParaRPr lang="hr-HR" dirty="0"/>
                     </a:p>
@@ -6873,7 +6873,7 @@
                 </a:tc>
                 <a:extLst>
                   <a:ext uri="{0D108BD9-81ED-4DB2-BD59-A6C34878D82A}">
-                    <a16:rowId xmlns:a16="http://schemas.microsoft.com/office/drawing/2014/main" val="338967227"/>
+                    <a16:rowId xmlns:a16="http://schemas.microsoft.com/office/drawing/2014/main" val="2747685493"/>
                   </a:ext>
                 </a:extLst>
               </a:tr>
@@ -6958,14 +6958,14 @@
             <p:ph idx="1"/>
             <p:extLst>
               <p:ext uri="{D42A27DB-BD31-4B8C-83A1-F6EECF244321}">
-                <p14:modId xmlns:p14="http://schemas.microsoft.com/office/powerpoint/2010/main" val="3547349588"/>
+                <p14:modId xmlns:p14="http://schemas.microsoft.com/office/powerpoint/2010/main" val="959251903"/>
               </p:ext>
             </p:extLst>
           </p:nvPr>
         </p:nvGraphicFramePr>
         <p:xfrm>
           <a:off x="1435100" y="1447800"/>
-          <a:ext cx="7499349" cy="741680"/>
+          <a:ext cx="7499349" cy="2595880"/>
         </p:xfrm>
         <a:graphic>
           <a:graphicData uri="http://schemas.openxmlformats.org/drawingml/2006/table">
@@ -7084,7 +7084,7 @@
                       </a:pPr>
                       <a:r>
                         <a:rPr lang="en-US" dirty="0"/>
-                        <a:t>B - 11</a:t>
+                        <a:t>11</a:t>
                       </a:r>
                       <a:endParaRPr lang="hr-HR" dirty="0"/>
                     </a:p>
@@ -7167,7 +7167,7 @@
                       </a:pPr>
                       <a:r>
                         <a:rPr lang="en-US" dirty="0"/>
-                        <a:t>B - 12</a:t>
+                        <a:t>12</a:t>
                       </a:r>
                       <a:endParaRPr lang="hr-HR" dirty="0"/>
                     </a:p>
@@ -7207,7 +7207,7 @@
                 </a:tc>
                 <a:extLst>
                   <a:ext uri="{0D108BD9-81ED-4DB2-BD59-A6C34878D82A}">
-                    <a16:rowId xmlns:a16="http://schemas.microsoft.com/office/drawing/2014/main" val="1292625326"/>
+                    <a16:rowId xmlns:a16="http://schemas.microsoft.com/office/drawing/2014/main" val="2747685494"/>
                   </a:ext>
                 </a:extLst>
               </a:tr>
@@ -7250,7 +7250,7 @@
                       </a:pPr>
                       <a:r>
                         <a:rPr lang="en-US" dirty="0"/>
-                        <a:t>B - 13</a:t>
+                        <a:t>13</a:t>
                       </a:r>
                       <a:endParaRPr lang="hr-HR" dirty="0"/>
                     </a:p>
@@ -7290,7 +7290,7 @@
                 </a:tc>
                 <a:extLst>
                   <a:ext uri="{0D108BD9-81ED-4DB2-BD59-A6C34878D82A}">
-                    <a16:rowId xmlns:a16="http://schemas.microsoft.com/office/drawing/2014/main" val="3974905151"/>
+                    <a16:rowId xmlns:a16="http://schemas.microsoft.com/office/drawing/2014/main" val="2747685495"/>
                   </a:ext>
                 </a:extLst>
               </a:tr>
@@ -7333,7 +7333,7 @@
                       </a:pPr>
                       <a:r>
                         <a:rPr lang="en-US" dirty="0"/>
-                        <a:t>B - 14</a:t>
+                        <a:t>14</a:t>
                       </a:r>
                       <a:endParaRPr lang="hr-HR" dirty="0"/>
                     </a:p>
@@ -7373,7 +7373,7 @@
                 </a:tc>
                 <a:extLst>
                   <a:ext uri="{0D108BD9-81ED-4DB2-BD59-A6C34878D82A}">
-                    <a16:rowId xmlns:a16="http://schemas.microsoft.com/office/drawing/2014/main" val="3220345410"/>
+                    <a16:rowId xmlns:a16="http://schemas.microsoft.com/office/drawing/2014/main" val="2747685496"/>
                   </a:ext>
                 </a:extLst>
               </a:tr>
@@ -7416,7 +7416,7 @@
                       </a:pPr>
                       <a:r>
                         <a:rPr lang="en-US" dirty="0"/>
-                        <a:t>B - 15</a:t>
+                        <a:t>15</a:t>
                       </a:r>
                       <a:endParaRPr lang="hr-HR" dirty="0"/>
                     </a:p>
@@ -7456,7 +7456,86 @@
                 </a:tc>
                 <a:extLst>
                   <a:ext uri="{0D108BD9-81ED-4DB2-BD59-A6C34878D82A}">
-                    <a16:rowId xmlns:a16="http://schemas.microsoft.com/office/drawing/2014/main" val="1505839542"/>
+                    <a16:rowId xmlns:a16="http://schemas.microsoft.com/office/drawing/2014/main" val="2747685497"/>
+                  </a:ext>
+                </a:extLst>
+              </a:tr>
+              <a:tr h="370840">
+                <a:tc gridSpan="2">
+                  <a:txBody>
+                    <a:bodyPr/>
+                    <a:lstStyle/>
+                    <a:p>
+                      <a:r>
+                        <a:rPr lang="en-US" b="1" dirty="0"/>
+                        <a:t>Total info</a:t>
+                      </a:r>
+                      <a:endParaRPr lang="hr-HR" b="1" dirty="0"/>
+                    </a:p>
+                  </a:txBody>
+                  <a:tcPr/>
+                </a:tc>
+                <a:tc hMerge="1">
+                  <a:txBody>
+                    <a:bodyPr/>
+                    <a:lstStyle/>
+                    <a:p>
+                      <a:pPr marL="0" marR="0" lvl="0" indent="0" algn="l" defTabSz="914400" rtl="0" eaLnBrk="1" fontAlgn="auto" latinLnBrk="0" hangingPunct="1">
+                        <a:lnSpc>
+                          <a:spcPct val="100000"/>
+                        </a:lnSpc>
+                        <a:spcBef>
+                          <a:spcPts val="0"/>
+                        </a:spcBef>
+                        <a:spcAft>
+                          <a:spcPts val="0"/>
+                        </a:spcAft>
+                        <a:buClrTx/>
+                        <a:buSzTx/>
+                        <a:buFontTx/>
+                        <a:buNone/>
+                        <a:tabLst/>
+                        <a:defRPr/>
+                      </a:pPr>
+                      <a:endParaRPr lang="hr-HR" dirty="0"/>
+                    </a:p>
+                  </a:txBody>
+                  <a:tcPr/>
+                </a:tc>
+                <a:tc>
+                  <a:txBody>
+                    <a:bodyPr/>
+                    <a:lstStyle/>
+                    <a:p>
+                      <a:pPr marL="0" marR="0" lvl="0" indent="0" algn="l" defTabSz="914400" rtl="0" eaLnBrk="1" fontAlgn="auto" latinLnBrk="0" hangingPunct="1">
+                        <a:lnSpc>
+                          <a:spcPct val="100000"/>
+                        </a:lnSpc>
+                        <a:spcBef>
+                          <a:spcPts val="0"/>
+                        </a:spcBef>
+                        <a:spcAft>
+                          <a:spcPts val="0"/>
+                        </a:spcAft>
+                        <a:buClrTx/>
+                        <a:buSzTx/>
+                        <a:buFontTx/>
+                        <a:buNone/>
+                        <a:tabLst/>
+                        <a:defRPr/>
+                      </a:pPr>
+                      <a:r>
+                        <a:rPr lang="en-US" b="1" dirty="0"/>
+                        <a:t>120</a:t>
+                      </a:r>
+                      <a:endParaRPr lang="hr-HR" b="1" dirty="0"/>
+                    </a:p>
+                  </a:txBody>
+                  <a:tcPr/>
+                </a:tc>
+                <a:extLst>
+                  <a:ext uri="{0D108BD9-81ED-4DB2-BD59-A6C34878D82A}">
+                    <a16:rowId xmlns:a16="http://schemas.microsoft.com/office/drawing/2014/main" val="2498231850"/>
                   </a:ext>
                 </a:extLst>
               </a:tr>

</xml_diff>